<commit_message>
adding a couple screenshots for before and after refactoring
</commit_message>
<xml_diff>
--- a/ClassMaterials/Interfaces/Slides/Interfaces.pptx
+++ b/ClassMaterials/Interfaces/Slides/Interfaces.pptx
@@ -5,10 +5,10 @@
     <p:sldMasterId id="2147484251" r:id="rId1"/>
   </p:sldMasterIdLst>
   <p:notesMasterIdLst>
-    <p:notesMasterId r:id="rId26"/>
+    <p:notesMasterId r:id="rId28"/>
   </p:notesMasterIdLst>
   <p:handoutMasterIdLst>
-    <p:handoutMasterId r:id="rId27"/>
+    <p:handoutMasterId r:id="rId29"/>
   </p:handoutMasterIdLst>
   <p:sldIdLst>
     <p:sldId id="256" r:id="rId2"/>
@@ -23,18 +23,20 @@
     <p:sldId id="301" r:id="rId11"/>
     <p:sldId id="302" r:id="rId12"/>
     <p:sldId id="303" r:id="rId13"/>
-    <p:sldId id="292" r:id="rId14"/>
-    <p:sldId id="293" r:id="rId15"/>
-    <p:sldId id="294" r:id="rId16"/>
-    <p:sldId id="295" r:id="rId17"/>
-    <p:sldId id="296" r:id="rId18"/>
-    <p:sldId id="264" r:id="rId19"/>
-    <p:sldId id="272" r:id="rId20"/>
-    <p:sldId id="273" r:id="rId21"/>
-    <p:sldId id="288" r:id="rId22"/>
-    <p:sldId id="274" r:id="rId23"/>
-    <p:sldId id="282" r:id="rId24"/>
-    <p:sldId id="275" r:id="rId25"/>
+    <p:sldId id="304" r:id="rId14"/>
+    <p:sldId id="305" r:id="rId15"/>
+    <p:sldId id="292" r:id="rId16"/>
+    <p:sldId id="293" r:id="rId17"/>
+    <p:sldId id="294" r:id="rId18"/>
+    <p:sldId id="295" r:id="rId19"/>
+    <p:sldId id="296" r:id="rId20"/>
+    <p:sldId id="264" r:id="rId21"/>
+    <p:sldId id="272" r:id="rId22"/>
+    <p:sldId id="273" r:id="rId23"/>
+    <p:sldId id="288" r:id="rId24"/>
+    <p:sldId id="274" r:id="rId25"/>
+    <p:sldId id="282" r:id="rId26"/>
+    <p:sldId id="275" r:id="rId27"/>
   </p:sldIdLst>
   <p:sldSz cx="9144000" cy="6858000" type="screen4x3"/>
   <p:notesSz cx="7010400" cy="9296400"/>
@@ -299,7 +301,7 @@
               <a:pPr>
                 <a:defRPr/>
               </a:pPr>
-              <a:t>2/24/22</a:t>
+              <a:t>2/25/2022</a:t>
             </a:fld>
             <a:endParaRPr lang="en-US"/>
           </a:p>
@@ -534,7 +536,7 @@
               <a:pPr>
                 <a:defRPr/>
               </a:pPr>
-              <a:t>2/24/22</a:t>
+              <a:t>2/25/2022</a:t>
             </a:fld>
             <a:endParaRPr lang="en-US"/>
           </a:p>
@@ -917,7 +919,7 @@
           </a:ln>
           <a:extLst>
             <a:ext uri="{909E8E84-426E-40dd-AFC4-6F175D3DCCD1}">
-              <a14:hiddenFill xmlns="" xmlns:a14="http://schemas.microsoft.com/office/drawing/2010/main">
+              <a14:hiddenFill xmlns:a14="http://schemas.microsoft.com/office/drawing/2010/main" xmlns="">
                 <a:solidFill>
                   <a:srgbClr val="FFFFFF"/>
                 </a:solidFill>
@@ -941,14 +943,14 @@
           <a:ln/>
           <a:extLst>
             <a:ext uri="{909E8E84-426E-40dd-AFC4-6F175D3DCCD1}">
-              <a14:hiddenFill xmlns="" xmlns:a14="http://schemas.microsoft.com/office/drawing/2010/main">
+              <a14:hiddenFill xmlns:a14="http://schemas.microsoft.com/office/drawing/2010/main" xmlns="">
                 <a:solidFill>
                   <a:srgbClr val="FFFFFF"/>
                 </a:solidFill>
               </a14:hiddenFill>
             </a:ext>
             <a:ext uri="{91240B29-F687-4f45-9708-019B960494DF}">
-              <a14:hiddenLine xmlns="" xmlns:a14="http://schemas.microsoft.com/office/drawing/2010/main" w="9525">
+              <a14:hiddenLine xmlns:a14="http://schemas.microsoft.com/office/drawing/2010/main" xmlns="" w="9525">
                 <a:solidFill>
                   <a:srgbClr val="000000"/>
                 </a:solidFill>
@@ -1112,14 +1114,14 @@
           <a:ln/>
           <a:extLst>
             <a:ext uri="{909E8E84-426E-40dd-AFC4-6F175D3DCCD1}">
-              <a14:hiddenFill xmlns="" xmlns:a14="http://schemas.microsoft.com/office/drawing/2010/main">
+              <a14:hiddenFill xmlns:a14="http://schemas.microsoft.com/office/drawing/2010/main" xmlns="">
                 <a:solidFill>
                   <a:srgbClr val="FFFFFF"/>
                 </a:solidFill>
               </a14:hiddenFill>
             </a:ext>
             <a:ext uri="{91240B29-F687-4f45-9708-019B960494DF}">
-              <a14:hiddenLine xmlns="" xmlns:a14="http://schemas.microsoft.com/office/drawing/2010/main" w="9525">
+              <a14:hiddenLine xmlns:a14="http://schemas.microsoft.com/office/drawing/2010/main" xmlns="" w="9525">
                 <a:solidFill>
                   <a:srgbClr val="000000"/>
                 </a:solidFill>
@@ -1306,7 +1308,7 @@
           </a:ln>
           <a:extLst>
             <a:ext uri="{909E8E84-426E-40dd-AFC4-6F175D3DCCD1}">
-              <a14:hiddenFill xmlns="" xmlns:a14="http://schemas.microsoft.com/office/drawing/2010/main">
+              <a14:hiddenFill xmlns:a14="http://schemas.microsoft.com/office/drawing/2010/main" xmlns="">
                 <a:solidFill>
                   <a:srgbClr val="FFFFFF"/>
                 </a:solidFill>
@@ -1330,14 +1332,14 @@
           <a:ln/>
           <a:extLst>
             <a:ext uri="{909E8E84-426E-40dd-AFC4-6F175D3DCCD1}">
-              <a14:hiddenFill xmlns="" xmlns:a14="http://schemas.microsoft.com/office/drawing/2010/main">
+              <a14:hiddenFill xmlns:a14="http://schemas.microsoft.com/office/drawing/2010/main" xmlns="">
                 <a:solidFill>
                   <a:srgbClr val="FFFFFF"/>
                 </a:solidFill>
               </a14:hiddenFill>
             </a:ext>
             <a:ext uri="{91240B29-F687-4f45-9708-019B960494DF}">
-              <a14:hiddenLine xmlns="" xmlns:a14="http://schemas.microsoft.com/office/drawing/2010/main" w="9525">
+              <a14:hiddenLine xmlns:a14="http://schemas.microsoft.com/office/drawing/2010/main" xmlns="" w="9525">
                 <a:solidFill>
                   <a:srgbClr val="000000"/>
                 </a:solidFill>
@@ -1396,14 +1398,14 @@
           <a:ln/>
           <a:extLst>
             <a:ext uri="{909E8E84-426E-40dd-AFC4-6F175D3DCCD1}">
-              <a14:hiddenFill xmlns="" xmlns:a14="http://schemas.microsoft.com/office/drawing/2010/main">
+              <a14:hiddenFill xmlns:a14="http://schemas.microsoft.com/office/drawing/2010/main" xmlns="">
                 <a:solidFill>
                   <a:srgbClr val="FFFFFF"/>
                 </a:solidFill>
               </a14:hiddenFill>
             </a:ext>
             <a:ext uri="{91240B29-F687-4f45-9708-019B960494DF}">
-              <a14:hiddenLine xmlns="" xmlns:a14="http://schemas.microsoft.com/office/drawing/2010/main" w="9525">
+              <a14:hiddenLine xmlns:a14="http://schemas.microsoft.com/office/drawing/2010/main" xmlns="" w="9525">
                 <a:solidFill>
                   <a:srgbClr val="000000"/>
                 </a:solidFill>
@@ -1771,7 +1773,7 @@
               <a:pPr>
                 <a:defRPr/>
               </a:pPr>
-              <a:t>15</a:t>
+              <a:t>17</a:t>
             </a:fld>
             <a:endParaRPr lang="en-US"/>
           </a:p>
@@ -1829,7 +1831,7 @@
           </a:ln>
           <a:extLst>
             <a:ext uri="{909E8E84-426E-40dd-AFC4-6F175D3DCCD1}">
-              <a14:hiddenFill xmlns="" xmlns:a14="http://schemas.microsoft.com/office/drawing/2010/main">
+              <a14:hiddenFill xmlns:a14="http://schemas.microsoft.com/office/drawing/2010/main" xmlns="">
                 <a:solidFill>
                   <a:srgbClr val="FFFFFF"/>
                 </a:solidFill>
@@ -1853,14 +1855,14 @@
           <a:ln/>
           <a:extLst>
             <a:ext uri="{909E8E84-426E-40dd-AFC4-6F175D3DCCD1}">
-              <a14:hiddenFill xmlns="" xmlns:a14="http://schemas.microsoft.com/office/drawing/2010/main">
+              <a14:hiddenFill xmlns:a14="http://schemas.microsoft.com/office/drawing/2010/main" xmlns="">
                 <a:solidFill>
                   <a:srgbClr val="FFFFFF"/>
                 </a:solidFill>
               </a14:hiddenFill>
             </a:ext>
             <a:ext uri="{91240B29-F687-4f45-9708-019B960494DF}">
-              <a14:hiddenLine xmlns="" xmlns:a14="http://schemas.microsoft.com/office/drawing/2010/main" w="9525">
+              <a14:hiddenLine xmlns:a14="http://schemas.microsoft.com/office/drawing/2010/main" xmlns="" w="9525">
                 <a:solidFill>
                   <a:srgbClr val="000000"/>
                 </a:solidFill>
@@ -1897,14 +1899,14 @@
           <a:ln/>
           <a:extLst>
             <a:ext uri="{909E8E84-426E-40dd-AFC4-6F175D3DCCD1}">
-              <a14:hiddenFill xmlns="" xmlns:a14="http://schemas.microsoft.com/office/drawing/2010/main">
+              <a14:hiddenFill xmlns:a14="http://schemas.microsoft.com/office/drawing/2010/main" xmlns="">
                 <a:solidFill>
                   <a:srgbClr val="FFFFFF"/>
                 </a:solidFill>
               </a14:hiddenFill>
             </a:ext>
             <a:ext uri="{91240B29-F687-4f45-9708-019B960494DF}">
-              <a14:hiddenLine xmlns="" xmlns:a14="http://schemas.microsoft.com/office/drawing/2010/main" w="9525">
+              <a14:hiddenLine xmlns:a14="http://schemas.microsoft.com/office/drawing/2010/main" xmlns="" w="9525">
                 <a:solidFill>
                   <a:srgbClr val="000000"/>
                 </a:solidFill>
@@ -2031,7 +2033,7 @@
                 <a:latin typeface="Calibri" pitchFamily="34" charset="0"/>
               </a:rPr>
               <a:pPr eaLnBrk="1" hangingPunct="1"/>
-              <a:t>17</a:t>
+              <a:t>19</a:t>
             </a:fld>
             <a:endParaRPr lang="en-US">
               <a:latin typeface="Calibri" pitchFamily="34" charset="0"/>
@@ -2199,7 +2201,7 @@
               <a:pPr>
                 <a:defRPr/>
               </a:pPr>
-              <a:t>18</a:t>
+              <a:t>20</a:t>
             </a:fld>
             <a:endParaRPr lang="en-US"/>
           </a:p>
@@ -2316,7 +2318,7 @@
               <a:pPr>
                 <a:defRPr/>
               </a:pPr>
-              <a:t>19</a:t>
+              <a:t>21</a:t>
             </a:fld>
             <a:endParaRPr lang="en-US"/>
           </a:p>
@@ -2409,7 +2411,7 @@
               <a:pPr>
                 <a:defRPr/>
               </a:pPr>
-              <a:t>20</a:t>
+              <a:t>22</a:t>
             </a:fld>
             <a:endParaRPr lang="en-US"/>
           </a:p>
@@ -2502,7 +2504,7 @@
               <a:pPr>
                 <a:defRPr/>
               </a:pPr>
-              <a:t>21</a:t>
+              <a:t>23</a:t>
             </a:fld>
             <a:endParaRPr lang="en-US"/>
           </a:p>
@@ -2626,7 +2628,7 @@
               <a:pPr>
                 <a:defRPr/>
               </a:pPr>
-              <a:t>22</a:t>
+              <a:t>24</a:t>
             </a:fld>
             <a:endParaRPr lang="en-US"/>
           </a:p>
@@ -2684,7 +2686,7 @@
           </a:ln>
           <a:extLst>
             <a:ext uri="{909E8E84-426E-40dd-AFC4-6F175D3DCCD1}">
-              <a14:hiddenFill xmlns:a14="http://schemas.microsoft.com/office/drawing/2010/main" xmlns="">
+              <a14:hiddenFill xmlns="" xmlns:a14="http://schemas.microsoft.com/office/drawing/2010/main">
                 <a:solidFill>
                   <a:srgbClr val="FFFFFF"/>
                 </a:solidFill>
@@ -2708,14 +2710,14 @@
           <a:ln/>
           <a:extLst>
             <a:ext uri="{909E8E84-426E-40dd-AFC4-6F175D3DCCD1}">
-              <a14:hiddenFill xmlns:a14="http://schemas.microsoft.com/office/drawing/2010/main" xmlns="">
+              <a14:hiddenFill xmlns="" xmlns:a14="http://schemas.microsoft.com/office/drawing/2010/main">
                 <a:solidFill>
                   <a:srgbClr val="FFFFFF"/>
                 </a:solidFill>
               </a14:hiddenFill>
             </a:ext>
             <a:ext uri="{91240B29-F687-4f45-9708-019B960494DF}">
-              <a14:hiddenLine xmlns:a14="http://schemas.microsoft.com/office/drawing/2010/main" xmlns="" w="9525">
+              <a14:hiddenLine xmlns="" xmlns:a14="http://schemas.microsoft.com/office/drawing/2010/main" w="9525">
                 <a:solidFill>
                   <a:srgbClr val="000000"/>
                 </a:solidFill>
@@ -2768,14 +2770,14 @@
           <a:ln/>
           <a:extLst>
             <a:ext uri="{909E8E84-426E-40dd-AFC4-6F175D3DCCD1}">
-              <a14:hiddenFill xmlns:a14="http://schemas.microsoft.com/office/drawing/2010/main" xmlns="">
+              <a14:hiddenFill xmlns="" xmlns:a14="http://schemas.microsoft.com/office/drawing/2010/main">
                 <a:solidFill>
                   <a:srgbClr val="FFFFFF"/>
                 </a:solidFill>
               </a14:hiddenFill>
             </a:ext>
             <a:ext uri="{91240B29-F687-4f45-9708-019B960494DF}">
-              <a14:hiddenLine xmlns:a14="http://schemas.microsoft.com/office/drawing/2010/main" xmlns="" w="9525">
+              <a14:hiddenLine xmlns="" xmlns:a14="http://schemas.microsoft.com/office/drawing/2010/main" w="9525">
                 <a:solidFill>
                   <a:srgbClr val="000000"/>
                 </a:solidFill>
@@ -2902,7 +2904,7 @@
                 <a:latin typeface="Calibri" pitchFamily="34" charset="0"/>
               </a:rPr>
               <a:pPr eaLnBrk="1" hangingPunct="1"/>
-              <a:t>24</a:t>
+              <a:t>26</a:t>
             </a:fld>
             <a:endParaRPr lang="en-US">
               <a:latin typeface="Calibri" pitchFamily="34" charset="0"/>
@@ -3159,7 +3161,7 @@
           </a:ln>
           <a:extLst>
             <a:ext uri="{909E8E84-426E-40dd-AFC4-6F175D3DCCD1}">
-              <a14:hiddenFill xmlns="" xmlns:a14="http://schemas.microsoft.com/office/drawing/2010/main">
+              <a14:hiddenFill xmlns:a14="http://schemas.microsoft.com/office/drawing/2010/main" xmlns="">
                 <a:solidFill>
                   <a:srgbClr val="FFFFFF"/>
                 </a:solidFill>
@@ -3183,14 +3185,14 @@
           <a:ln/>
           <a:extLst>
             <a:ext uri="{909E8E84-426E-40dd-AFC4-6F175D3DCCD1}">
-              <a14:hiddenFill xmlns="" xmlns:a14="http://schemas.microsoft.com/office/drawing/2010/main">
+              <a14:hiddenFill xmlns:a14="http://schemas.microsoft.com/office/drawing/2010/main" xmlns="">
                 <a:solidFill>
                   <a:srgbClr val="FFFFFF"/>
                 </a:solidFill>
               </a14:hiddenFill>
             </a:ext>
             <a:ext uri="{91240B29-F687-4f45-9708-019B960494DF}">
-              <a14:hiddenLine xmlns="" xmlns:a14="http://schemas.microsoft.com/office/drawing/2010/main" w="9525">
+              <a14:hiddenLine xmlns:a14="http://schemas.microsoft.com/office/drawing/2010/main" xmlns="" w="9525">
                 <a:solidFill>
                   <a:srgbClr val="000000"/>
                 </a:solidFill>
@@ -3250,14 +3252,14 @@
           <a:ln/>
           <a:extLst>
             <a:ext uri="{909E8E84-426E-40dd-AFC4-6F175D3DCCD1}">
-              <a14:hiddenFill xmlns="" xmlns:a14="http://schemas.microsoft.com/office/drawing/2010/main">
+              <a14:hiddenFill xmlns:a14="http://schemas.microsoft.com/office/drawing/2010/main" xmlns="">
                 <a:solidFill>
                   <a:srgbClr val="FFFFFF"/>
                 </a:solidFill>
               </a14:hiddenFill>
             </a:ext>
             <a:ext uri="{91240B29-F687-4f45-9708-019B960494DF}">
-              <a14:hiddenLine xmlns="" xmlns:a14="http://schemas.microsoft.com/office/drawing/2010/main" w="9525">
+              <a14:hiddenLine xmlns:a14="http://schemas.microsoft.com/office/drawing/2010/main" xmlns="" w="9525">
                 <a:solidFill>
                   <a:srgbClr val="000000"/>
                 </a:solidFill>
@@ -3444,7 +3446,7 @@
           </a:ln>
           <a:extLst>
             <a:ext uri="{909E8E84-426E-40dd-AFC4-6F175D3DCCD1}">
-              <a14:hiddenFill xmlns="" xmlns:a14="http://schemas.microsoft.com/office/drawing/2010/main">
+              <a14:hiddenFill xmlns:a14="http://schemas.microsoft.com/office/drawing/2010/main" xmlns="">
                 <a:solidFill>
                   <a:srgbClr val="FFFFFF"/>
                 </a:solidFill>
@@ -3468,14 +3470,14 @@
           <a:ln/>
           <a:extLst>
             <a:ext uri="{909E8E84-426E-40dd-AFC4-6F175D3DCCD1}">
-              <a14:hiddenFill xmlns="" xmlns:a14="http://schemas.microsoft.com/office/drawing/2010/main">
+              <a14:hiddenFill xmlns:a14="http://schemas.microsoft.com/office/drawing/2010/main" xmlns="">
                 <a:solidFill>
                   <a:srgbClr val="FFFFFF"/>
                 </a:solidFill>
               </a14:hiddenFill>
             </a:ext>
             <a:ext uri="{91240B29-F687-4f45-9708-019B960494DF}">
-              <a14:hiddenLine xmlns="" xmlns:a14="http://schemas.microsoft.com/office/drawing/2010/main" w="9525">
+              <a14:hiddenLine xmlns:a14="http://schemas.microsoft.com/office/drawing/2010/main" xmlns="" w="9525">
                 <a:solidFill>
                   <a:srgbClr val="000000"/>
                 </a:solidFill>
@@ -3591,14 +3593,14 @@
           <a:ln/>
           <a:extLst>
             <a:ext uri="{909E8E84-426E-40dd-AFC4-6F175D3DCCD1}">
-              <a14:hiddenFill xmlns="" xmlns:a14="http://schemas.microsoft.com/office/drawing/2010/main">
+              <a14:hiddenFill xmlns:a14="http://schemas.microsoft.com/office/drawing/2010/main" xmlns="">
                 <a:solidFill>
                   <a:srgbClr val="FFFFFF"/>
                 </a:solidFill>
               </a14:hiddenFill>
             </a:ext>
             <a:ext uri="{91240B29-F687-4f45-9708-019B960494DF}">
-              <a14:hiddenLine xmlns="" xmlns:a14="http://schemas.microsoft.com/office/drawing/2010/main" w="9525">
+              <a14:hiddenLine xmlns:a14="http://schemas.microsoft.com/office/drawing/2010/main" xmlns="" w="9525">
                 <a:solidFill>
                   <a:srgbClr val="000000"/>
                 </a:solidFill>
@@ -3785,7 +3787,7 @@
           </a:ln>
           <a:extLst>
             <a:ext uri="{909E8E84-426E-40dd-AFC4-6F175D3DCCD1}">
-              <a14:hiddenFill xmlns:a14="http://schemas.microsoft.com/office/drawing/2010/main" xmlns="">
+              <a14:hiddenFill xmlns="" xmlns:a14="http://schemas.microsoft.com/office/drawing/2010/main">
                 <a:solidFill>
                   <a:srgbClr val="FFFFFF"/>
                 </a:solidFill>
@@ -3809,14 +3811,14 @@
           <a:ln/>
           <a:extLst>
             <a:ext uri="{909E8E84-426E-40dd-AFC4-6F175D3DCCD1}">
-              <a14:hiddenFill xmlns:a14="http://schemas.microsoft.com/office/drawing/2010/main" xmlns="">
+              <a14:hiddenFill xmlns="" xmlns:a14="http://schemas.microsoft.com/office/drawing/2010/main">
                 <a:solidFill>
                   <a:srgbClr val="FFFFFF"/>
                 </a:solidFill>
               </a14:hiddenFill>
             </a:ext>
             <a:ext uri="{91240B29-F687-4f45-9708-019B960494DF}">
-              <a14:hiddenLine xmlns:a14="http://schemas.microsoft.com/office/drawing/2010/main" xmlns="" w="9525">
+              <a14:hiddenLine xmlns="" xmlns:a14="http://schemas.microsoft.com/office/drawing/2010/main" w="9525">
                 <a:solidFill>
                   <a:srgbClr val="000000"/>
                 </a:solidFill>
@@ -3932,14 +3934,14 @@
           <a:ln/>
           <a:extLst>
             <a:ext uri="{909E8E84-426E-40dd-AFC4-6F175D3DCCD1}">
-              <a14:hiddenFill xmlns:a14="http://schemas.microsoft.com/office/drawing/2010/main" xmlns="">
+              <a14:hiddenFill xmlns="" xmlns:a14="http://schemas.microsoft.com/office/drawing/2010/main">
                 <a:solidFill>
                   <a:srgbClr val="FFFFFF"/>
                 </a:solidFill>
               </a14:hiddenFill>
             </a:ext>
             <a:ext uri="{91240B29-F687-4f45-9708-019B960494DF}">
-              <a14:hiddenLine xmlns:a14="http://schemas.microsoft.com/office/drawing/2010/main" xmlns="" w="9525">
+              <a14:hiddenLine xmlns="" xmlns:a14="http://schemas.microsoft.com/office/drawing/2010/main" w="9525">
                 <a:solidFill>
                   <a:srgbClr val="000000"/>
                 </a:solidFill>
@@ -4126,7 +4128,7 @@
           </a:ln>
           <a:extLst>
             <a:ext uri="{909E8E84-426E-40dd-AFC4-6F175D3DCCD1}">
-              <a14:hiddenFill xmlns:a14="http://schemas.microsoft.com/office/drawing/2010/main" xmlns="">
+              <a14:hiddenFill xmlns="" xmlns:a14="http://schemas.microsoft.com/office/drawing/2010/main">
                 <a:solidFill>
                   <a:srgbClr val="FFFFFF"/>
                 </a:solidFill>
@@ -4150,14 +4152,14 @@
           <a:ln/>
           <a:extLst>
             <a:ext uri="{909E8E84-426E-40dd-AFC4-6F175D3DCCD1}">
-              <a14:hiddenFill xmlns:a14="http://schemas.microsoft.com/office/drawing/2010/main" xmlns="">
+              <a14:hiddenFill xmlns="" xmlns:a14="http://schemas.microsoft.com/office/drawing/2010/main">
                 <a:solidFill>
                   <a:srgbClr val="FFFFFF"/>
                 </a:solidFill>
               </a14:hiddenFill>
             </a:ext>
             <a:ext uri="{91240B29-F687-4f45-9708-019B960494DF}">
-              <a14:hiddenLine xmlns:a14="http://schemas.microsoft.com/office/drawing/2010/main" xmlns="" w="9525">
+              <a14:hiddenLine xmlns="" xmlns:a14="http://schemas.microsoft.com/office/drawing/2010/main" w="9525">
                 <a:solidFill>
                   <a:srgbClr val="000000"/>
                 </a:solidFill>
@@ -4273,14 +4275,14 @@
           <a:ln/>
           <a:extLst>
             <a:ext uri="{909E8E84-426E-40dd-AFC4-6F175D3DCCD1}">
-              <a14:hiddenFill xmlns:a14="http://schemas.microsoft.com/office/drawing/2010/main" xmlns="">
+              <a14:hiddenFill xmlns="" xmlns:a14="http://schemas.microsoft.com/office/drawing/2010/main">
                 <a:solidFill>
                   <a:srgbClr val="FFFFFF"/>
                 </a:solidFill>
               </a14:hiddenFill>
             </a:ext>
             <a:ext uri="{91240B29-F687-4f45-9708-019B960494DF}">
-              <a14:hiddenLine xmlns:a14="http://schemas.microsoft.com/office/drawing/2010/main" xmlns="" w="9525">
+              <a14:hiddenLine xmlns="" xmlns:a14="http://schemas.microsoft.com/office/drawing/2010/main" w="9525">
                 <a:solidFill>
                   <a:srgbClr val="000000"/>
                 </a:solidFill>
@@ -4467,7 +4469,7 @@
           </a:ln>
           <a:extLst>
             <a:ext uri="{909E8E84-426E-40dd-AFC4-6F175D3DCCD1}">
-              <a14:hiddenFill xmlns:a14="http://schemas.microsoft.com/office/drawing/2010/main" xmlns="">
+              <a14:hiddenFill xmlns="" xmlns:a14="http://schemas.microsoft.com/office/drawing/2010/main">
                 <a:solidFill>
                   <a:srgbClr val="FFFFFF"/>
                 </a:solidFill>
@@ -4491,14 +4493,14 @@
           <a:ln/>
           <a:extLst>
             <a:ext uri="{909E8E84-426E-40dd-AFC4-6F175D3DCCD1}">
-              <a14:hiddenFill xmlns:a14="http://schemas.microsoft.com/office/drawing/2010/main" xmlns="">
+              <a14:hiddenFill xmlns="" xmlns:a14="http://schemas.microsoft.com/office/drawing/2010/main">
                 <a:solidFill>
                   <a:srgbClr val="FFFFFF"/>
                 </a:solidFill>
               </a14:hiddenFill>
             </a:ext>
             <a:ext uri="{91240B29-F687-4f45-9708-019B960494DF}">
-              <a14:hiddenLine xmlns:a14="http://schemas.microsoft.com/office/drawing/2010/main" xmlns="" w="9525">
+              <a14:hiddenLine xmlns="" xmlns:a14="http://schemas.microsoft.com/office/drawing/2010/main" w="9525">
                 <a:solidFill>
                   <a:srgbClr val="000000"/>
                 </a:solidFill>
@@ -4614,14 +4616,14 @@
           <a:ln/>
           <a:extLst>
             <a:ext uri="{909E8E84-426E-40dd-AFC4-6F175D3DCCD1}">
-              <a14:hiddenFill xmlns:a14="http://schemas.microsoft.com/office/drawing/2010/main" xmlns="">
+              <a14:hiddenFill xmlns="" xmlns:a14="http://schemas.microsoft.com/office/drawing/2010/main">
                 <a:solidFill>
                   <a:srgbClr val="FFFFFF"/>
                 </a:solidFill>
               </a14:hiddenFill>
             </a:ext>
             <a:ext uri="{91240B29-F687-4f45-9708-019B960494DF}">
-              <a14:hiddenLine xmlns:a14="http://schemas.microsoft.com/office/drawing/2010/main" xmlns="" w="9525">
+              <a14:hiddenLine xmlns="" xmlns:a14="http://schemas.microsoft.com/office/drawing/2010/main" w="9525">
                 <a:solidFill>
                   <a:srgbClr val="000000"/>
                 </a:solidFill>
@@ -5058,7 +5060,7 @@
               <a:pPr>
                 <a:defRPr/>
               </a:pPr>
-              <a:t>Thursday, February 24, 2022</a:t>
+              <a:t>Friday, February 25, 2022</a:t>
             </a:fld>
             <a:endParaRPr lang="en-US" dirty="0"/>
           </a:p>
@@ -5241,7 +5243,7 @@
               <a:pPr>
                 <a:defRPr/>
               </a:pPr>
-              <a:t>Thursday, February 24, 2022</a:t>
+              <a:t>Friday, February 25, 2022</a:t>
             </a:fld>
             <a:endParaRPr lang="en-US" dirty="0"/>
           </a:p>
@@ -5434,7 +5436,7 @@
               <a:pPr>
                 <a:defRPr/>
               </a:pPr>
-              <a:t>Thursday, February 24, 2022</a:t>
+              <a:t>Friday, February 25, 2022</a:t>
             </a:fld>
             <a:endParaRPr lang="en-US" dirty="0"/>
           </a:p>
@@ -5617,7 +5619,7 @@
               <a:pPr>
                 <a:defRPr/>
               </a:pPr>
-              <a:t>Thursday, February 24, 2022</a:t>
+              <a:t>Friday, February 25, 2022</a:t>
             </a:fld>
             <a:endParaRPr lang="en-US" dirty="0"/>
           </a:p>
@@ -5877,7 +5879,7 @@
               <a:pPr>
                 <a:defRPr/>
               </a:pPr>
-              <a:t>Thursday, February 24, 2022</a:t>
+              <a:t>Friday, February 25, 2022</a:t>
             </a:fld>
             <a:endParaRPr lang="en-US"/>
           </a:p>
@@ -6177,7 +6179,7 @@
               <a:pPr>
                 <a:defRPr/>
               </a:pPr>
-              <a:t>Thursday, February 24, 2022</a:t>
+              <a:t>Friday, February 25, 2022</a:t>
             </a:fld>
             <a:endParaRPr lang="en-US"/>
           </a:p>
@@ -6611,7 +6613,7 @@
               <a:pPr>
                 <a:defRPr/>
               </a:pPr>
-              <a:t>Thursday, February 24, 2022</a:t>
+              <a:t>Friday, February 25, 2022</a:t>
             </a:fld>
             <a:endParaRPr lang="en-US"/>
           </a:p>
@@ -6743,7 +6745,7 @@
               <a:pPr>
                 <a:defRPr/>
               </a:pPr>
-              <a:t>Thursday, February 24, 2022</a:t>
+              <a:t>Friday, February 25, 2022</a:t>
             </a:fld>
             <a:endParaRPr lang="en-US"/>
           </a:p>
@@ -6853,7 +6855,7 @@
               <a:pPr>
                 <a:defRPr/>
               </a:pPr>
-              <a:t>Thursday, February 24, 2022</a:t>
+              <a:t>Friday, February 25, 2022</a:t>
             </a:fld>
             <a:endParaRPr lang="en-US" dirty="0"/>
           </a:p>
@@ -7143,7 +7145,7 @@
               <a:pPr>
                 <a:defRPr/>
               </a:pPr>
-              <a:t>Thursday, February 24, 2022</a:t>
+              <a:t>Friday, February 25, 2022</a:t>
             </a:fld>
             <a:endParaRPr lang="en-US"/>
           </a:p>
@@ -7410,7 +7412,7 @@
               <a:pPr>
                 <a:defRPr/>
               </a:pPr>
-              <a:t>Thursday, February 24, 2022</a:t>
+              <a:t>Friday, February 25, 2022</a:t>
             </a:fld>
             <a:endParaRPr lang="en-US"/>
           </a:p>
@@ -7636,7 +7638,7 @@
               <a:pPr>
                 <a:defRPr/>
               </a:pPr>
-              <a:t>Thursday, February 24, 2022</a:t>
+              <a:t>Friday, February 25, 2022</a:t>
             </a:fld>
             <a:endParaRPr lang="en-US" dirty="0"/>
           </a:p>
@@ -8870,214 +8872,207 @@
           <a:chExt cx="0" cy="0"/>
         </a:xfrm>
       </p:grpSpPr>
-      <p:sp>
-        <p:nvSpPr>
-          <p:cNvPr id="2" name="Title 1"/>
-          <p:cNvSpPr>
-            <a:spLocks noGrp="1"/>
-          </p:cNvSpPr>
-          <p:nvPr>
-            <p:ph type="title"/>
-          </p:nvPr>
+      <p:pic>
+        <p:nvPicPr>
+          <p:cNvPr id="1026" name="Picture 2">
+            <a:extLst>
+              <a:ext uri="{FF2B5EF4-FFF2-40B4-BE49-F238E27FC236}">
+                <a16:creationId xmlns:a16="http://schemas.microsoft.com/office/drawing/2014/main" id="{3D4639BB-66B5-4312-B753-FEAF4D1EB05A}"/>
+              </a:ext>
+            </a:extLst>
+          </p:cNvPr>
+          <p:cNvPicPr>
+            <a:picLocks noChangeAspect="1" noChangeArrowheads="1"/>
+          </p:cNvPicPr>
+          <p:nvPr/>
+        </p:nvPicPr>
+        <p:blipFill>
+          <a:blip r:embed="rId2">
+            <a:extLst>
+              <a:ext uri="{28A0092B-C50C-407E-A947-70E740481C1C}">
+                <a14:useLocalDpi xmlns:a14="http://schemas.microsoft.com/office/drawing/2010/main" val="0"/>
+              </a:ext>
+            </a:extLst>
+          </a:blip>
+          <a:srcRect/>
+          <a:stretch>
+            <a:fillRect/>
+          </a:stretch>
+        </p:blipFill>
+        <p:spPr bwMode="auto">
+          <a:xfrm>
+            <a:off x="2514600" y="256192"/>
+            <a:ext cx="6400800" cy="3495676"/>
+          </a:xfrm>
+          <a:prstGeom prst="rect">
+            <a:avLst/>
+          </a:prstGeom>
+          <a:noFill/>
+          <a:extLst>
+            <a:ext uri="{909E8E84-426E-40DD-AFC4-6F175D3DCCD1}">
+              <a14:hiddenFill xmlns:a14="http://schemas.microsoft.com/office/drawing/2010/main">
+                <a:solidFill>
+                  <a:srgbClr val="FFFFFF"/>
+                </a:solidFill>
+              </a14:hiddenFill>
+            </a:ext>
+          </a:extLst>
+        </p:spPr>
+      </p:pic>
+      <p:pic>
+        <p:nvPicPr>
+          <p:cNvPr id="1027" name="Picture 3">
+            <a:hlinkClick r:id="rId3"/>
+            <a:extLst>
+              <a:ext uri="{FF2B5EF4-FFF2-40B4-BE49-F238E27FC236}">
+                <a16:creationId xmlns:a16="http://schemas.microsoft.com/office/drawing/2014/main" id="{46691462-FFFB-4817-B124-3B07BD916618}"/>
+              </a:ext>
+            </a:extLst>
+          </p:cNvPr>
+          <p:cNvPicPr>
+            <a:picLocks noChangeAspect="1" noChangeArrowheads="1"/>
+          </p:cNvPicPr>
+          <p:nvPr/>
+        </p:nvPicPr>
+        <p:blipFill>
+          <a:blip r:embed="rId4">
+            <a:extLst>
+              <a:ext uri="{28A0092B-C50C-407E-A947-70E740481C1C}">
+                <a14:useLocalDpi xmlns:a14="http://schemas.microsoft.com/office/drawing/2010/main" val="0"/>
+              </a:ext>
+            </a:extLst>
+          </a:blip>
+          <a:srcRect/>
+          <a:stretch>
+            <a:fillRect/>
+          </a:stretch>
+        </p:blipFill>
+        <p:spPr bwMode="auto">
+          <a:xfrm>
+            <a:off x="428554" y="4572000"/>
+            <a:ext cx="8363022" cy="1647825"/>
+          </a:xfrm>
+          <a:prstGeom prst="rect">
+            <a:avLst/>
+          </a:prstGeom>
+          <a:noFill/>
+          <a:extLst>
+            <a:ext uri="{909E8E84-426E-40DD-AFC4-6F175D3DCCD1}">
+              <a14:hiddenFill xmlns:a14="http://schemas.microsoft.com/office/drawing/2010/main">
+                <a:solidFill>
+                  <a:srgbClr val="FFFFFF"/>
+                </a:solidFill>
+              </a14:hiddenFill>
+            </a:ext>
+          </a:extLst>
+        </p:spPr>
+      </p:pic>
+      <p:sp>
+        <p:nvSpPr>
+          <p:cNvPr id="10" name="TextBox 9">
+            <a:extLst>
+              <a:ext uri="{FF2B5EF4-FFF2-40B4-BE49-F238E27FC236}">
+                <a16:creationId xmlns:a16="http://schemas.microsoft.com/office/drawing/2014/main" id="{8DE0A33F-63A1-430C-A82E-956ACA06D62A}"/>
+              </a:ext>
+            </a:extLst>
+          </p:cNvPr>
+          <p:cNvSpPr txBox="1"/>
+          <p:nvPr/>
         </p:nvSpPr>
         <p:spPr>
           <a:xfrm>
-            <a:off x="431800" y="-152400"/>
-            <a:ext cx="8229600" cy="1143000"/>
+            <a:off x="152400" y="281675"/>
+            <a:ext cx="2667000" cy="1077218"/>
           </a:xfrm>
+          <a:prstGeom prst="rect">
+            <a:avLst/>
+          </a:prstGeom>
+          <a:noFill/>
         </p:spPr>
         <p:txBody>
-          <a:bodyPr>
-            <a:normAutofit fontScale="90000"/>
+          <a:bodyPr wrap="square">
+            <a:spAutoFit/>
           </a:bodyPr>
           <a:lstStyle/>
           <a:p>
-            <a:pPr algn="l"/>
-            <a:r>
-              <a:rPr lang="en-US" dirty="0"/>
-              <a:t>Interface Types can replace class types</a:t>
-            </a:r>
-          </a:p>
-        </p:txBody>
-      </p:sp>
-      <p:sp>
-        <p:nvSpPr>
-          <p:cNvPr id="3" name="Content Placeholder 2"/>
-          <p:cNvSpPr>
-            <a:spLocks noGrp="1"/>
-          </p:cNvSpPr>
-          <p:nvPr>
-            <p:ph idx="1"/>
-          </p:nvPr>
-        </p:nvSpPr>
-        <p:spPr>
-          <a:xfrm>
-            <a:off x="152400" y="838200"/>
-            <a:ext cx="8839200" cy="5867400"/>
-          </a:xfrm>
-        </p:spPr>
-        <p:txBody>
-          <a:bodyPr>
-            <a:normAutofit/>
-          </a:bodyPr>
-          <a:lstStyle/>
-          <a:p>
-            <a:r>
-              <a:rPr lang="en-US" sz="2800" dirty="0"/>
-              <a:t>If Dog &amp; Cat implement the Pet interface:</a:t>
-            </a:r>
-          </a:p>
-          <a:p>
-            <a:pPr marL="971550" lvl="1" indent="-514350">
-              <a:buFont typeface="+mj-lt"/>
-              <a:buAutoNum type="arabicPeriod"/>
-            </a:pPr>
-            <a:r>
-              <a:rPr lang="en-US" dirty="0"/>
-              <a:t>Variable Declaration:</a:t>
-            </a:r>
-          </a:p>
-          <a:p>
-            <a:pPr lvl="2"/>
-            <a:r>
-              <a:rPr lang="en-US" dirty="0"/>
-              <a:t>Pet d = new Dog();	Pet c = new Cat();</a:t>
-            </a:r>
-          </a:p>
-          <a:p>
-            <a:pPr marL="971550" lvl="1" indent="-514350">
-              <a:buFont typeface="+mj-lt"/>
-              <a:buAutoNum type="arabicPeriod"/>
-            </a:pPr>
-            <a:r>
-              <a:rPr lang="en-US" dirty="0"/>
-              <a:t>Parameters:</a:t>
-            </a:r>
-          </a:p>
-          <a:p>
-            <a:pPr lvl="2"/>
-            <a:r>
-              <a:rPr lang="en-US" dirty="0"/>
-              <a:t>public static void </a:t>
-            </a:r>
-            <a:r>
-              <a:rPr lang="en-US" dirty="0" err="1"/>
-              <a:t>feedPet</a:t>
-            </a:r>
-            <a:r>
-              <a:rPr lang="en-US" dirty="0"/>
-              <a:t>(Pet p) {…}</a:t>
-            </a:r>
-            <a:br>
-              <a:rPr lang="en-US" dirty="0"/>
-            </a:br>
-            <a:r>
-              <a:rPr lang="en-US" dirty="0"/>
-              <a:t>Can call with any object of type Pet:</a:t>
-            </a:r>
-          </a:p>
-          <a:p>
-            <a:pPr lvl="2"/>
-            <a:r>
-              <a:rPr lang="en-US" dirty="0" err="1"/>
-              <a:t>feedPet</a:t>
-            </a:r>
-            <a:r>
-              <a:rPr lang="en-US" dirty="0"/>
-              <a:t>(new Dog());       </a:t>
-            </a:r>
-            <a:r>
-              <a:rPr lang="en-US" dirty="0" err="1"/>
-              <a:t>feedPet</a:t>
-            </a:r>
-            <a:r>
-              <a:rPr lang="en-US" dirty="0"/>
-              <a:t>(c); // from above</a:t>
-            </a:r>
-          </a:p>
-          <a:p>
-            <a:pPr marL="971550" lvl="1" indent="-514350">
-              <a:buFont typeface="+mj-lt"/>
-              <a:buAutoNum type="arabicPeriod" startAt="3"/>
-            </a:pPr>
-            <a:r>
-              <a:rPr lang="en-US" dirty="0"/>
-              <a:t>Fields:</a:t>
-            </a:r>
-          </a:p>
-          <a:p>
-            <a:pPr lvl="2"/>
-            <a:r>
-              <a:rPr lang="en-US" dirty="0"/>
-              <a:t>private Pet </a:t>
-            </a:r>
-            <a:r>
-              <a:rPr lang="en-US" dirty="0" err="1"/>
-              <a:t>pet</a:t>
-            </a:r>
-            <a:r>
-              <a:rPr lang="en-US" dirty="0"/>
-              <a:t>;</a:t>
-            </a:r>
-          </a:p>
-          <a:p>
-            <a:pPr marL="971550" lvl="1" indent="-514350">
-              <a:buFont typeface="+mj-lt"/>
-              <a:buAutoNum type="arabicPeriod" startAt="3"/>
-            </a:pPr>
-            <a:r>
-              <a:rPr lang="en-US" dirty="0"/>
-              <a:t>Generic Type Parameters:</a:t>
-            </a:r>
-          </a:p>
-          <a:p>
-            <a:pPr lvl="2"/>
-            <a:r>
-              <a:rPr lang="en-US" dirty="0" err="1"/>
-              <a:t>ArrayList</a:t>
-            </a:r>
-            <a:r>
-              <a:rPr lang="en-US" dirty="0"/>
-              <a:t>&lt;Pet&gt; pets = new </a:t>
-            </a:r>
-            <a:r>
-              <a:rPr lang="en-US" dirty="0" err="1"/>
-              <a:t>ArrayList</a:t>
-            </a:r>
-            <a:r>
-              <a:rPr lang="en-US" dirty="0"/>
-              <a:t>&lt;Pet&gt;();</a:t>
-            </a:r>
-          </a:p>
-          <a:p>
-            <a:pPr lvl="2"/>
-            <a:r>
-              <a:rPr lang="en-US" dirty="0" err="1"/>
-              <a:t>pets.add</a:t>
-            </a:r>
-            <a:r>
-              <a:rPr lang="en-US" dirty="0"/>
-              <a:t>(new Dog());    </a:t>
-            </a:r>
-            <a:r>
-              <a:rPr lang="en-US" dirty="0" err="1"/>
-              <a:t>pets.add</a:t>
-            </a:r>
-            <a:r>
-              <a:rPr lang="en-US" dirty="0"/>
-              <a:t>(new Cat());</a:t>
-            </a:r>
-          </a:p>
-          <a:p>
-            <a:pPr lvl="1"/>
-            <a:endParaRPr lang="en-US" dirty="0"/>
+            <a:pPr marL="0" marR="0" lvl="0" indent="0" algn="l" defTabSz="914400" rtl="0" eaLnBrk="0" fontAlgn="base" latinLnBrk="0" hangingPunct="0">
+              <a:lnSpc>
+                <a:spcPct val="100000"/>
+              </a:lnSpc>
+              <a:spcBef>
+                <a:spcPct val="0"/>
+              </a:spcBef>
+              <a:spcAft>
+                <a:spcPct val="0"/>
+              </a:spcAft>
+              <a:buClrTx/>
+              <a:buSzTx/>
+              <a:buFontTx/>
+              <a:buNone/>
+              <a:tabLst/>
+            </a:pPr>
+            <a:r>
+              <a:rPr kumimoji="0" lang="en-US" altLang="en-US" sz="3200" b="0" i="0" u="none" strike="noStrike" cap="none" normalizeH="0" baseline="0" dirty="0">
+                <a:ln>
+                  <a:noFill/>
+                </a:ln>
+                <a:solidFill>
+                  <a:srgbClr val="000000"/>
+                </a:solidFill>
+                <a:effectLst/>
+                <a:latin typeface="Times New Roman" panose="02020603050405020304" pitchFamily="18" charset="0"/>
+                <a:cs typeface="Times New Roman" panose="02020603050405020304" pitchFamily="18" charset="0"/>
+              </a:rPr>
+              <a:t>Before </a:t>
+            </a:r>
+          </a:p>
+          <a:p>
+            <a:pPr marL="0" marR="0" lvl="0" indent="0" algn="l" defTabSz="914400" rtl="0" eaLnBrk="0" fontAlgn="base" latinLnBrk="0" hangingPunct="0">
+              <a:lnSpc>
+                <a:spcPct val="100000"/>
+              </a:lnSpc>
+              <a:spcBef>
+                <a:spcPct val="0"/>
+              </a:spcBef>
+              <a:spcAft>
+                <a:spcPct val="0"/>
+              </a:spcAft>
+              <a:buClrTx/>
+              <a:buSzTx/>
+              <a:buFontTx/>
+              <a:buNone/>
+              <a:tabLst/>
+            </a:pPr>
+            <a:r>
+              <a:rPr kumimoji="0" lang="en-US" altLang="en-US" sz="3200" b="0" i="0" u="none" strike="noStrike" cap="none" normalizeH="0" baseline="0" dirty="0">
+                <a:ln>
+                  <a:noFill/>
+                </a:ln>
+                <a:solidFill>
+                  <a:srgbClr val="000000"/>
+                </a:solidFill>
+                <a:effectLst/>
+                <a:latin typeface="Times New Roman" panose="02020603050405020304" pitchFamily="18" charset="0"/>
+                <a:cs typeface="Times New Roman" panose="02020603050405020304" pitchFamily="18" charset="0"/>
+              </a:rPr>
+              <a:t>Refactoring</a:t>
+            </a:r>
+            <a:endParaRPr kumimoji="0" lang="en-US" altLang="en-US" sz="1100" b="0" i="0" u="none" strike="noStrike" cap="none" normalizeH="0" baseline="0" dirty="0">
+              <a:ln>
+                <a:noFill/>
+              </a:ln>
+              <a:solidFill>
+                <a:schemeClr val="tx1"/>
+              </a:solidFill>
+              <a:effectLst/>
+            </a:endParaRPr>
           </a:p>
         </p:txBody>
       </p:sp>
     </p:spTree>
     <p:extLst>
       <p:ext uri="{BB962C8B-B14F-4D97-AF65-F5344CB8AC3E}">
-        <p14:creationId xmlns:p14="http://schemas.microsoft.com/office/powerpoint/2010/main" val="2010889198"/>
+        <p14:creationId xmlns:p14="http://schemas.microsoft.com/office/powerpoint/2010/main" val="1918581298"/>
       </p:ext>
     </p:extLst>
   </p:cSld>
@@ -9104,190 +9099,207 @@
           <a:chExt cx="0" cy="0"/>
         </a:xfrm>
       </p:grpSpPr>
-      <p:sp>
-        <p:nvSpPr>
-          <p:cNvPr id="2" name="Title 1"/>
-          <p:cNvSpPr>
-            <a:spLocks noGrp="1"/>
-          </p:cNvSpPr>
-          <p:nvPr>
-            <p:ph type="title"/>
-          </p:nvPr>
-        </p:nvSpPr>
-        <p:spPr/>
-        <p:txBody>
-          <a:bodyPr/>
-          <a:lstStyle/>
-          <a:p>
-            <a:r>
-              <a:rPr lang="en-US" dirty="0"/>
-              <a:t>Check your understanding…</a:t>
-            </a:r>
-          </a:p>
-        </p:txBody>
-      </p:sp>
-      <p:sp>
-        <p:nvSpPr>
-          <p:cNvPr id="3" name="Content Placeholder 2"/>
-          <p:cNvSpPr>
-            <a:spLocks noGrp="1"/>
-          </p:cNvSpPr>
-          <p:nvPr>
-            <p:ph idx="1"/>
-          </p:nvPr>
-        </p:nvSpPr>
-        <p:spPr>
+      <p:pic>
+        <p:nvPicPr>
+          <p:cNvPr id="6" name="Picture 4">
+            <a:extLst>
+              <a:ext uri="{FF2B5EF4-FFF2-40B4-BE49-F238E27FC236}">
+                <a16:creationId xmlns:a16="http://schemas.microsoft.com/office/drawing/2014/main" id="{C703F9AE-704F-434E-86DB-692D4FC9F5EE}"/>
+              </a:ext>
+            </a:extLst>
+          </p:cNvPr>
+          <p:cNvPicPr>
+            <a:picLocks noChangeAspect="1" noChangeArrowheads="1"/>
+          </p:cNvPicPr>
+          <p:nvPr/>
+        </p:nvPicPr>
+        <p:blipFill>
+          <a:blip r:embed="rId2">
+            <a:extLst>
+              <a:ext uri="{28A0092B-C50C-407E-A947-70E740481C1C}">
+                <a14:useLocalDpi xmlns:a14="http://schemas.microsoft.com/office/drawing/2010/main" val="0"/>
+              </a:ext>
+            </a:extLst>
+          </a:blip>
+          <a:srcRect/>
+          <a:stretch>
+            <a:fillRect/>
+          </a:stretch>
+        </p:blipFill>
+        <p:spPr bwMode="auto">
           <a:xfrm>
-            <a:off x="457200" y="1600200"/>
-            <a:ext cx="8229600" cy="4953000"/>
-          </a:xfrm>
-        </p:spPr>
-        <p:txBody>
-          <a:bodyPr>
-            <a:normAutofit fontScale="85000" lnSpcReduction="20000"/>
-          </a:bodyPr>
-          <a:lstStyle/>
-          <a:p>
-            <a:pPr marL="0" indent="0">
-              <a:buNone/>
-            </a:pPr>
-            <a:r>
-              <a:rPr lang="en-US" dirty="0"/>
-              <a:t>public interface Pet{</a:t>
-            </a:r>
-          </a:p>
-          <a:p>
-            <a:pPr marL="0" indent="0">
-              <a:buNone/>
-            </a:pPr>
-            <a:r>
-              <a:rPr lang="en-US" dirty="0"/>
-              <a:t>    private String name;</a:t>
-            </a:r>
-          </a:p>
-          <a:p>
-            <a:pPr marL="0" indent="0">
-              <a:buNone/>
-            </a:pPr>
-            <a:endParaRPr lang="en-US" dirty="0"/>
-          </a:p>
-          <a:p>
-            <a:pPr marL="0" indent="0">
-              <a:buNone/>
-            </a:pPr>
-            <a:r>
-              <a:rPr lang="en-US" dirty="0"/>
-              <a:t>    public Pet(String name){</a:t>
-            </a:r>
-          </a:p>
-          <a:p>
-            <a:pPr marL="0" indent="0">
-              <a:buNone/>
-            </a:pPr>
-            <a:r>
-              <a:rPr lang="en-US" dirty="0"/>
-              <a:t>        this.name = name;</a:t>
-            </a:r>
-          </a:p>
-          <a:p>
-            <a:pPr marL="0" indent="0">
-              <a:buNone/>
-            </a:pPr>
-            <a:r>
-              <a:rPr lang="en-US" dirty="0"/>
-              <a:t>    }</a:t>
-            </a:r>
-          </a:p>
-          <a:p>
-            <a:pPr marL="0" indent="0">
-              <a:buNone/>
-            </a:pPr>
-            <a:endParaRPr lang="en-US" dirty="0"/>
-          </a:p>
-          <a:p>
-            <a:pPr marL="0" indent="0">
-              <a:buNone/>
-            </a:pPr>
-            <a:r>
-              <a:rPr lang="en-US" dirty="0"/>
-              <a:t>    public void speak(){</a:t>
-            </a:r>
-          </a:p>
-          <a:p>
-            <a:pPr marL="0" indent="0">
-              <a:buNone/>
-            </a:pPr>
-            <a:r>
-              <a:rPr lang="en-US" dirty="0"/>
-              <a:t>        </a:t>
-            </a:r>
-            <a:r>
-              <a:rPr lang="en-US" dirty="0" err="1"/>
-              <a:t>System.out.println</a:t>
-            </a:r>
-            <a:r>
-              <a:rPr lang="en-US" dirty="0"/>
-              <a:t>(name);</a:t>
-            </a:r>
-          </a:p>
-          <a:p>
-            <a:pPr marL="0" indent="0">
-              <a:buNone/>
-            </a:pPr>
-            <a:r>
-              <a:rPr lang="en-US" dirty="0"/>
-              <a:t>    }</a:t>
-            </a:r>
-          </a:p>
-          <a:p>
-            <a:pPr marL="0" indent="0">
-              <a:buNone/>
-            </a:pPr>
-            <a:r>
-              <a:rPr lang="en-US" dirty="0"/>
-              <a:t>}</a:t>
-            </a:r>
-          </a:p>
-        </p:txBody>
-      </p:sp>
-      <p:sp>
-        <p:nvSpPr>
-          <p:cNvPr id="4" name="TextBox 3"/>
-          <p:cNvSpPr txBox="1"/>
-          <p:nvPr/>
-        </p:nvSpPr>
-        <p:spPr>
-          <a:xfrm>
-            <a:off x="1362627" y="5638800"/>
-            <a:ext cx="6418745" cy="523220"/>
+            <a:off x="2526890" y="310646"/>
+            <a:ext cx="6400800" cy="3491345"/>
           </a:xfrm>
           <a:prstGeom prst="rect">
             <a:avLst/>
           </a:prstGeom>
           <a:noFill/>
-          <a:ln>
-            <a:solidFill>
-              <a:schemeClr val="tx1"/>
-            </a:solidFill>
-          </a:ln>
+          <a:extLst>
+            <a:ext uri="{909E8E84-426E-40DD-AFC4-6F175D3DCCD1}">
+              <a14:hiddenFill xmlns:a14="http://schemas.microsoft.com/office/drawing/2010/main">
+                <a:solidFill>
+                  <a:srgbClr val="FFFFFF"/>
+                </a:solidFill>
+              </a14:hiddenFill>
+            </a:ext>
+          </a:extLst>
         </p:spPr>
-        <p:txBody>
-          <a:bodyPr wrap="none" rtlCol="0">
+      </p:pic>
+      <p:pic>
+        <p:nvPicPr>
+          <p:cNvPr id="7" name="Picture 2">
+            <a:hlinkClick r:id="rId3"/>
+            <a:extLst>
+              <a:ext uri="{FF2B5EF4-FFF2-40B4-BE49-F238E27FC236}">
+                <a16:creationId xmlns:a16="http://schemas.microsoft.com/office/drawing/2014/main" id="{1C358E9D-01A4-43F0-8938-366B0C2FF465}"/>
+              </a:ext>
+            </a:extLst>
+          </p:cNvPr>
+          <p:cNvPicPr>
+            <a:picLocks noChangeAspect="1" noChangeArrowheads="1"/>
+          </p:cNvPicPr>
+          <p:nvPr/>
+        </p:nvPicPr>
+        <p:blipFill>
+          <a:blip r:embed="rId4">
+            <a:extLst>
+              <a:ext uri="{28A0092B-C50C-407E-A947-70E740481C1C}">
+                <a14:useLocalDpi xmlns:a14="http://schemas.microsoft.com/office/drawing/2010/main" val="0"/>
+              </a:ext>
+            </a:extLst>
+          </a:blip>
+          <a:srcRect/>
+          <a:stretch>
+            <a:fillRect/>
+          </a:stretch>
+        </p:blipFill>
+        <p:spPr bwMode="auto">
+          <a:xfrm>
+            <a:off x="2133600" y="3961447"/>
+            <a:ext cx="4481087" cy="2881313"/>
+          </a:xfrm>
+          <a:prstGeom prst="rect">
+            <a:avLst/>
+          </a:prstGeom>
+          <a:noFill/>
+          <a:extLst>
+            <a:ext uri="{909E8E84-426E-40DD-AFC4-6F175D3DCCD1}">
+              <a14:hiddenFill xmlns:a14="http://schemas.microsoft.com/office/drawing/2010/main">
+                <a:solidFill>
+                  <a:srgbClr val="FFFFFF"/>
+                </a:solidFill>
+              </a14:hiddenFill>
+            </a:ext>
+          </a:extLst>
+        </p:spPr>
+      </p:pic>
+      <p:sp>
+        <p:nvSpPr>
+          <p:cNvPr id="9" name="TextBox 8">
+            <a:extLst>
+              <a:ext uri="{FF2B5EF4-FFF2-40B4-BE49-F238E27FC236}">
+                <a16:creationId xmlns:a16="http://schemas.microsoft.com/office/drawing/2014/main" id="{72174058-079A-4947-93D8-D545388B5899}"/>
+              </a:ext>
+            </a:extLst>
+          </p:cNvPr>
+          <p:cNvSpPr txBox="1"/>
+          <p:nvPr/>
+        </p:nvSpPr>
+        <p:spPr>
+          <a:xfrm>
+            <a:off x="216310" y="462409"/>
+            <a:ext cx="4572000" cy="1077218"/>
+          </a:xfrm>
+          <a:prstGeom prst="rect">
+            <a:avLst/>
+          </a:prstGeom>
+          <a:noFill/>
+        </p:spPr>
+        <p:txBody>
+          <a:bodyPr wrap="square">
             <a:spAutoFit/>
           </a:bodyPr>
           <a:lstStyle/>
           <a:p>
-            <a:r>
-              <a:rPr lang="en-US" sz="2800" dirty="0"/>
-              <a:t>Is this interface valid? Why or why not?</a:t>
-            </a:r>
+            <a:pPr marL="0" marR="0" lvl="0" indent="0" algn="l" defTabSz="914400" rtl="0" eaLnBrk="0" fontAlgn="base" latinLnBrk="0" hangingPunct="0">
+              <a:lnSpc>
+                <a:spcPct val="100000"/>
+              </a:lnSpc>
+              <a:spcBef>
+                <a:spcPct val="0"/>
+              </a:spcBef>
+              <a:spcAft>
+                <a:spcPct val="0"/>
+              </a:spcAft>
+              <a:buClrTx/>
+              <a:buSzTx/>
+              <a:buFontTx/>
+              <a:buNone/>
+              <a:tabLst/>
+            </a:pPr>
+            <a:r>
+              <a:rPr kumimoji="0" lang="en-US" altLang="en-US" sz="3200" b="0" i="0" u="none" strike="noStrike" cap="none" normalizeH="0" baseline="0" dirty="0">
+                <a:ln>
+                  <a:noFill/>
+                </a:ln>
+                <a:solidFill>
+                  <a:srgbClr val="000000"/>
+                </a:solidFill>
+                <a:effectLst/>
+                <a:latin typeface="Times New Roman" panose="02020603050405020304" pitchFamily="18" charset="0"/>
+                <a:cs typeface="Times New Roman" panose="02020603050405020304" pitchFamily="18" charset="0"/>
+              </a:rPr>
+              <a:t>After</a:t>
+            </a:r>
+          </a:p>
+          <a:p>
+            <a:pPr marL="0" marR="0" lvl="0" indent="0" algn="l" defTabSz="914400" rtl="0" eaLnBrk="0" fontAlgn="base" latinLnBrk="0" hangingPunct="0">
+              <a:lnSpc>
+                <a:spcPct val="100000"/>
+              </a:lnSpc>
+              <a:spcBef>
+                <a:spcPct val="0"/>
+              </a:spcBef>
+              <a:spcAft>
+                <a:spcPct val="0"/>
+              </a:spcAft>
+              <a:buClrTx/>
+              <a:buSzTx/>
+              <a:buFontTx/>
+              <a:buNone/>
+              <a:tabLst/>
+            </a:pPr>
+            <a:r>
+              <a:rPr kumimoji="0" lang="en-US" altLang="en-US" sz="3200" b="0" i="0" u="none" strike="noStrike" cap="none" normalizeH="0" baseline="0" dirty="0">
+                <a:ln>
+                  <a:noFill/>
+                </a:ln>
+                <a:solidFill>
+                  <a:srgbClr val="000000"/>
+                </a:solidFill>
+                <a:effectLst/>
+                <a:latin typeface="Times New Roman" panose="02020603050405020304" pitchFamily="18" charset="0"/>
+                <a:cs typeface="Times New Roman" panose="02020603050405020304" pitchFamily="18" charset="0"/>
+              </a:rPr>
+              <a:t>Refactoring</a:t>
+            </a:r>
+            <a:endParaRPr kumimoji="0" lang="en-US" altLang="en-US" sz="1100" b="0" i="0" u="none" strike="noStrike" cap="none" normalizeH="0" baseline="0" dirty="0">
+              <a:ln>
+                <a:noFill/>
+              </a:ln>
+              <a:solidFill>
+                <a:schemeClr val="tx1"/>
+              </a:solidFill>
+              <a:effectLst/>
+            </a:endParaRPr>
           </a:p>
         </p:txBody>
       </p:sp>
     </p:spTree>
     <p:extLst>
       <p:ext uri="{BB962C8B-B14F-4D97-AF65-F5344CB8AC3E}">
-        <p14:creationId xmlns:p14="http://schemas.microsoft.com/office/powerpoint/2010/main" val="1781697480"/>
+        <p14:creationId xmlns:p14="http://schemas.microsoft.com/office/powerpoint/2010/main" val="1824901850"/>
       </p:ext>
     </p:extLst>
   </p:cSld>
@@ -9324,14 +9336,22 @@
             <p:ph type="title"/>
           </p:nvPr>
         </p:nvSpPr>
-        <p:spPr/>
-        <p:txBody>
-          <a:bodyPr/>
+        <p:spPr>
+          <a:xfrm>
+            <a:off x="431800" y="-152400"/>
+            <a:ext cx="8229600" cy="1143000"/>
+          </a:xfrm>
+        </p:spPr>
+        <p:txBody>
+          <a:bodyPr>
+            <a:normAutofit fontScale="90000"/>
+          </a:bodyPr>
           <a:lstStyle/>
           <a:p>
-            <a:r>
-              <a:rPr lang="en-US" dirty="0"/>
-              <a:t>Valid interface</a:t>
+            <a:pPr algn="l"/>
+            <a:r>
+              <a:rPr lang="en-US" dirty="0"/>
+              <a:t>Interface Types can replace class types</a:t>
             </a:r>
           </a:p>
         </p:txBody>
@@ -9346,79 +9366,174 @@
             <p:ph idx="1"/>
           </p:nvPr>
         </p:nvSpPr>
-        <p:spPr/>
+        <p:spPr>
+          <a:xfrm>
+            <a:off x="152400" y="838200"/>
+            <a:ext cx="8839200" cy="5867400"/>
+          </a:xfrm>
+        </p:spPr>
         <p:txBody>
           <a:bodyPr>
             <a:normAutofit/>
           </a:bodyPr>
           <a:lstStyle/>
           <a:p>
-            <a:pPr marL="0" indent="0">
-              <a:buNone/>
-            </a:pPr>
-            <a:r>
-              <a:rPr lang="en-US" dirty="0"/>
-              <a:t>public interface Pet{</a:t>
-            </a:r>
-          </a:p>
-          <a:p>
-            <a:pPr marL="0" indent="0">
-              <a:buNone/>
-            </a:pPr>
-            <a:r>
-              <a:rPr lang="en-US" dirty="0"/>
-              <a:t>    public void speak();</a:t>
-            </a:r>
-          </a:p>
-          <a:p>
-            <a:pPr marL="0" indent="0">
-              <a:buNone/>
-            </a:pPr>
-            <a:r>
-              <a:rPr lang="en-US" dirty="0"/>
-              <a:t>}</a:t>
-            </a:r>
-          </a:p>
-        </p:txBody>
-      </p:sp>
-      <p:sp>
-        <p:nvSpPr>
-          <p:cNvPr id="5" name="TextBox 4"/>
-          <p:cNvSpPr txBox="1"/>
-          <p:nvPr/>
-        </p:nvSpPr>
-        <p:spPr>
-          <a:xfrm>
-            <a:off x="2409388" y="4419600"/>
-            <a:ext cx="4325223" cy="523220"/>
-          </a:xfrm>
-          <a:prstGeom prst="rect">
-            <a:avLst/>
-          </a:prstGeom>
-          <a:noFill/>
-          <a:ln>
-            <a:solidFill>
-              <a:schemeClr val="tx1"/>
-            </a:solidFill>
-          </a:ln>
-        </p:spPr>
-        <p:txBody>
-          <a:bodyPr wrap="none" rtlCol="0">
-            <a:spAutoFit/>
-          </a:bodyPr>
-          <a:lstStyle/>
-          <a:p>
             <a:r>
               <a:rPr lang="en-US" sz="2800" dirty="0"/>
-              <a:t>What happened to name?</a:t>
-            </a:r>
+              <a:t>If Dog &amp; Cat implement the Pet interface:</a:t>
+            </a:r>
+          </a:p>
+          <a:p>
+            <a:pPr marL="971550" lvl="1" indent="-514350">
+              <a:buFont typeface="+mj-lt"/>
+              <a:buAutoNum type="arabicPeriod"/>
+            </a:pPr>
+            <a:r>
+              <a:rPr lang="en-US" dirty="0"/>
+              <a:t>Variable Declaration:</a:t>
+            </a:r>
+          </a:p>
+          <a:p>
+            <a:pPr lvl="2"/>
+            <a:r>
+              <a:rPr lang="en-US" dirty="0"/>
+              <a:t>Pet d = new Dog();	Pet c = new Cat();</a:t>
+            </a:r>
+          </a:p>
+          <a:p>
+            <a:pPr marL="971550" lvl="1" indent="-514350">
+              <a:buFont typeface="+mj-lt"/>
+              <a:buAutoNum type="arabicPeriod"/>
+            </a:pPr>
+            <a:r>
+              <a:rPr lang="en-US" dirty="0"/>
+              <a:t>Parameters:</a:t>
+            </a:r>
+          </a:p>
+          <a:p>
+            <a:pPr lvl="2"/>
+            <a:r>
+              <a:rPr lang="en-US" dirty="0"/>
+              <a:t>public static void </a:t>
+            </a:r>
+            <a:r>
+              <a:rPr lang="en-US" dirty="0" err="1"/>
+              <a:t>feedPet</a:t>
+            </a:r>
+            <a:r>
+              <a:rPr lang="en-US" dirty="0"/>
+              <a:t>(Pet p) {…}</a:t>
+            </a:r>
+            <a:br>
+              <a:rPr lang="en-US" dirty="0"/>
+            </a:br>
+            <a:r>
+              <a:rPr lang="en-US" dirty="0"/>
+              <a:t>Can call with any object of type Pet:</a:t>
+            </a:r>
+          </a:p>
+          <a:p>
+            <a:pPr lvl="2"/>
+            <a:r>
+              <a:rPr lang="en-US" dirty="0" err="1"/>
+              <a:t>feedPet</a:t>
+            </a:r>
+            <a:r>
+              <a:rPr lang="en-US" dirty="0"/>
+              <a:t>(new Dog());       </a:t>
+            </a:r>
+            <a:r>
+              <a:rPr lang="en-US" dirty="0" err="1"/>
+              <a:t>feedPet</a:t>
+            </a:r>
+            <a:r>
+              <a:rPr lang="en-US" dirty="0"/>
+              <a:t>(c); // from above</a:t>
+            </a:r>
+          </a:p>
+          <a:p>
+            <a:pPr marL="971550" lvl="1" indent="-514350">
+              <a:buFont typeface="+mj-lt"/>
+              <a:buAutoNum type="arabicPeriod" startAt="3"/>
+            </a:pPr>
+            <a:r>
+              <a:rPr lang="en-US" dirty="0"/>
+              <a:t>Fields:</a:t>
+            </a:r>
+          </a:p>
+          <a:p>
+            <a:pPr lvl="2"/>
+            <a:r>
+              <a:rPr lang="en-US" dirty="0"/>
+              <a:t>private Pet </a:t>
+            </a:r>
+            <a:r>
+              <a:rPr lang="en-US" dirty="0" err="1"/>
+              <a:t>pet</a:t>
+            </a:r>
+            <a:r>
+              <a:rPr lang="en-US" dirty="0"/>
+              <a:t>;</a:t>
+            </a:r>
+          </a:p>
+          <a:p>
+            <a:pPr marL="971550" lvl="1" indent="-514350">
+              <a:buFont typeface="+mj-lt"/>
+              <a:buAutoNum type="arabicPeriod" startAt="3"/>
+            </a:pPr>
+            <a:r>
+              <a:rPr lang="en-US" dirty="0"/>
+              <a:t>Generic Type Parameters:</a:t>
+            </a:r>
+          </a:p>
+          <a:p>
+            <a:pPr lvl="2"/>
+            <a:r>
+              <a:rPr lang="en-US" dirty="0" err="1"/>
+              <a:t>ArrayList</a:t>
+            </a:r>
+            <a:r>
+              <a:rPr lang="en-US" dirty="0"/>
+              <a:t>&lt;Pet&gt; pets = new </a:t>
+            </a:r>
+            <a:r>
+              <a:rPr lang="en-US" dirty="0" err="1"/>
+              <a:t>ArrayList</a:t>
+            </a:r>
+            <a:r>
+              <a:rPr lang="en-US" dirty="0"/>
+              <a:t>&lt;Pet&gt;();</a:t>
+            </a:r>
+          </a:p>
+          <a:p>
+            <a:pPr lvl="2"/>
+            <a:r>
+              <a:rPr lang="en-US" dirty="0" err="1"/>
+              <a:t>pets.add</a:t>
+            </a:r>
+            <a:r>
+              <a:rPr lang="en-US" dirty="0"/>
+              <a:t>(new Dog());    </a:t>
+            </a:r>
+            <a:r>
+              <a:rPr lang="en-US" dirty="0" err="1"/>
+              <a:t>pets.add</a:t>
+            </a:r>
+            <a:r>
+              <a:rPr lang="en-US" dirty="0"/>
+              <a:t>(new Cat());</a:t>
+            </a:r>
+          </a:p>
+          <a:p>
+            <a:pPr lvl="1"/>
+            <a:endParaRPr lang="en-US" dirty="0"/>
           </a:p>
         </p:txBody>
       </p:sp>
     </p:spTree>
     <p:extLst>
       <p:ext uri="{BB962C8B-B14F-4D97-AF65-F5344CB8AC3E}">
-        <p14:creationId xmlns:p14="http://schemas.microsoft.com/office/powerpoint/2010/main" val="641702362"/>
+        <p14:creationId xmlns:p14="http://schemas.microsoft.com/office/powerpoint/2010/main" val="2010889198"/>
       </p:ext>
     </p:extLst>
   </p:cSld>
@@ -9462,6 +9577,347 @@
           <a:p>
             <a:r>
               <a:rPr lang="en-US" dirty="0"/>
+              <a:t>Check your understanding…</a:t>
+            </a:r>
+          </a:p>
+        </p:txBody>
+      </p:sp>
+      <p:sp>
+        <p:nvSpPr>
+          <p:cNvPr id="3" name="Content Placeholder 2"/>
+          <p:cNvSpPr>
+            <a:spLocks noGrp="1"/>
+          </p:cNvSpPr>
+          <p:nvPr>
+            <p:ph idx="1"/>
+          </p:nvPr>
+        </p:nvSpPr>
+        <p:spPr>
+          <a:xfrm>
+            <a:off x="457200" y="1600200"/>
+            <a:ext cx="8229600" cy="4953000"/>
+          </a:xfrm>
+        </p:spPr>
+        <p:txBody>
+          <a:bodyPr>
+            <a:normAutofit fontScale="85000" lnSpcReduction="20000"/>
+          </a:bodyPr>
+          <a:lstStyle/>
+          <a:p>
+            <a:pPr marL="0" indent="0">
+              <a:buNone/>
+            </a:pPr>
+            <a:r>
+              <a:rPr lang="en-US" dirty="0"/>
+              <a:t>public interface Pet{</a:t>
+            </a:r>
+          </a:p>
+          <a:p>
+            <a:pPr marL="0" indent="0">
+              <a:buNone/>
+            </a:pPr>
+            <a:r>
+              <a:rPr lang="en-US" dirty="0"/>
+              <a:t>    private String name;</a:t>
+            </a:r>
+          </a:p>
+          <a:p>
+            <a:pPr marL="0" indent="0">
+              <a:buNone/>
+            </a:pPr>
+            <a:endParaRPr lang="en-US" dirty="0"/>
+          </a:p>
+          <a:p>
+            <a:pPr marL="0" indent="0">
+              <a:buNone/>
+            </a:pPr>
+            <a:r>
+              <a:rPr lang="en-US" dirty="0"/>
+              <a:t>    public Pet(String name){</a:t>
+            </a:r>
+          </a:p>
+          <a:p>
+            <a:pPr marL="0" indent="0">
+              <a:buNone/>
+            </a:pPr>
+            <a:r>
+              <a:rPr lang="en-US" dirty="0"/>
+              <a:t>        this.name = name;</a:t>
+            </a:r>
+          </a:p>
+          <a:p>
+            <a:pPr marL="0" indent="0">
+              <a:buNone/>
+            </a:pPr>
+            <a:r>
+              <a:rPr lang="en-US" dirty="0"/>
+              <a:t>    }</a:t>
+            </a:r>
+          </a:p>
+          <a:p>
+            <a:pPr marL="0" indent="0">
+              <a:buNone/>
+            </a:pPr>
+            <a:endParaRPr lang="en-US" dirty="0"/>
+          </a:p>
+          <a:p>
+            <a:pPr marL="0" indent="0">
+              <a:buNone/>
+            </a:pPr>
+            <a:r>
+              <a:rPr lang="en-US" dirty="0"/>
+              <a:t>    public void speak(){</a:t>
+            </a:r>
+          </a:p>
+          <a:p>
+            <a:pPr marL="0" indent="0">
+              <a:buNone/>
+            </a:pPr>
+            <a:r>
+              <a:rPr lang="en-US" dirty="0"/>
+              <a:t>        </a:t>
+            </a:r>
+            <a:r>
+              <a:rPr lang="en-US" dirty="0" err="1"/>
+              <a:t>System.out.println</a:t>
+            </a:r>
+            <a:r>
+              <a:rPr lang="en-US" dirty="0"/>
+              <a:t>(name);</a:t>
+            </a:r>
+          </a:p>
+          <a:p>
+            <a:pPr marL="0" indent="0">
+              <a:buNone/>
+            </a:pPr>
+            <a:r>
+              <a:rPr lang="en-US" dirty="0"/>
+              <a:t>    }</a:t>
+            </a:r>
+          </a:p>
+          <a:p>
+            <a:pPr marL="0" indent="0">
+              <a:buNone/>
+            </a:pPr>
+            <a:r>
+              <a:rPr lang="en-US" dirty="0"/>
+              <a:t>}</a:t>
+            </a:r>
+          </a:p>
+        </p:txBody>
+      </p:sp>
+      <p:sp>
+        <p:nvSpPr>
+          <p:cNvPr id="4" name="TextBox 3"/>
+          <p:cNvSpPr txBox="1"/>
+          <p:nvPr/>
+        </p:nvSpPr>
+        <p:spPr>
+          <a:xfrm>
+            <a:off x="1362627" y="5638800"/>
+            <a:ext cx="6418745" cy="523220"/>
+          </a:xfrm>
+          <a:prstGeom prst="rect">
+            <a:avLst/>
+          </a:prstGeom>
+          <a:noFill/>
+          <a:ln>
+            <a:solidFill>
+              <a:schemeClr val="tx1"/>
+            </a:solidFill>
+          </a:ln>
+        </p:spPr>
+        <p:txBody>
+          <a:bodyPr wrap="none" rtlCol="0">
+            <a:spAutoFit/>
+          </a:bodyPr>
+          <a:lstStyle/>
+          <a:p>
+            <a:r>
+              <a:rPr lang="en-US" sz="2800" dirty="0"/>
+              <a:t>Is this interface valid? Why or why not?</a:t>
+            </a:r>
+          </a:p>
+        </p:txBody>
+      </p:sp>
+    </p:spTree>
+    <p:extLst>
+      <p:ext uri="{BB962C8B-B14F-4D97-AF65-F5344CB8AC3E}">
+        <p14:creationId xmlns:p14="http://schemas.microsoft.com/office/powerpoint/2010/main" val="1781697480"/>
+      </p:ext>
+    </p:extLst>
+  </p:cSld>
+  <p:clrMapOvr>
+    <a:masterClrMapping/>
+  </p:clrMapOvr>
+</p:sld>
+</file>
+
+<file path=ppt/slides/slide17.xml><?xml version="1.0" encoding="utf-8"?>
+<p:sld xmlns:a="http://schemas.openxmlformats.org/drawingml/2006/main" xmlns:r="http://schemas.openxmlformats.org/officeDocument/2006/relationships" xmlns:p="http://schemas.openxmlformats.org/presentationml/2006/main">
+  <p:cSld>
+    <p:spTree>
+      <p:nvGrpSpPr>
+        <p:cNvPr id="1" name=""/>
+        <p:cNvGrpSpPr/>
+        <p:nvPr/>
+      </p:nvGrpSpPr>
+      <p:grpSpPr>
+        <a:xfrm>
+          <a:off x="0" y="0"/>
+          <a:ext cx="0" cy="0"/>
+          <a:chOff x="0" y="0"/>
+          <a:chExt cx="0" cy="0"/>
+        </a:xfrm>
+      </p:grpSpPr>
+      <p:sp>
+        <p:nvSpPr>
+          <p:cNvPr id="2" name="Title 1"/>
+          <p:cNvSpPr>
+            <a:spLocks noGrp="1"/>
+          </p:cNvSpPr>
+          <p:nvPr>
+            <p:ph type="title"/>
+          </p:nvPr>
+        </p:nvSpPr>
+        <p:spPr/>
+        <p:txBody>
+          <a:bodyPr/>
+          <a:lstStyle/>
+          <a:p>
+            <a:r>
+              <a:rPr lang="en-US" dirty="0"/>
+              <a:t>Valid interface</a:t>
+            </a:r>
+          </a:p>
+        </p:txBody>
+      </p:sp>
+      <p:sp>
+        <p:nvSpPr>
+          <p:cNvPr id="3" name="Content Placeholder 2"/>
+          <p:cNvSpPr>
+            <a:spLocks noGrp="1"/>
+          </p:cNvSpPr>
+          <p:nvPr>
+            <p:ph idx="1"/>
+          </p:nvPr>
+        </p:nvSpPr>
+        <p:spPr/>
+        <p:txBody>
+          <a:bodyPr>
+            <a:normAutofit/>
+          </a:bodyPr>
+          <a:lstStyle/>
+          <a:p>
+            <a:pPr marL="0" indent="0">
+              <a:buNone/>
+            </a:pPr>
+            <a:r>
+              <a:rPr lang="en-US" dirty="0"/>
+              <a:t>public interface Pet{</a:t>
+            </a:r>
+          </a:p>
+          <a:p>
+            <a:pPr marL="0" indent="0">
+              <a:buNone/>
+            </a:pPr>
+            <a:r>
+              <a:rPr lang="en-US" dirty="0"/>
+              <a:t>    public void speak();</a:t>
+            </a:r>
+          </a:p>
+          <a:p>
+            <a:pPr marL="0" indent="0">
+              <a:buNone/>
+            </a:pPr>
+            <a:r>
+              <a:rPr lang="en-US" dirty="0"/>
+              <a:t>}</a:t>
+            </a:r>
+          </a:p>
+        </p:txBody>
+      </p:sp>
+      <p:sp>
+        <p:nvSpPr>
+          <p:cNvPr id="5" name="TextBox 4"/>
+          <p:cNvSpPr txBox="1"/>
+          <p:nvPr/>
+        </p:nvSpPr>
+        <p:spPr>
+          <a:xfrm>
+            <a:off x="2409388" y="4419600"/>
+            <a:ext cx="4325223" cy="523220"/>
+          </a:xfrm>
+          <a:prstGeom prst="rect">
+            <a:avLst/>
+          </a:prstGeom>
+          <a:noFill/>
+          <a:ln>
+            <a:solidFill>
+              <a:schemeClr val="tx1"/>
+            </a:solidFill>
+          </a:ln>
+        </p:spPr>
+        <p:txBody>
+          <a:bodyPr wrap="none" rtlCol="0">
+            <a:spAutoFit/>
+          </a:bodyPr>
+          <a:lstStyle/>
+          <a:p>
+            <a:r>
+              <a:rPr lang="en-US" sz="2800" dirty="0"/>
+              <a:t>What happened to name?</a:t>
+            </a:r>
+          </a:p>
+        </p:txBody>
+      </p:sp>
+    </p:spTree>
+    <p:extLst>
+      <p:ext uri="{BB962C8B-B14F-4D97-AF65-F5344CB8AC3E}">
+        <p14:creationId xmlns:p14="http://schemas.microsoft.com/office/powerpoint/2010/main" val="641702362"/>
+      </p:ext>
+    </p:extLst>
+  </p:cSld>
+  <p:clrMapOvr>
+    <a:masterClrMapping/>
+  </p:clrMapOvr>
+</p:sld>
+</file>
+
+<file path=ppt/slides/slide18.xml><?xml version="1.0" encoding="utf-8"?>
+<p:sld xmlns:a="http://schemas.openxmlformats.org/drawingml/2006/main" xmlns:r="http://schemas.openxmlformats.org/officeDocument/2006/relationships" xmlns:p="http://schemas.openxmlformats.org/presentationml/2006/main">
+  <p:cSld>
+    <p:spTree>
+      <p:nvGrpSpPr>
+        <p:cNvPr id="1" name=""/>
+        <p:cNvGrpSpPr/>
+        <p:nvPr/>
+      </p:nvGrpSpPr>
+      <p:grpSpPr>
+        <a:xfrm>
+          <a:off x="0" y="0"/>
+          <a:ext cx="0" cy="0"/>
+          <a:chOff x="0" y="0"/>
+          <a:chExt cx="0" cy="0"/>
+        </a:xfrm>
+      </p:grpSpPr>
+      <p:sp>
+        <p:nvSpPr>
+          <p:cNvPr id="2" name="Title 1"/>
+          <p:cNvSpPr>
+            <a:spLocks noGrp="1"/>
+          </p:cNvSpPr>
+          <p:nvPr>
+            <p:ph type="title"/>
+          </p:nvPr>
+        </p:nvSpPr>
+        <p:spPr/>
+        <p:txBody>
+          <a:bodyPr/>
+          <a:lstStyle/>
+          <a:p>
+            <a:r>
+              <a:rPr lang="en-US" dirty="0"/>
               <a:t>A valid Pet with a name</a:t>
             </a:r>
           </a:p>
@@ -9604,7 +10060,7 @@
 </p:sld>
 </file>
 
-<file path=ppt/slides/slide17.xml><?xml version="1.0" encoding="utf-8"?>
+<file path=ppt/slides/slide19.xml><?xml version="1.0" encoding="utf-8"?>
 <p:sld xmlns:a="http://schemas.openxmlformats.org/drawingml/2006/main" xmlns:r="http://schemas.openxmlformats.org/officeDocument/2006/relationships" xmlns:p="http://schemas.openxmlformats.org/presentationml/2006/main">
   <p:cSld>
     <p:spTree>
@@ -10051,7 +10507,7 @@
 </p:sld>
 </file>
 
-<file path=ppt/slides/slide18.xml><?xml version="1.0" encoding="utf-8"?>
+<file path=ppt/slides/slide2.xml><?xml version="1.0" encoding="utf-8"?>
 <p:sld xmlns:a="http://schemas.openxmlformats.org/drawingml/2006/main" xmlns:r="http://schemas.openxmlformats.org/officeDocument/2006/relationships" xmlns:p="http://schemas.openxmlformats.org/presentationml/2006/main">
   <p:cSld>
     <p:spTree>
@@ -10084,6 +10540,117 @@
           <a:lstStyle/>
           <a:p>
             <a:r>
+              <a:rPr lang="en-US" dirty="0"/>
+              <a:t>Object-Oriented Programming</a:t>
+            </a:r>
+          </a:p>
+        </p:txBody>
+      </p:sp>
+      <p:sp>
+        <p:nvSpPr>
+          <p:cNvPr id="3" name="Content Placeholder 2"/>
+          <p:cNvSpPr>
+            <a:spLocks noGrp="1"/>
+          </p:cNvSpPr>
+          <p:nvPr>
+            <p:ph idx="1"/>
+          </p:nvPr>
+        </p:nvSpPr>
+        <p:spPr/>
+        <p:txBody>
+          <a:bodyPr/>
+          <a:lstStyle/>
+          <a:p>
+            <a:r>
+              <a:rPr lang="en-US" dirty="0"/>
+              <a:t>The </a:t>
+            </a:r>
+            <a:r>
+              <a:rPr lang="en-US" b="1" dirty="0"/>
+              <a:t>three pillars </a:t>
+            </a:r>
+            <a:r>
+              <a:rPr lang="en-US" dirty="0"/>
+              <a:t>of </a:t>
+            </a:r>
+            <a:r>
+              <a:rPr lang="en-US" b="1" dirty="0"/>
+              <a:t>Object-Oriented Programming</a:t>
+            </a:r>
+          </a:p>
+          <a:p>
+            <a:pPr lvl="1"/>
+            <a:r>
+              <a:rPr lang="en-US" dirty="0"/>
+              <a:t>Encapsulation (already covered)</a:t>
+            </a:r>
+          </a:p>
+          <a:p>
+            <a:pPr lvl="1"/>
+            <a:r>
+              <a:rPr lang="en-US" dirty="0"/>
+              <a:t>Polymorphism (start idea today)</a:t>
+            </a:r>
+          </a:p>
+          <a:p>
+            <a:pPr lvl="1"/>
+            <a:r>
+              <a:rPr lang="en-US" dirty="0"/>
+              <a:t>Inheritance (next week)</a:t>
+            </a:r>
+          </a:p>
+          <a:p>
+            <a:pPr lvl="1"/>
+            <a:endParaRPr lang="en-US" dirty="0"/>
+          </a:p>
+        </p:txBody>
+      </p:sp>
+    </p:spTree>
+    <p:extLst>
+      <p:ext uri="{BB962C8B-B14F-4D97-AF65-F5344CB8AC3E}">
+        <p14:creationId xmlns:p14="http://schemas.microsoft.com/office/powerpoint/2010/main" val="1779397205"/>
+      </p:ext>
+    </p:extLst>
+  </p:cSld>
+  <p:clrMapOvr>
+    <a:masterClrMapping/>
+  </p:clrMapOvr>
+</p:sld>
+</file>
+
+<file path=ppt/slides/slide20.xml><?xml version="1.0" encoding="utf-8"?>
+<p:sld xmlns:a="http://schemas.openxmlformats.org/drawingml/2006/main" xmlns:r="http://schemas.openxmlformats.org/officeDocument/2006/relationships" xmlns:p="http://schemas.openxmlformats.org/presentationml/2006/main">
+  <p:cSld>
+    <p:spTree>
+      <p:nvGrpSpPr>
+        <p:cNvPr id="1" name=""/>
+        <p:cNvGrpSpPr/>
+        <p:nvPr/>
+      </p:nvGrpSpPr>
+      <p:grpSpPr>
+        <a:xfrm>
+          <a:off x="0" y="0"/>
+          <a:ext cx="0" cy="0"/>
+          <a:chOff x="0" y="0"/>
+          <a:chExt cx="0" cy="0"/>
+        </a:xfrm>
+      </p:grpSpPr>
+      <p:sp>
+        <p:nvSpPr>
+          <p:cNvPr id="2" name="Title 1"/>
+          <p:cNvSpPr>
+            <a:spLocks noGrp="1"/>
+          </p:cNvSpPr>
+          <p:nvPr>
+            <p:ph type="title"/>
+          </p:nvPr>
+        </p:nvSpPr>
+        <p:spPr/>
+        <p:txBody>
+          <a:bodyPr/>
+          <a:lstStyle/>
+          <a:p>
+            <a:r>
               <a:rPr lang="en-US" dirty="0" err="1"/>
               <a:t>NumberSequence</a:t>
             </a:r>
@@ -10126,7 +10693,7 @@
 </p:sld>
 </file>
 
-<file path=ppt/slides/slide19.xml><?xml version="1.0" encoding="utf-8"?>
+<file path=ppt/slides/slide21.xml><?xml version="1.0" encoding="utf-8"?>
 <p:sld xmlns:a="http://schemas.openxmlformats.org/drawingml/2006/main" xmlns:r="http://schemas.openxmlformats.org/officeDocument/2006/relationships" xmlns:p="http://schemas.openxmlformats.org/presentationml/2006/main">
   <p:cSld>
     <p:spTree>
@@ -10430,118 +10997,7 @@
 </p:sld>
 </file>
 
-<file path=ppt/slides/slide2.xml><?xml version="1.0" encoding="utf-8"?>
-<p:sld xmlns:a="http://schemas.openxmlformats.org/drawingml/2006/main" xmlns:r="http://schemas.openxmlformats.org/officeDocument/2006/relationships" xmlns:p="http://schemas.openxmlformats.org/presentationml/2006/main">
-  <p:cSld>
-    <p:spTree>
-      <p:nvGrpSpPr>
-        <p:cNvPr id="1" name=""/>
-        <p:cNvGrpSpPr/>
-        <p:nvPr/>
-      </p:nvGrpSpPr>
-      <p:grpSpPr>
-        <a:xfrm>
-          <a:off x="0" y="0"/>
-          <a:ext cx="0" cy="0"/>
-          <a:chOff x="0" y="0"/>
-          <a:chExt cx="0" cy="0"/>
-        </a:xfrm>
-      </p:grpSpPr>
-      <p:sp>
-        <p:nvSpPr>
-          <p:cNvPr id="2" name="Title 1"/>
-          <p:cNvSpPr>
-            <a:spLocks noGrp="1"/>
-          </p:cNvSpPr>
-          <p:nvPr>
-            <p:ph type="title"/>
-          </p:nvPr>
-        </p:nvSpPr>
-        <p:spPr/>
-        <p:txBody>
-          <a:bodyPr/>
-          <a:lstStyle/>
-          <a:p>
-            <a:r>
-              <a:rPr lang="en-US" dirty="0"/>
-              <a:t>Object-Oriented Programming</a:t>
-            </a:r>
-          </a:p>
-        </p:txBody>
-      </p:sp>
-      <p:sp>
-        <p:nvSpPr>
-          <p:cNvPr id="3" name="Content Placeholder 2"/>
-          <p:cNvSpPr>
-            <a:spLocks noGrp="1"/>
-          </p:cNvSpPr>
-          <p:nvPr>
-            <p:ph idx="1"/>
-          </p:nvPr>
-        </p:nvSpPr>
-        <p:spPr/>
-        <p:txBody>
-          <a:bodyPr/>
-          <a:lstStyle/>
-          <a:p>
-            <a:r>
-              <a:rPr lang="en-US" dirty="0"/>
-              <a:t>The </a:t>
-            </a:r>
-            <a:r>
-              <a:rPr lang="en-US" b="1" dirty="0"/>
-              <a:t>three pillars </a:t>
-            </a:r>
-            <a:r>
-              <a:rPr lang="en-US" dirty="0"/>
-              <a:t>of </a:t>
-            </a:r>
-            <a:r>
-              <a:rPr lang="en-US" b="1" dirty="0"/>
-              <a:t>Object-Oriented Programming</a:t>
-            </a:r>
-          </a:p>
-          <a:p>
-            <a:pPr lvl="1"/>
-            <a:r>
-              <a:rPr lang="en-US" dirty="0"/>
-              <a:t>Encapsulation (already covered)</a:t>
-            </a:r>
-          </a:p>
-          <a:p>
-            <a:pPr lvl="1"/>
-            <a:r>
-              <a:rPr lang="en-US" dirty="0"/>
-              <a:t>Polymorphism (start idea today)</a:t>
-            </a:r>
-          </a:p>
-          <a:p>
-            <a:pPr lvl="1"/>
-            <a:r>
-              <a:rPr lang="en-US" dirty="0"/>
-              <a:t>Inheritance (next week)</a:t>
-            </a:r>
-          </a:p>
-          <a:p>
-            <a:pPr lvl="1"/>
-            <a:endParaRPr lang="en-US" dirty="0"/>
-          </a:p>
-        </p:txBody>
-      </p:sp>
-    </p:spTree>
-    <p:extLst>
-      <p:ext uri="{BB962C8B-B14F-4D97-AF65-F5344CB8AC3E}">
-        <p14:creationId xmlns:p14="http://schemas.microsoft.com/office/powerpoint/2010/main" val="1779397205"/>
-      </p:ext>
-    </p:extLst>
-  </p:cSld>
-  <p:clrMapOvr>
-    <a:masterClrMapping/>
-  </p:clrMapOvr>
-</p:sld>
-</file>
-
-<file path=ppt/slides/slide20.xml><?xml version="1.0" encoding="utf-8"?>
+<file path=ppt/slides/slide22.xml><?xml version="1.0" encoding="utf-8"?>
 <p:sld xmlns:a="http://schemas.openxmlformats.org/drawingml/2006/main" xmlns:r="http://schemas.openxmlformats.org/officeDocument/2006/relationships" xmlns:p="http://schemas.openxmlformats.org/presentationml/2006/main">
   <p:cSld>
     <p:spTree>
@@ -10685,7 +11141,7 @@
 </p:sld>
 </file>
 
-<file path=ppt/slides/slide21.xml><?xml version="1.0" encoding="utf-8"?>
+<file path=ppt/slides/slide23.xml><?xml version="1.0" encoding="utf-8"?>
 <p:sld xmlns:a="http://schemas.openxmlformats.org/drawingml/2006/main" xmlns:r="http://schemas.openxmlformats.org/officeDocument/2006/relationships" xmlns:p="http://schemas.openxmlformats.org/presentationml/2006/main">
   <p:cSld>
     <p:spTree>
@@ -11286,7 +11742,7 @@
 </p:sld>
 </file>
 
-<file path=ppt/slides/slide22.xml><?xml version="1.0" encoding="utf-8"?>
+<file path=ppt/slides/slide24.xml><?xml version="1.0" encoding="utf-8"?>
 <p:sld xmlns:a="http://schemas.openxmlformats.org/drawingml/2006/main" xmlns:r="http://schemas.openxmlformats.org/officeDocument/2006/relationships" xmlns:p="http://schemas.openxmlformats.org/presentationml/2006/main">
   <p:cSld>
     <p:spTree>
@@ -11665,7 +12121,7 @@
 </p:sld>
 </file>
 
-<file path=ppt/slides/slide23.xml><?xml version="1.0" encoding="utf-8"?>
+<file path=ppt/slides/slide25.xml><?xml version="1.0" encoding="utf-8"?>
 <p:sld xmlns:a="http://schemas.openxmlformats.org/drawingml/2006/main" xmlns:r="http://schemas.openxmlformats.org/officeDocument/2006/relationships" xmlns:p="http://schemas.openxmlformats.org/presentationml/2006/main">
   <p:cSld>
     <p:spTree>
@@ -11865,7 +12321,7 @@
 </p:sld>
 </file>
 
-<file path=ppt/slides/slide24.xml><?xml version="1.0" encoding="utf-8"?>
+<file path=ppt/slides/slide26.xml><?xml version="1.0" encoding="utf-8"?>
 <p:sld xmlns:a="http://schemas.openxmlformats.org/drawingml/2006/main" xmlns:r="http://schemas.openxmlformats.org/officeDocument/2006/relationships" xmlns:p="http://schemas.openxmlformats.org/presentationml/2006/main">
   <p:cSld>
     <p:spTree>

</xml_diff>

<commit_message>
added slide on Annotations
</commit_message>
<xml_diff>
--- a/ClassMaterials/Interfaces/Slides/Interfaces.pptx
+++ b/ClassMaterials/Interfaces/Slides/Interfaces.pptx
@@ -5,10 +5,10 @@
     <p:sldMasterId id="2147484251" r:id="rId1"/>
   </p:sldMasterIdLst>
   <p:notesMasterIdLst>
-    <p:notesMasterId r:id="rId29"/>
+    <p:notesMasterId r:id="rId30"/>
   </p:notesMasterIdLst>
   <p:handoutMasterIdLst>
-    <p:handoutMasterId r:id="rId30"/>
+    <p:handoutMasterId r:id="rId31"/>
   </p:handoutMasterIdLst>
   <p:sldIdLst>
     <p:sldId id="256" r:id="rId2"/>
@@ -17,27 +17,28 @@
     <p:sldId id="290" r:id="rId5"/>
     <p:sldId id="297" r:id="rId6"/>
     <p:sldId id="298" r:id="rId7"/>
-    <p:sldId id="299" r:id="rId8"/>
-    <p:sldId id="300" r:id="rId9"/>
-    <p:sldId id="291" r:id="rId10"/>
-    <p:sldId id="301" r:id="rId11"/>
-    <p:sldId id="302" r:id="rId12"/>
-    <p:sldId id="303" r:id="rId13"/>
-    <p:sldId id="307" r:id="rId14"/>
-    <p:sldId id="292" r:id="rId15"/>
-    <p:sldId id="304" r:id="rId16"/>
-    <p:sldId id="305" r:id="rId17"/>
-    <p:sldId id="306" r:id="rId18"/>
-    <p:sldId id="293" r:id="rId19"/>
-    <p:sldId id="294" r:id="rId20"/>
-    <p:sldId id="295" r:id="rId21"/>
-    <p:sldId id="296" r:id="rId22"/>
-    <p:sldId id="272" r:id="rId23"/>
-    <p:sldId id="273" r:id="rId24"/>
-    <p:sldId id="288" r:id="rId25"/>
-    <p:sldId id="274" r:id="rId26"/>
-    <p:sldId id="282" r:id="rId27"/>
-    <p:sldId id="275" r:id="rId28"/>
+    <p:sldId id="308" r:id="rId8"/>
+    <p:sldId id="299" r:id="rId9"/>
+    <p:sldId id="300" r:id="rId10"/>
+    <p:sldId id="291" r:id="rId11"/>
+    <p:sldId id="301" r:id="rId12"/>
+    <p:sldId id="302" r:id="rId13"/>
+    <p:sldId id="303" r:id="rId14"/>
+    <p:sldId id="307" r:id="rId15"/>
+    <p:sldId id="292" r:id="rId16"/>
+    <p:sldId id="304" r:id="rId17"/>
+    <p:sldId id="305" r:id="rId18"/>
+    <p:sldId id="306" r:id="rId19"/>
+    <p:sldId id="293" r:id="rId20"/>
+    <p:sldId id="294" r:id="rId21"/>
+    <p:sldId id="295" r:id="rId22"/>
+    <p:sldId id="296" r:id="rId23"/>
+    <p:sldId id="272" r:id="rId24"/>
+    <p:sldId id="273" r:id="rId25"/>
+    <p:sldId id="288" r:id="rId26"/>
+    <p:sldId id="274" r:id="rId27"/>
+    <p:sldId id="282" r:id="rId28"/>
+    <p:sldId id="275" r:id="rId29"/>
   </p:sldIdLst>
   <p:sldSz cx="9144000" cy="6858000" type="screen4x3"/>
   <p:notesSz cx="7010400" cy="9296400"/>
@@ -302,7 +303,7 @@
               <a:pPr>
                 <a:defRPr/>
               </a:pPr>
-              <a:t>3/1/22</a:t>
+              <a:t>4/12/22</a:t>
             </a:fld>
             <a:endParaRPr lang="en-US"/>
           </a:p>
@@ -537,7 +538,7 @@
               <a:pPr>
                 <a:defRPr/>
               </a:pPr>
-              <a:t>3/1/22</a:t>
+              <a:t>4/12/22</a:t>
             </a:fld>
             <a:endParaRPr lang="en-US"/>
           </a:p>
@@ -920,7 +921,7 @@
           </a:ln>
           <a:extLst>
             <a:ext uri="{909E8E84-426E-40dd-AFC4-6F175D3DCCD1}">
-              <a14:hiddenFill xmlns="" xmlns:a14="http://schemas.microsoft.com/office/drawing/2010/main">
+              <a14:hiddenFill xmlns:a14="http://schemas.microsoft.com/office/drawing/2010/main" xmlns="">
                 <a:solidFill>
                   <a:srgbClr val="FFFFFF"/>
                 </a:solidFill>
@@ -944,14 +945,14 @@
           <a:ln/>
           <a:extLst>
             <a:ext uri="{909E8E84-426E-40dd-AFC4-6F175D3DCCD1}">
-              <a14:hiddenFill xmlns="" xmlns:a14="http://schemas.microsoft.com/office/drawing/2010/main">
+              <a14:hiddenFill xmlns:a14="http://schemas.microsoft.com/office/drawing/2010/main" xmlns="">
                 <a:solidFill>
                   <a:srgbClr val="FFFFFF"/>
                 </a:solidFill>
               </a14:hiddenFill>
             </a:ext>
             <a:ext uri="{91240B29-F687-4f45-9708-019B960494DF}">
-              <a14:hiddenLine xmlns="" xmlns:a14="http://schemas.microsoft.com/office/drawing/2010/main" w="9525">
+              <a14:hiddenLine xmlns:a14="http://schemas.microsoft.com/office/drawing/2010/main" xmlns="" w="9525">
                 <a:solidFill>
                   <a:srgbClr val="000000"/>
                 </a:solidFill>
@@ -1115,14 +1116,14 @@
           <a:ln/>
           <a:extLst>
             <a:ext uri="{909E8E84-426E-40dd-AFC4-6F175D3DCCD1}">
-              <a14:hiddenFill xmlns="" xmlns:a14="http://schemas.microsoft.com/office/drawing/2010/main">
+              <a14:hiddenFill xmlns:a14="http://schemas.microsoft.com/office/drawing/2010/main" xmlns="">
                 <a:solidFill>
                   <a:srgbClr val="FFFFFF"/>
                 </a:solidFill>
               </a14:hiddenFill>
             </a:ext>
             <a:ext uri="{91240B29-F687-4f45-9708-019B960494DF}">
-              <a14:hiddenLine xmlns="" xmlns:a14="http://schemas.microsoft.com/office/drawing/2010/main" w="9525">
+              <a14:hiddenLine xmlns:a14="http://schemas.microsoft.com/office/drawing/2010/main" xmlns="" w="9525">
                 <a:solidFill>
                   <a:srgbClr val="000000"/>
                 </a:solidFill>
@@ -1289,6 +1290,110 @@
       </p:grpSpPr>
       <p:sp>
         <p:nvSpPr>
+          <p:cNvPr id="2" name="Slide Image Placeholder 1"/>
+          <p:cNvSpPr>
+            <a:spLocks noGrp="1" noRot="1" noChangeAspect="1"/>
+          </p:cNvSpPr>
+          <p:nvPr>
+            <p:ph type="sldImg"/>
+          </p:nvPr>
+        </p:nvSpPr>
+        <p:spPr/>
+      </p:sp>
+      <p:sp>
+        <p:nvSpPr>
+          <p:cNvPr id="3" name="Notes Placeholder 2"/>
+          <p:cNvSpPr>
+            <a:spLocks noGrp="1"/>
+          </p:cNvSpPr>
+          <p:nvPr>
+            <p:ph type="body" idx="1"/>
+          </p:nvPr>
+        </p:nvSpPr>
+        <p:spPr/>
+        <p:txBody>
+          <a:bodyPr/>
+          <a:lstStyle/>
+          <a:p>
+            <a:r>
+              <a:rPr lang="en-US" dirty="0"/>
+              <a:t>Imagine</a:t>
+            </a:r>
+            <a:r>
+              <a:rPr lang="en-US" baseline="0" dirty="0"/>
+              <a:t> three different people developed these three classes. We have a scale simulator where we write code to compare/weigh things. </a:t>
+            </a:r>
+          </a:p>
+          <a:p>
+            <a:r>
+              <a:rPr lang="en-US" baseline="0" dirty="0"/>
+              <a:t>What if we wanted to compare all of them at the same time? </a:t>
+            </a:r>
+            <a:endParaRPr lang="en-US" dirty="0"/>
+          </a:p>
+        </p:txBody>
+      </p:sp>
+      <p:sp>
+        <p:nvSpPr>
+          <p:cNvPr id="4" name="Slide Number Placeholder 3"/>
+          <p:cNvSpPr>
+            <a:spLocks noGrp="1"/>
+          </p:cNvSpPr>
+          <p:nvPr>
+            <p:ph type="sldNum" sz="quarter" idx="10"/>
+          </p:nvPr>
+        </p:nvSpPr>
+        <p:spPr/>
+        <p:txBody>
+          <a:bodyPr/>
+          <a:lstStyle/>
+          <a:p>
+            <a:pPr>
+              <a:defRPr/>
+            </a:pPr>
+            <a:fld id="{3F6B6C2D-0897-4206-AD94-4D1FCFA82106}" type="slidenum">
+              <a:rPr lang="en-US" smtClean="0"/>
+              <a:pPr>
+                <a:defRPr/>
+              </a:pPr>
+              <a:t>11</a:t>
+            </a:fld>
+            <a:endParaRPr lang="en-US"/>
+          </a:p>
+        </p:txBody>
+      </p:sp>
+    </p:spTree>
+    <p:extLst>
+      <p:ext uri="{BB962C8B-B14F-4D97-AF65-F5344CB8AC3E}">
+        <p14:creationId xmlns:p14="http://schemas.microsoft.com/office/powerpoint/2010/main" val="3729646274"/>
+      </p:ext>
+    </p:extLst>
+  </p:cSld>
+  <p:clrMapOvr>
+    <a:masterClrMapping/>
+  </p:clrMapOvr>
+</p:notes>
+</file>
+
+<file path=ppt/notesSlides/notesSlide11.xml><?xml version="1.0" encoding="utf-8"?>
+<p:notes xmlns:a="http://schemas.openxmlformats.org/drawingml/2006/main" xmlns:r="http://schemas.openxmlformats.org/officeDocument/2006/relationships" xmlns:p="http://schemas.openxmlformats.org/presentationml/2006/main">
+  <p:cSld>
+    <p:spTree>
+      <p:nvGrpSpPr>
+        <p:cNvPr id="1" name=""/>
+        <p:cNvGrpSpPr/>
+        <p:nvPr/>
+      </p:nvGrpSpPr>
+      <p:grpSpPr>
+        <a:xfrm>
+          <a:off x="0" y="0"/>
+          <a:ext cx="0" cy="0"/>
+          <a:chOff x="0" y="0"/>
+          <a:chExt cx="0" cy="0"/>
+        </a:xfrm>
+      </p:grpSpPr>
+      <p:sp>
+        <p:nvSpPr>
           <p:cNvPr id="50178" name="Slide Image Placeholder 1"/>
           <p:cNvSpPr>
             <a:spLocks noGrp="1" noRot="1" noChangeAspect="1" noTextEdit="1"/>
@@ -1309,7 +1414,7 @@
           </a:ln>
           <a:extLst>
             <a:ext uri="{909E8E84-426E-40dd-AFC4-6F175D3DCCD1}">
-              <a14:hiddenFill xmlns="" xmlns:a14="http://schemas.microsoft.com/office/drawing/2010/main">
+              <a14:hiddenFill xmlns:a14="http://schemas.microsoft.com/office/drawing/2010/main" xmlns="">
                 <a:solidFill>
                   <a:srgbClr val="FFFFFF"/>
                 </a:solidFill>
@@ -1333,14 +1438,14 @@
           <a:ln/>
           <a:extLst>
             <a:ext uri="{909E8E84-426E-40dd-AFC4-6F175D3DCCD1}">
-              <a14:hiddenFill xmlns="" xmlns:a14="http://schemas.microsoft.com/office/drawing/2010/main">
+              <a14:hiddenFill xmlns:a14="http://schemas.microsoft.com/office/drawing/2010/main" xmlns="">
                 <a:solidFill>
                   <a:srgbClr val="FFFFFF"/>
                 </a:solidFill>
               </a14:hiddenFill>
             </a:ext>
             <a:ext uri="{91240B29-F687-4f45-9708-019B960494DF}">
-              <a14:hiddenLine xmlns="" xmlns:a14="http://schemas.microsoft.com/office/drawing/2010/main" w="9525">
+              <a14:hiddenLine xmlns:a14="http://schemas.microsoft.com/office/drawing/2010/main" xmlns="" w="9525">
                 <a:solidFill>
                   <a:srgbClr val="000000"/>
                 </a:solidFill>
@@ -1399,14 +1504,14 @@
           <a:ln/>
           <a:extLst>
             <a:ext uri="{909E8E84-426E-40dd-AFC4-6F175D3DCCD1}">
-              <a14:hiddenFill xmlns="" xmlns:a14="http://schemas.microsoft.com/office/drawing/2010/main">
+              <a14:hiddenFill xmlns:a14="http://schemas.microsoft.com/office/drawing/2010/main" xmlns="">
                 <a:solidFill>
                   <a:srgbClr val="FFFFFF"/>
                 </a:solidFill>
               </a14:hiddenFill>
             </a:ext>
             <a:ext uri="{91240B29-F687-4f45-9708-019B960494DF}">
-              <a14:hiddenLine xmlns="" xmlns:a14="http://schemas.microsoft.com/office/drawing/2010/main" w="9525">
+              <a14:hiddenLine xmlns:a14="http://schemas.microsoft.com/office/drawing/2010/main" xmlns="" w="9525">
                 <a:solidFill>
                   <a:srgbClr val="000000"/>
                 </a:solidFill>
@@ -1533,7 +1638,7 @@
                 <a:latin typeface="Calibri" pitchFamily="34" charset="0"/>
               </a:rPr>
               <a:pPr eaLnBrk="1" hangingPunct="1"/>
-              <a:t>11</a:t>
+              <a:t>12</a:t>
             </a:fld>
             <a:endParaRPr lang="en-US">
               <a:latin typeface="Calibri" pitchFamily="34" charset="0"/>
@@ -1545,118 +1650,6 @@
     <p:extLst>
       <p:ext uri="{BB962C8B-B14F-4D97-AF65-F5344CB8AC3E}">
         <p14:creationId xmlns:p14="http://schemas.microsoft.com/office/powerpoint/2010/main" val="3622782439"/>
-      </p:ext>
-    </p:extLst>
-  </p:cSld>
-  <p:clrMapOvr>
-    <a:masterClrMapping/>
-  </p:clrMapOvr>
-</p:notes>
-</file>
-
-<file path=ppt/notesSlides/notesSlide11.xml><?xml version="1.0" encoding="utf-8"?>
-<p:notes xmlns:a="http://schemas.openxmlformats.org/drawingml/2006/main" xmlns:r="http://schemas.openxmlformats.org/officeDocument/2006/relationships" xmlns:p="http://schemas.openxmlformats.org/presentationml/2006/main">
-  <p:cSld>
-    <p:spTree>
-      <p:nvGrpSpPr>
-        <p:cNvPr id="1" name=""/>
-        <p:cNvGrpSpPr/>
-        <p:nvPr/>
-      </p:nvGrpSpPr>
-      <p:grpSpPr>
-        <a:xfrm>
-          <a:off x="0" y="0"/>
-          <a:ext cx="0" cy="0"/>
-          <a:chOff x="0" y="0"/>
-          <a:chExt cx="0" cy="0"/>
-        </a:xfrm>
-      </p:grpSpPr>
-      <p:sp>
-        <p:nvSpPr>
-          <p:cNvPr id="2" name="Slide Image Placeholder 1"/>
-          <p:cNvSpPr>
-            <a:spLocks noGrp="1" noRot="1" noChangeAspect="1"/>
-          </p:cNvSpPr>
-          <p:nvPr>
-            <p:ph type="sldImg"/>
-          </p:nvPr>
-        </p:nvSpPr>
-        <p:spPr/>
-      </p:sp>
-      <p:sp>
-        <p:nvSpPr>
-          <p:cNvPr id="3" name="Notes Placeholder 2"/>
-          <p:cNvSpPr>
-            <a:spLocks noGrp="1"/>
-          </p:cNvSpPr>
-          <p:nvPr>
-            <p:ph type="body" idx="1"/>
-          </p:nvPr>
-        </p:nvSpPr>
-        <p:spPr/>
-        <p:txBody>
-          <a:bodyPr/>
-          <a:lstStyle/>
-          <a:p>
-            <a:r>
-              <a:rPr lang="en-US" dirty="0"/>
-              <a:t>From the </a:t>
-            </a:r>
-            <a:r>
-              <a:rPr lang="en-US" i="1" dirty="0"/>
-              <a:t>Interface</a:t>
-            </a:r>
-            <a:r>
-              <a:rPr lang="en-US" dirty="0"/>
-              <a:t> Eclipse project, </a:t>
-            </a:r>
-            <a:r>
-              <a:rPr lang="en-US" i="1" dirty="0" err="1"/>
-              <a:t>simpleExample</a:t>
-            </a:r>
-            <a:r>
-              <a:rPr lang="en-US" dirty="0"/>
-              <a:t> package</a:t>
-            </a:r>
-          </a:p>
-          <a:p>
-            <a:endParaRPr lang="en-US" dirty="0"/>
-          </a:p>
-        </p:txBody>
-      </p:sp>
-      <p:sp>
-        <p:nvSpPr>
-          <p:cNvPr id="4" name="Slide Number Placeholder 3"/>
-          <p:cNvSpPr>
-            <a:spLocks noGrp="1"/>
-          </p:cNvSpPr>
-          <p:nvPr>
-            <p:ph type="sldNum" sz="quarter" idx="5"/>
-          </p:nvPr>
-        </p:nvSpPr>
-        <p:spPr/>
-        <p:txBody>
-          <a:bodyPr/>
-          <a:lstStyle/>
-          <a:p>
-            <a:pPr>
-              <a:defRPr/>
-            </a:pPr>
-            <a:fld id="{3F6B6C2D-0897-4206-AD94-4D1FCFA82106}" type="slidenum">
-              <a:rPr lang="en-US" smtClean="0"/>
-              <a:pPr>
-                <a:defRPr/>
-              </a:pPr>
-              <a:t>12</a:t>
-            </a:fld>
-            <a:endParaRPr lang="en-US"/>
-          </a:p>
-        </p:txBody>
-      </p:sp>
-    </p:spTree>
-    <p:extLst>
-      <p:ext uri="{BB962C8B-B14F-4D97-AF65-F5344CB8AC3E}">
-        <p14:creationId xmlns:p14="http://schemas.microsoft.com/office/powerpoint/2010/main" val="3899258545"/>
       </p:ext>
     </p:extLst>
   </p:cSld>
@@ -1712,8 +1705,27 @@
           <a:p>
             <a:r>
               <a:rPr lang="en-US" dirty="0"/>
-              <a:t>Now that we have developed an interface, let’s implement the changes in code.</a:t>
-            </a:r>
+              <a:t>From the </a:t>
+            </a:r>
+            <a:r>
+              <a:rPr lang="en-US" i="1" dirty="0"/>
+              <a:t>Interface</a:t>
+            </a:r>
+            <a:r>
+              <a:rPr lang="en-US" dirty="0"/>
+              <a:t> Eclipse project, </a:t>
+            </a:r>
+            <a:r>
+              <a:rPr lang="en-US" i="1" dirty="0" err="1"/>
+              <a:t>simpleExample</a:t>
+            </a:r>
+            <a:r>
+              <a:rPr lang="en-US" dirty="0"/>
+              <a:t> package</a:t>
+            </a:r>
+          </a:p>
+          <a:p>
+            <a:endParaRPr lang="en-US" dirty="0"/>
           </a:p>
         </p:txBody>
       </p:sp>
@@ -1724,7 +1736,7 @@
             <a:spLocks noGrp="1"/>
           </p:cNvSpPr>
           <p:nvPr>
-            <p:ph type="sldNum" sz="quarter" idx="10"/>
+            <p:ph type="sldNum" sz="quarter" idx="5"/>
           </p:nvPr>
         </p:nvSpPr>
         <p:spPr/>
@@ -1749,7 +1761,7 @@
     </p:spTree>
     <p:extLst>
       <p:ext uri="{BB962C8B-B14F-4D97-AF65-F5344CB8AC3E}">
-        <p14:creationId xmlns:p14="http://schemas.microsoft.com/office/powerpoint/2010/main" val="3548877150"/>
+        <p14:creationId xmlns:p14="http://schemas.microsoft.com/office/powerpoint/2010/main" val="3899258545"/>
       </p:ext>
     </p:extLst>
   </p:cSld>
@@ -1805,41 +1817,7 @@
           <a:p>
             <a:r>
               <a:rPr lang="en-US" dirty="0"/>
-              <a:t>Name is an </a:t>
-            </a:r>
-            <a:r>
-              <a:rPr lang="en-US" b="1" dirty="0"/>
-              <a:t>implementation detail</a:t>
-            </a:r>
-            <a:r>
-              <a:rPr lang="en-US" dirty="0"/>
-              <a:t>.</a:t>
-            </a:r>
-          </a:p>
-          <a:p>
-            <a:r>
-              <a:rPr lang="en-US" dirty="0"/>
-              <a:t>It was needed to construct the Pet, not to </a:t>
-            </a:r>
-            <a:r>
-              <a:rPr lang="en-US" b="1" dirty="0"/>
-              <a:t>use </a:t>
-            </a:r>
-            <a:r>
-              <a:rPr lang="en-US" dirty="0"/>
-              <a:t>it.</a:t>
-            </a:r>
-          </a:p>
-          <a:p>
-            <a:r>
-              <a:rPr lang="en-US" dirty="0"/>
-              <a:t>Interfaces only describe how things are used, not how they are created.</a:t>
-            </a:r>
-          </a:p>
-          <a:p>
-            <a:r>
-              <a:rPr lang="en-US" dirty="0"/>
-              <a:t>Implementations, that is: classes that implement interfaces, describe how they are created.</a:t>
+              <a:t>Now that we have developed an interface, let’s implement the changes in code.</a:t>
             </a:r>
           </a:p>
         </p:txBody>
@@ -1867,7 +1845,7 @@
               <a:pPr>
                 <a:defRPr/>
               </a:pPr>
-              <a:t>19</a:t>
+              <a:t>14</a:t>
             </a:fld>
             <a:endParaRPr lang="en-US"/>
           </a:p>
@@ -1876,7 +1854,7 @@
     </p:spTree>
     <p:extLst>
       <p:ext uri="{BB962C8B-B14F-4D97-AF65-F5344CB8AC3E}">
-        <p14:creationId xmlns:p14="http://schemas.microsoft.com/office/powerpoint/2010/main" val="1314797174"/>
+        <p14:creationId xmlns:p14="http://schemas.microsoft.com/office/powerpoint/2010/main" val="3548877150"/>
       </p:ext>
     </p:extLst>
   </p:cSld>
@@ -1905,6 +1883,133 @@
       </p:grpSpPr>
       <p:sp>
         <p:nvSpPr>
+          <p:cNvPr id="2" name="Slide Image Placeholder 1"/>
+          <p:cNvSpPr>
+            <a:spLocks noGrp="1" noRot="1" noChangeAspect="1"/>
+          </p:cNvSpPr>
+          <p:nvPr>
+            <p:ph type="sldImg"/>
+          </p:nvPr>
+        </p:nvSpPr>
+        <p:spPr/>
+      </p:sp>
+      <p:sp>
+        <p:nvSpPr>
+          <p:cNvPr id="3" name="Notes Placeholder 2"/>
+          <p:cNvSpPr>
+            <a:spLocks noGrp="1"/>
+          </p:cNvSpPr>
+          <p:nvPr>
+            <p:ph type="body" idx="1"/>
+          </p:nvPr>
+        </p:nvSpPr>
+        <p:spPr/>
+        <p:txBody>
+          <a:bodyPr/>
+          <a:lstStyle/>
+          <a:p>
+            <a:r>
+              <a:rPr lang="en-US" dirty="0"/>
+              <a:t>Name is an </a:t>
+            </a:r>
+            <a:r>
+              <a:rPr lang="en-US" b="1" dirty="0"/>
+              <a:t>implementation detail</a:t>
+            </a:r>
+            <a:r>
+              <a:rPr lang="en-US" dirty="0"/>
+              <a:t>.</a:t>
+            </a:r>
+          </a:p>
+          <a:p>
+            <a:r>
+              <a:rPr lang="en-US" dirty="0"/>
+              <a:t>It was needed to construct the Pet, not to </a:t>
+            </a:r>
+            <a:r>
+              <a:rPr lang="en-US" b="1" dirty="0"/>
+              <a:t>use </a:t>
+            </a:r>
+            <a:r>
+              <a:rPr lang="en-US" dirty="0"/>
+              <a:t>it.</a:t>
+            </a:r>
+          </a:p>
+          <a:p>
+            <a:r>
+              <a:rPr lang="en-US" dirty="0"/>
+              <a:t>Interfaces only describe how things are used, not how they are created.</a:t>
+            </a:r>
+          </a:p>
+          <a:p>
+            <a:r>
+              <a:rPr lang="en-US" dirty="0"/>
+              <a:t>Implementations, that is: classes that implement interfaces, describe how they are created.</a:t>
+            </a:r>
+          </a:p>
+        </p:txBody>
+      </p:sp>
+      <p:sp>
+        <p:nvSpPr>
+          <p:cNvPr id="4" name="Slide Number Placeholder 3"/>
+          <p:cNvSpPr>
+            <a:spLocks noGrp="1"/>
+          </p:cNvSpPr>
+          <p:nvPr>
+            <p:ph type="sldNum" sz="quarter" idx="10"/>
+          </p:nvPr>
+        </p:nvSpPr>
+        <p:spPr/>
+        <p:txBody>
+          <a:bodyPr/>
+          <a:lstStyle/>
+          <a:p>
+            <a:pPr>
+              <a:defRPr/>
+            </a:pPr>
+            <a:fld id="{3F6B6C2D-0897-4206-AD94-4D1FCFA82106}" type="slidenum">
+              <a:rPr lang="en-US" smtClean="0"/>
+              <a:pPr>
+                <a:defRPr/>
+              </a:pPr>
+              <a:t>20</a:t>
+            </a:fld>
+            <a:endParaRPr lang="en-US"/>
+          </a:p>
+        </p:txBody>
+      </p:sp>
+    </p:spTree>
+    <p:extLst>
+      <p:ext uri="{BB962C8B-B14F-4D97-AF65-F5344CB8AC3E}">
+        <p14:creationId xmlns:p14="http://schemas.microsoft.com/office/powerpoint/2010/main" val="1314797174"/>
+      </p:ext>
+    </p:extLst>
+  </p:cSld>
+  <p:clrMapOvr>
+    <a:masterClrMapping/>
+  </p:clrMapOvr>
+</p:notes>
+</file>
+
+<file path=ppt/notesSlides/notesSlide15.xml><?xml version="1.0" encoding="utf-8"?>
+<p:notes xmlns:a="http://schemas.openxmlformats.org/drawingml/2006/main" xmlns:r="http://schemas.openxmlformats.org/officeDocument/2006/relationships" xmlns:p="http://schemas.openxmlformats.org/presentationml/2006/main">
+  <p:cSld>
+    <p:spTree>
+      <p:nvGrpSpPr>
+        <p:cNvPr id="1" name=""/>
+        <p:cNvGrpSpPr/>
+        <p:nvPr/>
+      </p:nvGrpSpPr>
+      <p:grpSpPr>
+        <a:xfrm>
+          <a:off x="0" y="0"/>
+          <a:ext cx="0" cy="0"/>
+          <a:chOff x="0" y="0"/>
+          <a:chExt cx="0" cy="0"/>
+        </a:xfrm>
+      </p:grpSpPr>
+      <p:sp>
+        <p:nvSpPr>
           <p:cNvPr id="53250" name="Slide Image Placeholder 1"/>
           <p:cNvSpPr>
             <a:spLocks noGrp="1" noRot="1" noChangeAspect="1" noTextEdit="1"/>
@@ -1925,7 +2030,7 @@
           </a:ln>
           <a:extLst>
             <a:ext uri="{909E8E84-426E-40dd-AFC4-6F175D3DCCD1}">
-              <a14:hiddenFill xmlns="" xmlns:a14="http://schemas.microsoft.com/office/drawing/2010/main">
+              <a14:hiddenFill xmlns:a14="http://schemas.microsoft.com/office/drawing/2010/main" xmlns="">
                 <a:solidFill>
                   <a:srgbClr val="FFFFFF"/>
                 </a:solidFill>
@@ -1949,14 +2054,14 @@
           <a:ln/>
           <a:extLst>
             <a:ext uri="{909E8E84-426E-40dd-AFC4-6F175D3DCCD1}">
-              <a14:hiddenFill xmlns="" xmlns:a14="http://schemas.microsoft.com/office/drawing/2010/main">
+              <a14:hiddenFill xmlns:a14="http://schemas.microsoft.com/office/drawing/2010/main" xmlns="">
                 <a:solidFill>
                   <a:srgbClr val="FFFFFF"/>
                 </a:solidFill>
               </a14:hiddenFill>
             </a:ext>
             <a:ext uri="{91240B29-F687-4f45-9708-019B960494DF}">
-              <a14:hiddenLine xmlns="" xmlns:a14="http://schemas.microsoft.com/office/drawing/2010/main" w="9525">
+              <a14:hiddenLine xmlns:a14="http://schemas.microsoft.com/office/drawing/2010/main" xmlns="" w="9525">
                 <a:solidFill>
                   <a:srgbClr val="000000"/>
                 </a:solidFill>
@@ -1993,14 +2098,14 @@
           <a:ln/>
           <a:extLst>
             <a:ext uri="{909E8E84-426E-40dd-AFC4-6F175D3DCCD1}">
-              <a14:hiddenFill xmlns="" xmlns:a14="http://schemas.microsoft.com/office/drawing/2010/main">
+              <a14:hiddenFill xmlns:a14="http://schemas.microsoft.com/office/drawing/2010/main" xmlns="">
                 <a:solidFill>
                   <a:srgbClr val="FFFFFF"/>
                 </a:solidFill>
               </a14:hiddenFill>
             </a:ext>
             <a:ext uri="{91240B29-F687-4f45-9708-019B960494DF}">
-              <a14:hiddenLine xmlns="" xmlns:a14="http://schemas.microsoft.com/office/drawing/2010/main" w="9525">
+              <a14:hiddenLine xmlns:a14="http://schemas.microsoft.com/office/drawing/2010/main" xmlns="" w="9525">
                 <a:solidFill>
                   <a:srgbClr val="000000"/>
                 </a:solidFill>
@@ -2127,7 +2232,7 @@
                 <a:latin typeface="Calibri" pitchFamily="34" charset="0"/>
               </a:rPr>
               <a:pPr eaLnBrk="1" hangingPunct="1"/>
-              <a:t>21</a:t>
+              <a:t>22</a:t>
             </a:fld>
             <a:endParaRPr lang="en-US">
               <a:latin typeface="Calibri" pitchFamily="34" charset="0"/>
@@ -2139,123 +2244,6 @@
     <p:extLst>
       <p:ext uri="{BB962C8B-B14F-4D97-AF65-F5344CB8AC3E}">
         <p14:creationId xmlns:p14="http://schemas.microsoft.com/office/powerpoint/2010/main" val="370682793"/>
-      </p:ext>
-    </p:extLst>
-  </p:cSld>
-  <p:clrMapOvr>
-    <a:masterClrMapping/>
-  </p:clrMapOvr>
-</p:notes>
-</file>
-
-<file path=ppt/notesSlides/notesSlide15.xml><?xml version="1.0" encoding="utf-8"?>
-<p:notes xmlns:a="http://schemas.openxmlformats.org/drawingml/2006/main" xmlns:r="http://schemas.openxmlformats.org/officeDocument/2006/relationships" xmlns:p="http://schemas.openxmlformats.org/presentationml/2006/main">
-  <p:cSld>
-    <p:spTree>
-      <p:nvGrpSpPr>
-        <p:cNvPr id="1" name=""/>
-        <p:cNvGrpSpPr/>
-        <p:nvPr/>
-      </p:nvGrpSpPr>
-      <p:grpSpPr>
-        <a:xfrm>
-          <a:off x="0" y="0"/>
-          <a:ext cx="0" cy="0"/>
-          <a:chOff x="0" y="0"/>
-          <a:chExt cx="0" cy="0"/>
-        </a:xfrm>
-      </p:grpSpPr>
-      <p:sp>
-        <p:nvSpPr>
-          <p:cNvPr id="2" name="Slide Image Placeholder 1"/>
-          <p:cNvSpPr>
-            <a:spLocks noGrp="1" noRot="1" noChangeAspect="1"/>
-          </p:cNvSpPr>
-          <p:nvPr>
-            <p:ph type="sldImg"/>
-          </p:nvPr>
-        </p:nvSpPr>
-        <p:spPr/>
-      </p:sp>
-      <p:sp>
-        <p:nvSpPr>
-          <p:cNvPr id="3" name="Notes Placeholder 2"/>
-          <p:cNvSpPr>
-            <a:spLocks noGrp="1"/>
-          </p:cNvSpPr>
-          <p:nvPr>
-            <p:ph type="body" idx="1"/>
-          </p:nvPr>
-        </p:nvSpPr>
-        <p:spPr/>
-        <p:txBody>
-          <a:bodyPr/>
-          <a:lstStyle/>
-          <a:p>
-            <a:r>
-              <a:rPr lang="en-US" dirty="0"/>
-              <a:t>Leading</a:t>
-            </a:r>
-            <a:r>
-              <a:rPr lang="en-US" baseline="0" dirty="0"/>
-              <a:t> questions to help:</a:t>
-            </a:r>
-          </a:p>
-          <a:p>
-            <a:r>
-              <a:rPr lang="en-US" dirty="0"/>
-              <a:t>What do they all have in common? So what goes</a:t>
-            </a:r>
-            <a:r>
-              <a:rPr lang="en-US" baseline="0" dirty="0"/>
-              <a:t> in interface?</a:t>
-            </a:r>
-          </a:p>
-          <a:p>
-            <a:r>
-              <a:rPr lang="en-US" baseline="0" dirty="0"/>
-              <a:t>What can we do instead of the three feed methods?</a:t>
-            </a:r>
-            <a:endParaRPr lang="en-US" dirty="0"/>
-          </a:p>
-          <a:p>
-            <a:endParaRPr lang="en-US" dirty="0"/>
-          </a:p>
-        </p:txBody>
-      </p:sp>
-      <p:sp>
-        <p:nvSpPr>
-          <p:cNvPr id="4" name="Slide Number Placeholder 3"/>
-          <p:cNvSpPr>
-            <a:spLocks noGrp="1"/>
-          </p:cNvSpPr>
-          <p:nvPr>
-            <p:ph type="sldNum" sz="quarter" idx="10"/>
-          </p:nvPr>
-        </p:nvSpPr>
-        <p:spPr/>
-        <p:txBody>
-          <a:bodyPr/>
-          <a:lstStyle/>
-          <a:p>
-            <a:pPr>
-              <a:defRPr/>
-            </a:pPr>
-            <a:fld id="{3F6B6C2D-0897-4206-AD94-4D1FCFA82106}" type="slidenum">
-              <a:rPr lang="en-US" smtClean="0"/>
-              <a:pPr>
-                <a:defRPr/>
-              </a:pPr>
-              <a:t>22</a:t>
-            </a:fld>
-            <a:endParaRPr lang="en-US"/>
-          </a:p>
-        </p:txBody>
-      </p:sp>
-    </p:spTree>
-    <p:extLst>
-      <p:ext uri="{BB962C8B-B14F-4D97-AF65-F5344CB8AC3E}">
-        <p14:creationId xmlns:p14="http://schemas.microsoft.com/office/powerpoint/2010/main" val="1618804258"/>
       </p:ext>
     </p:extLst>
   </p:cSld>
@@ -2311,8 +2299,32 @@
           <a:p>
             <a:r>
               <a:rPr lang="en-US" dirty="0"/>
-              <a:t>Now that we have developed an interface, let’s implement the changes in code.</a:t>
-            </a:r>
+              <a:t>Leading</a:t>
+            </a:r>
+            <a:r>
+              <a:rPr lang="en-US" baseline="0" dirty="0"/>
+              <a:t> questions to help:</a:t>
+            </a:r>
+          </a:p>
+          <a:p>
+            <a:r>
+              <a:rPr lang="en-US" dirty="0"/>
+              <a:t>What do they all have in common? So what goes</a:t>
+            </a:r>
+            <a:r>
+              <a:rPr lang="en-US" baseline="0" dirty="0"/>
+              <a:t> in interface?</a:t>
+            </a:r>
+          </a:p>
+          <a:p>
+            <a:r>
+              <a:rPr lang="en-US" baseline="0" dirty="0"/>
+              <a:t>What can we do instead of the three feed methods?</a:t>
+            </a:r>
+            <a:endParaRPr lang="en-US" dirty="0"/>
+          </a:p>
+          <a:p>
+            <a:endParaRPr lang="en-US" dirty="0"/>
           </a:p>
         </p:txBody>
       </p:sp>
@@ -2348,7 +2360,7 @@
     </p:spTree>
     <p:extLst>
       <p:ext uri="{BB962C8B-B14F-4D97-AF65-F5344CB8AC3E}">
-        <p14:creationId xmlns:p14="http://schemas.microsoft.com/office/powerpoint/2010/main" val="3584165380"/>
+        <p14:creationId xmlns:p14="http://schemas.microsoft.com/office/powerpoint/2010/main" val="1618804258"/>
       </p:ext>
     </p:extLst>
   </p:cSld>
@@ -2441,7 +2453,7 @@
     </p:spTree>
     <p:extLst>
       <p:ext uri="{BB962C8B-B14F-4D97-AF65-F5344CB8AC3E}">
-        <p14:creationId xmlns:p14="http://schemas.microsoft.com/office/powerpoint/2010/main" val="1317189948"/>
+        <p14:creationId xmlns:p14="http://schemas.microsoft.com/office/powerpoint/2010/main" val="3584165380"/>
       </p:ext>
     </p:extLst>
   </p:cSld>
@@ -2497,39 +2509,8 @@
           <a:p>
             <a:r>
               <a:rPr lang="en-US" dirty="0"/>
-              <a:t>If you find it helpful you can ask:</a:t>
-            </a:r>
-          </a:p>
-          <a:p>
-            <a:endParaRPr lang="en-US" dirty="0"/>
-          </a:p>
-          <a:p>
-            <a:r>
-              <a:rPr lang="en-US" dirty="0"/>
-              <a:t>If I run</a:t>
-            </a:r>
-            <a:r>
-              <a:rPr lang="en-US" baseline="0" dirty="0"/>
-              <a:t> “Pet p = new Dog();”</a:t>
-            </a:r>
-          </a:p>
-          <a:p>
-            <a:r>
-              <a:rPr lang="en-US" baseline="0" dirty="0"/>
-              <a:t>What is the type?  (confusion… Both?) </a:t>
-            </a:r>
-          </a:p>
-          <a:p>
-            <a:endParaRPr lang="en-US" dirty="0"/>
-          </a:p>
-          <a:p>
-            <a:r>
-              <a:rPr lang="en-US" dirty="0"/>
-              <a:t>There is a declared (Pet) and actual (Dog) type.</a:t>
-            </a:r>
-          </a:p>
-          <a:p>
-            <a:endParaRPr lang="en-US" dirty="0"/>
+              <a:t>Now that we have developed an interface, let’s implement the changes in code.</a:t>
+            </a:r>
           </a:p>
         </p:txBody>
       </p:sp>
@@ -2565,7 +2546,7 @@
     </p:spTree>
     <p:extLst>
       <p:ext uri="{BB962C8B-B14F-4D97-AF65-F5344CB8AC3E}">
-        <p14:creationId xmlns:p14="http://schemas.microsoft.com/office/powerpoint/2010/main" val="3886580324"/>
+        <p14:creationId xmlns:p14="http://schemas.microsoft.com/office/powerpoint/2010/main" val="1317189948"/>
       </p:ext>
     </p:extLst>
   </p:cSld>
@@ -2594,6 +2575,220 @@
       </p:grpSpPr>
       <p:sp>
         <p:nvSpPr>
+          <p:cNvPr id="2" name="Slide Image Placeholder 1"/>
+          <p:cNvSpPr>
+            <a:spLocks noGrp="1" noRot="1" noChangeAspect="1"/>
+          </p:cNvSpPr>
+          <p:nvPr>
+            <p:ph type="sldImg"/>
+          </p:nvPr>
+        </p:nvSpPr>
+        <p:spPr/>
+      </p:sp>
+      <p:sp>
+        <p:nvSpPr>
+          <p:cNvPr id="3" name="Notes Placeholder 2"/>
+          <p:cNvSpPr>
+            <a:spLocks noGrp="1"/>
+          </p:cNvSpPr>
+          <p:nvPr>
+            <p:ph type="body" idx="1"/>
+          </p:nvPr>
+        </p:nvSpPr>
+        <p:spPr/>
+        <p:txBody>
+          <a:bodyPr/>
+          <a:lstStyle/>
+          <a:p>
+            <a:r>
+              <a:rPr lang="en-US" dirty="0"/>
+              <a:t>If you find it helpful you can ask:</a:t>
+            </a:r>
+          </a:p>
+          <a:p>
+            <a:endParaRPr lang="en-US" dirty="0"/>
+          </a:p>
+          <a:p>
+            <a:r>
+              <a:rPr lang="en-US" dirty="0"/>
+              <a:t>If I run</a:t>
+            </a:r>
+            <a:r>
+              <a:rPr lang="en-US" baseline="0" dirty="0"/>
+              <a:t> “Pet p = new Dog();”</a:t>
+            </a:r>
+          </a:p>
+          <a:p>
+            <a:r>
+              <a:rPr lang="en-US" baseline="0" dirty="0"/>
+              <a:t>What is the type?  (confusion… Both?) </a:t>
+            </a:r>
+          </a:p>
+          <a:p>
+            <a:endParaRPr lang="en-US" dirty="0"/>
+          </a:p>
+          <a:p>
+            <a:r>
+              <a:rPr lang="en-US" dirty="0"/>
+              <a:t>There is a declared (Pet) and actual (Dog) type.</a:t>
+            </a:r>
+          </a:p>
+          <a:p>
+            <a:endParaRPr lang="en-US" dirty="0"/>
+          </a:p>
+        </p:txBody>
+      </p:sp>
+      <p:sp>
+        <p:nvSpPr>
+          <p:cNvPr id="4" name="Slide Number Placeholder 3"/>
+          <p:cNvSpPr>
+            <a:spLocks noGrp="1"/>
+          </p:cNvSpPr>
+          <p:nvPr>
+            <p:ph type="sldNum" sz="quarter" idx="10"/>
+          </p:nvPr>
+        </p:nvSpPr>
+        <p:spPr/>
+        <p:txBody>
+          <a:bodyPr/>
+          <a:lstStyle/>
+          <a:p>
+            <a:pPr>
+              <a:defRPr/>
+            </a:pPr>
+            <a:fld id="{3F6B6C2D-0897-4206-AD94-4D1FCFA82106}" type="slidenum">
+              <a:rPr lang="en-US" smtClean="0"/>
+              <a:pPr>
+                <a:defRPr/>
+              </a:pPr>
+              <a:t>26</a:t>
+            </a:fld>
+            <a:endParaRPr lang="en-US"/>
+          </a:p>
+        </p:txBody>
+      </p:sp>
+    </p:spTree>
+    <p:extLst>
+      <p:ext uri="{BB962C8B-B14F-4D97-AF65-F5344CB8AC3E}">
+        <p14:creationId xmlns:p14="http://schemas.microsoft.com/office/powerpoint/2010/main" val="3886580324"/>
+      </p:ext>
+    </p:extLst>
+  </p:cSld>
+  <p:clrMapOvr>
+    <a:masterClrMapping/>
+  </p:clrMapOvr>
+</p:notes>
+</file>
+
+<file path=ppt/notesSlides/notesSlide2.xml><?xml version="1.0" encoding="utf-8"?>
+<p:notes xmlns:a="http://schemas.openxmlformats.org/drawingml/2006/main" xmlns:r="http://schemas.openxmlformats.org/officeDocument/2006/relationships" xmlns:p="http://schemas.openxmlformats.org/presentationml/2006/main">
+  <p:cSld>
+    <p:spTree>
+      <p:nvGrpSpPr>
+        <p:cNvPr id="1" name=""/>
+        <p:cNvGrpSpPr/>
+        <p:nvPr/>
+      </p:nvGrpSpPr>
+      <p:grpSpPr>
+        <a:xfrm>
+          <a:off x="0" y="0"/>
+          <a:ext cx="0" cy="0"/>
+          <a:chOff x="0" y="0"/>
+          <a:chExt cx="0" cy="0"/>
+        </a:xfrm>
+      </p:grpSpPr>
+      <p:sp>
+        <p:nvSpPr>
+          <p:cNvPr id="2" name="Slide Image Placeholder 1"/>
+          <p:cNvSpPr>
+            <a:spLocks noGrp="1" noRot="1" noChangeAspect="1"/>
+          </p:cNvSpPr>
+          <p:nvPr>
+            <p:ph type="sldImg"/>
+          </p:nvPr>
+        </p:nvSpPr>
+        <p:spPr/>
+      </p:sp>
+      <p:sp>
+        <p:nvSpPr>
+          <p:cNvPr id="3" name="Notes Placeholder 2"/>
+          <p:cNvSpPr>
+            <a:spLocks noGrp="1"/>
+          </p:cNvSpPr>
+          <p:nvPr>
+            <p:ph type="body" idx="1"/>
+          </p:nvPr>
+        </p:nvSpPr>
+        <p:spPr/>
+        <p:txBody>
+          <a:bodyPr/>
+          <a:lstStyle/>
+          <a:p>
+            <a:endParaRPr lang="en-US" dirty="0"/>
+          </a:p>
+        </p:txBody>
+      </p:sp>
+      <p:sp>
+        <p:nvSpPr>
+          <p:cNvPr id="4" name="Slide Number Placeholder 3"/>
+          <p:cNvSpPr>
+            <a:spLocks noGrp="1"/>
+          </p:cNvSpPr>
+          <p:nvPr>
+            <p:ph type="sldNum" sz="quarter" idx="10"/>
+          </p:nvPr>
+        </p:nvSpPr>
+        <p:spPr/>
+        <p:txBody>
+          <a:bodyPr/>
+          <a:lstStyle/>
+          <a:p>
+            <a:pPr>
+              <a:defRPr/>
+            </a:pPr>
+            <a:fld id="{3F6B6C2D-0897-4206-AD94-4D1FCFA82106}" type="slidenum">
+              <a:rPr lang="en-US" smtClean="0"/>
+              <a:pPr>
+                <a:defRPr/>
+              </a:pPr>
+              <a:t>2</a:t>
+            </a:fld>
+            <a:endParaRPr lang="en-US"/>
+          </a:p>
+        </p:txBody>
+      </p:sp>
+    </p:spTree>
+    <p:extLst>
+      <p:ext uri="{BB962C8B-B14F-4D97-AF65-F5344CB8AC3E}">
+        <p14:creationId xmlns:p14="http://schemas.microsoft.com/office/powerpoint/2010/main" val="3413004475"/>
+      </p:ext>
+    </p:extLst>
+  </p:cSld>
+  <p:clrMapOvr>
+    <a:masterClrMapping/>
+  </p:clrMapOvr>
+</p:notes>
+</file>
+
+<file path=ppt/notesSlides/notesSlide20.xml><?xml version="1.0" encoding="utf-8"?>
+<p:notes xmlns:a="http://schemas.openxmlformats.org/drawingml/2006/main" xmlns:r="http://schemas.openxmlformats.org/officeDocument/2006/relationships" xmlns:p="http://schemas.openxmlformats.org/presentationml/2006/main">
+  <p:cSld>
+    <p:spTree>
+      <p:nvGrpSpPr>
+        <p:cNvPr id="1" name=""/>
+        <p:cNvGrpSpPr/>
+        <p:nvPr/>
+      </p:nvGrpSpPr>
+      <p:grpSpPr>
+        <a:xfrm>
+          <a:off x="0" y="0"/>
+          <a:ext cx="0" cy="0"/>
+          <a:chOff x="0" y="0"/>
+          <a:chExt cx="0" cy="0"/>
+        </a:xfrm>
+      </p:grpSpPr>
+      <p:sp>
+        <p:nvSpPr>
           <p:cNvPr id="52226" name="Slide Image Placeholder 1"/>
           <p:cNvSpPr>
             <a:spLocks noGrp="1" noRot="1" noChangeAspect="1" noTextEdit="1"/>
@@ -2614,7 +2809,7 @@
           </a:ln>
           <a:extLst>
             <a:ext uri="{909E8E84-426E-40dd-AFC4-6F175D3DCCD1}">
-              <a14:hiddenFill xmlns:a14="http://schemas.microsoft.com/office/drawing/2010/main" xmlns="">
+              <a14:hiddenFill xmlns="" xmlns:a14="http://schemas.microsoft.com/office/drawing/2010/main">
                 <a:solidFill>
                   <a:srgbClr val="FFFFFF"/>
                 </a:solidFill>
@@ -2638,14 +2833,14 @@
           <a:ln/>
           <a:extLst>
             <a:ext uri="{909E8E84-426E-40dd-AFC4-6F175D3DCCD1}">
-              <a14:hiddenFill xmlns:a14="http://schemas.microsoft.com/office/drawing/2010/main" xmlns="">
+              <a14:hiddenFill xmlns="" xmlns:a14="http://schemas.microsoft.com/office/drawing/2010/main">
                 <a:solidFill>
                   <a:srgbClr val="FFFFFF"/>
                 </a:solidFill>
               </a14:hiddenFill>
             </a:ext>
             <a:ext uri="{91240B29-F687-4f45-9708-019B960494DF}">
-              <a14:hiddenLine xmlns:a14="http://schemas.microsoft.com/office/drawing/2010/main" xmlns="" w="9525">
+              <a14:hiddenLine xmlns="" xmlns:a14="http://schemas.microsoft.com/office/drawing/2010/main" w="9525">
                 <a:solidFill>
                   <a:srgbClr val="000000"/>
                 </a:solidFill>
@@ -2698,14 +2893,14 @@
           <a:ln/>
           <a:extLst>
             <a:ext uri="{909E8E84-426E-40dd-AFC4-6F175D3DCCD1}">
-              <a14:hiddenFill xmlns:a14="http://schemas.microsoft.com/office/drawing/2010/main" xmlns="">
+              <a14:hiddenFill xmlns="" xmlns:a14="http://schemas.microsoft.com/office/drawing/2010/main">
                 <a:solidFill>
                   <a:srgbClr val="FFFFFF"/>
                 </a:solidFill>
               </a14:hiddenFill>
             </a:ext>
             <a:ext uri="{91240B29-F687-4f45-9708-019B960494DF}">
-              <a14:hiddenLine xmlns:a14="http://schemas.microsoft.com/office/drawing/2010/main" xmlns="" w="9525">
+              <a14:hiddenLine xmlns="" xmlns:a14="http://schemas.microsoft.com/office/drawing/2010/main" w="9525">
                 <a:solidFill>
                   <a:srgbClr val="000000"/>
                 </a:solidFill>
@@ -2832,7 +3027,7 @@
                 <a:latin typeface="Calibri" pitchFamily="34" charset="0"/>
               </a:rPr>
               <a:pPr eaLnBrk="1" hangingPunct="1"/>
-              <a:t>27</a:t>
+              <a:t>28</a:t>
             </a:fld>
             <a:endParaRPr lang="en-US">
               <a:latin typeface="Calibri" pitchFamily="34" charset="0"/>
@@ -2844,96 +3039,6 @@
     <p:extLst>
       <p:ext uri="{BB962C8B-B14F-4D97-AF65-F5344CB8AC3E}">
         <p14:creationId xmlns:p14="http://schemas.microsoft.com/office/powerpoint/2010/main" val="1311463421"/>
-      </p:ext>
-    </p:extLst>
-  </p:cSld>
-  <p:clrMapOvr>
-    <a:masterClrMapping/>
-  </p:clrMapOvr>
-</p:notes>
-</file>
-
-<file path=ppt/notesSlides/notesSlide2.xml><?xml version="1.0" encoding="utf-8"?>
-<p:notes xmlns:a="http://schemas.openxmlformats.org/drawingml/2006/main" xmlns:r="http://schemas.openxmlformats.org/officeDocument/2006/relationships" xmlns:p="http://schemas.openxmlformats.org/presentationml/2006/main">
-  <p:cSld>
-    <p:spTree>
-      <p:nvGrpSpPr>
-        <p:cNvPr id="1" name=""/>
-        <p:cNvGrpSpPr/>
-        <p:nvPr/>
-      </p:nvGrpSpPr>
-      <p:grpSpPr>
-        <a:xfrm>
-          <a:off x="0" y="0"/>
-          <a:ext cx="0" cy="0"/>
-          <a:chOff x="0" y="0"/>
-          <a:chExt cx="0" cy="0"/>
-        </a:xfrm>
-      </p:grpSpPr>
-      <p:sp>
-        <p:nvSpPr>
-          <p:cNvPr id="2" name="Slide Image Placeholder 1"/>
-          <p:cNvSpPr>
-            <a:spLocks noGrp="1" noRot="1" noChangeAspect="1"/>
-          </p:cNvSpPr>
-          <p:nvPr>
-            <p:ph type="sldImg"/>
-          </p:nvPr>
-        </p:nvSpPr>
-        <p:spPr/>
-      </p:sp>
-      <p:sp>
-        <p:nvSpPr>
-          <p:cNvPr id="3" name="Notes Placeholder 2"/>
-          <p:cNvSpPr>
-            <a:spLocks noGrp="1"/>
-          </p:cNvSpPr>
-          <p:nvPr>
-            <p:ph type="body" idx="1"/>
-          </p:nvPr>
-        </p:nvSpPr>
-        <p:spPr/>
-        <p:txBody>
-          <a:bodyPr/>
-          <a:lstStyle/>
-          <a:p>
-            <a:endParaRPr lang="en-US" dirty="0"/>
-          </a:p>
-        </p:txBody>
-      </p:sp>
-      <p:sp>
-        <p:nvSpPr>
-          <p:cNvPr id="4" name="Slide Number Placeholder 3"/>
-          <p:cNvSpPr>
-            <a:spLocks noGrp="1"/>
-          </p:cNvSpPr>
-          <p:nvPr>
-            <p:ph type="sldNum" sz="quarter" idx="10"/>
-          </p:nvPr>
-        </p:nvSpPr>
-        <p:spPr/>
-        <p:txBody>
-          <a:bodyPr/>
-          <a:lstStyle/>
-          <a:p>
-            <a:pPr>
-              <a:defRPr/>
-            </a:pPr>
-            <a:fld id="{3F6B6C2D-0897-4206-AD94-4D1FCFA82106}" type="slidenum">
-              <a:rPr lang="en-US" smtClean="0"/>
-              <a:pPr>
-                <a:defRPr/>
-              </a:pPr>
-              <a:t>2</a:t>
-            </a:fld>
-            <a:endParaRPr lang="en-US"/>
-          </a:p>
-        </p:txBody>
-      </p:sp>
-    </p:spTree>
-    <p:extLst>
-      <p:ext uri="{BB962C8B-B14F-4D97-AF65-F5344CB8AC3E}">
-        <p14:creationId xmlns:p14="http://schemas.microsoft.com/office/powerpoint/2010/main" val="3413004475"/>
       </p:ext>
     </p:extLst>
   </p:cSld>
@@ -3089,7 +3194,7 @@
           </a:ln>
           <a:extLst>
             <a:ext uri="{909E8E84-426E-40dd-AFC4-6F175D3DCCD1}">
-              <a14:hiddenFill xmlns="" xmlns:a14="http://schemas.microsoft.com/office/drawing/2010/main">
+              <a14:hiddenFill xmlns:a14="http://schemas.microsoft.com/office/drawing/2010/main" xmlns="">
                 <a:solidFill>
                   <a:srgbClr val="FFFFFF"/>
                 </a:solidFill>
@@ -3113,14 +3218,14 @@
           <a:ln/>
           <a:extLst>
             <a:ext uri="{909E8E84-426E-40dd-AFC4-6F175D3DCCD1}">
-              <a14:hiddenFill xmlns="" xmlns:a14="http://schemas.microsoft.com/office/drawing/2010/main">
+              <a14:hiddenFill xmlns:a14="http://schemas.microsoft.com/office/drawing/2010/main" xmlns="">
                 <a:solidFill>
                   <a:srgbClr val="FFFFFF"/>
                 </a:solidFill>
               </a14:hiddenFill>
             </a:ext>
             <a:ext uri="{91240B29-F687-4f45-9708-019B960494DF}">
-              <a14:hiddenLine xmlns="" xmlns:a14="http://schemas.microsoft.com/office/drawing/2010/main" w="9525">
+              <a14:hiddenLine xmlns:a14="http://schemas.microsoft.com/office/drawing/2010/main" xmlns="" w="9525">
                 <a:solidFill>
                   <a:srgbClr val="000000"/>
                 </a:solidFill>
@@ -3180,14 +3285,14 @@
           <a:ln/>
           <a:extLst>
             <a:ext uri="{909E8E84-426E-40dd-AFC4-6F175D3DCCD1}">
-              <a14:hiddenFill xmlns="" xmlns:a14="http://schemas.microsoft.com/office/drawing/2010/main">
+              <a14:hiddenFill xmlns:a14="http://schemas.microsoft.com/office/drawing/2010/main" xmlns="">
                 <a:solidFill>
                   <a:srgbClr val="FFFFFF"/>
                 </a:solidFill>
               </a14:hiddenFill>
             </a:ext>
             <a:ext uri="{91240B29-F687-4f45-9708-019B960494DF}">
-              <a14:hiddenLine xmlns="" xmlns:a14="http://schemas.microsoft.com/office/drawing/2010/main" w="9525">
+              <a14:hiddenLine xmlns:a14="http://schemas.microsoft.com/office/drawing/2010/main" xmlns="" w="9525">
                 <a:solidFill>
                   <a:srgbClr val="000000"/>
                 </a:solidFill>
@@ -3374,7 +3479,7 @@
           </a:ln>
           <a:extLst>
             <a:ext uri="{909E8E84-426E-40dd-AFC4-6F175D3DCCD1}">
-              <a14:hiddenFill xmlns="" xmlns:a14="http://schemas.microsoft.com/office/drawing/2010/main">
+              <a14:hiddenFill xmlns:a14="http://schemas.microsoft.com/office/drawing/2010/main" xmlns="">
                 <a:solidFill>
                   <a:srgbClr val="FFFFFF"/>
                 </a:solidFill>
@@ -3398,14 +3503,14 @@
           <a:ln/>
           <a:extLst>
             <a:ext uri="{909E8E84-426E-40dd-AFC4-6F175D3DCCD1}">
-              <a14:hiddenFill xmlns="" xmlns:a14="http://schemas.microsoft.com/office/drawing/2010/main">
+              <a14:hiddenFill xmlns:a14="http://schemas.microsoft.com/office/drawing/2010/main" xmlns="">
                 <a:solidFill>
                   <a:srgbClr val="FFFFFF"/>
                 </a:solidFill>
               </a14:hiddenFill>
             </a:ext>
             <a:ext uri="{91240B29-F687-4f45-9708-019B960494DF}">
-              <a14:hiddenLine xmlns="" xmlns:a14="http://schemas.microsoft.com/office/drawing/2010/main" w="9525">
+              <a14:hiddenLine xmlns:a14="http://schemas.microsoft.com/office/drawing/2010/main" xmlns="" w="9525">
                 <a:solidFill>
                   <a:srgbClr val="000000"/>
                 </a:solidFill>
@@ -3521,14 +3626,14 @@
           <a:ln/>
           <a:extLst>
             <a:ext uri="{909E8E84-426E-40dd-AFC4-6F175D3DCCD1}">
-              <a14:hiddenFill xmlns="" xmlns:a14="http://schemas.microsoft.com/office/drawing/2010/main">
+              <a14:hiddenFill xmlns:a14="http://schemas.microsoft.com/office/drawing/2010/main" xmlns="">
                 <a:solidFill>
                   <a:srgbClr val="FFFFFF"/>
                 </a:solidFill>
               </a14:hiddenFill>
             </a:ext>
             <a:ext uri="{91240B29-F687-4f45-9708-019B960494DF}">
-              <a14:hiddenLine xmlns="" xmlns:a14="http://schemas.microsoft.com/office/drawing/2010/main" w="9525">
+              <a14:hiddenLine xmlns:a14="http://schemas.microsoft.com/office/drawing/2010/main" xmlns="" w="9525">
                 <a:solidFill>
                   <a:srgbClr val="000000"/>
                 </a:solidFill>
@@ -3715,7 +3820,7 @@
           </a:ln>
           <a:extLst>
             <a:ext uri="{909E8E84-426E-40dd-AFC4-6F175D3DCCD1}">
-              <a14:hiddenFill xmlns:a14="http://schemas.microsoft.com/office/drawing/2010/main" xmlns="">
+              <a14:hiddenFill xmlns="" xmlns:a14="http://schemas.microsoft.com/office/drawing/2010/main">
                 <a:solidFill>
                   <a:srgbClr val="FFFFFF"/>
                 </a:solidFill>
@@ -3739,14 +3844,14 @@
           <a:ln/>
           <a:extLst>
             <a:ext uri="{909E8E84-426E-40dd-AFC4-6F175D3DCCD1}">
-              <a14:hiddenFill xmlns:a14="http://schemas.microsoft.com/office/drawing/2010/main" xmlns="">
+              <a14:hiddenFill xmlns="" xmlns:a14="http://schemas.microsoft.com/office/drawing/2010/main">
                 <a:solidFill>
                   <a:srgbClr val="FFFFFF"/>
                 </a:solidFill>
               </a14:hiddenFill>
             </a:ext>
             <a:ext uri="{91240B29-F687-4f45-9708-019B960494DF}">
-              <a14:hiddenLine xmlns:a14="http://schemas.microsoft.com/office/drawing/2010/main" xmlns="" w="9525">
+              <a14:hiddenLine xmlns="" xmlns:a14="http://schemas.microsoft.com/office/drawing/2010/main" w="9525">
                 <a:solidFill>
                   <a:srgbClr val="000000"/>
                 </a:solidFill>
@@ -3862,14 +3967,14 @@
           <a:ln/>
           <a:extLst>
             <a:ext uri="{909E8E84-426E-40dd-AFC4-6F175D3DCCD1}">
-              <a14:hiddenFill xmlns:a14="http://schemas.microsoft.com/office/drawing/2010/main" xmlns="">
+              <a14:hiddenFill xmlns="" xmlns:a14="http://schemas.microsoft.com/office/drawing/2010/main">
                 <a:solidFill>
                   <a:srgbClr val="FFFFFF"/>
                 </a:solidFill>
               </a14:hiddenFill>
             </a:ext>
             <a:ext uri="{91240B29-F687-4f45-9708-019B960494DF}">
-              <a14:hiddenLine xmlns:a14="http://schemas.microsoft.com/office/drawing/2010/main" xmlns="" w="9525">
+              <a14:hiddenLine xmlns="" xmlns:a14="http://schemas.microsoft.com/office/drawing/2010/main" w="9525">
                 <a:solidFill>
                   <a:srgbClr val="000000"/>
                 </a:solidFill>
@@ -4348,7 +4453,7 @@
     </p:spTree>
     <p:extLst>
       <p:ext uri="{BB962C8B-B14F-4D97-AF65-F5344CB8AC3E}">
-        <p14:creationId xmlns:p14="http://schemas.microsoft.com/office/powerpoint/2010/main" val="2126952299"/>
+        <p14:creationId xmlns:p14="http://schemas.microsoft.com/office/powerpoint/2010/main" val="4247033505"/>
       </p:ext>
     </p:extLst>
   </p:cSld>
@@ -4397,7 +4502,7 @@
           </a:ln>
           <a:extLst>
             <a:ext uri="{909E8E84-426E-40dd-AFC4-6F175D3DCCD1}">
-              <a14:hiddenFill xmlns:a14="http://schemas.microsoft.com/office/drawing/2010/main" xmlns="">
+              <a14:hiddenFill xmlns="" xmlns:a14="http://schemas.microsoft.com/office/drawing/2010/main">
                 <a:solidFill>
                   <a:srgbClr val="FFFFFF"/>
                 </a:solidFill>
@@ -4421,14 +4526,14 @@
           <a:ln/>
           <a:extLst>
             <a:ext uri="{909E8E84-426E-40dd-AFC4-6F175D3DCCD1}">
-              <a14:hiddenFill xmlns:a14="http://schemas.microsoft.com/office/drawing/2010/main" xmlns="">
+              <a14:hiddenFill xmlns="" xmlns:a14="http://schemas.microsoft.com/office/drawing/2010/main">
                 <a:solidFill>
                   <a:srgbClr val="FFFFFF"/>
                 </a:solidFill>
               </a14:hiddenFill>
             </a:ext>
             <a:ext uri="{91240B29-F687-4f45-9708-019B960494DF}">
-              <a14:hiddenLine xmlns:a14="http://schemas.microsoft.com/office/drawing/2010/main" xmlns="" w="9525">
+              <a14:hiddenLine xmlns="" xmlns:a14="http://schemas.microsoft.com/office/drawing/2010/main" w="9525">
                 <a:solidFill>
                   <a:srgbClr val="000000"/>
                 </a:solidFill>
@@ -4544,14 +4649,14 @@
           <a:ln/>
           <a:extLst>
             <a:ext uri="{909E8E84-426E-40dd-AFC4-6F175D3DCCD1}">
-              <a14:hiddenFill xmlns:a14="http://schemas.microsoft.com/office/drawing/2010/main" xmlns="">
+              <a14:hiddenFill xmlns="" xmlns:a14="http://schemas.microsoft.com/office/drawing/2010/main">
                 <a:solidFill>
                   <a:srgbClr val="FFFFFF"/>
                 </a:solidFill>
               </a14:hiddenFill>
             </a:ext>
             <a:ext uri="{91240B29-F687-4f45-9708-019B960494DF}">
-              <a14:hiddenLine xmlns:a14="http://schemas.microsoft.com/office/drawing/2010/main" xmlns="" w="9525">
+              <a14:hiddenLine xmlns="" xmlns:a14="http://schemas.microsoft.com/office/drawing/2010/main" w="9525">
                 <a:solidFill>
                   <a:srgbClr val="000000"/>
                 </a:solidFill>
@@ -4689,7 +4794,7 @@
     </p:spTree>
     <p:extLst>
       <p:ext uri="{BB962C8B-B14F-4D97-AF65-F5344CB8AC3E}">
-        <p14:creationId xmlns:p14="http://schemas.microsoft.com/office/powerpoint/2010/main" val="2369573943"/>
+        <p14:creationId xmlns:p14="http://schemas.microsoft.com/office/powerpoint/2010/main" val="2126952299"/>
       </p:ext>
     </p:extLst>
   </p:cSld>
@@ -4718,19 +4823,38 @@
       </p:grpSpPr>
       <p:sp>
         <p:nvSpPr>
-          <p:cNvPr id="2" name="Slide Image Placeholder 1"/>
+          <p:cNvPr id="50178" name="Slide Image Placeholder 1"/>
           <p:cNvSpPr>
-            <a:spLocks noGrp="1" noRot="1" noChangeAspect="1"/>
+            <a:spLocks noGrp="1" noRot="1" noChangeAspect="1" noTextEdit="1"/>
           </p:cNvSpPr>
           <p:nvPr>
             <p:ph type="sldImg"/>
           </p:nvPr>
         </p:nvSpPr>
-        <p:spPr/>
-      </p:sp>
-      <p:sp>
-        <p:nvSpPr>
-          <p:cNvPr id="3" name="Notes Placeholder 2"/>
+        <p:spPr bwMode="auto">
+          <a:noFill/>
+          <a:ln>
+            <a:solidFill>
+              <a:srgbClr val="000000"/>
+            </a:solidFill>
+            <a:miter lim="800000"/>
+            <a:headEnd/>
+            <a:tailEnd/>
+          </a:ln>
+          <a:extLst>
+            <a:ext uri="{909E8E84-426E-40dd-AFC4-6F175D3DCCD1}">
+              <a14:hiddenFill xmlns="" xmlns:a14="http://schemas.microsoft.com/office/drawing/2010/main">
+                <a:solidFill>
+                  <a:srgbClr val="FFFFFF"/>
+                </a:solidFill>
+              </a14:hiddenFill>
+            </a:ext>
+          </a:extLst>
+        </p:spPr>
+      </p:sp>
+      <p:sp>
+        <p:nvSpPr>
+          <p:cNvPr id="50179" name="Notes Placeholder 2"/>
           <p:cNvSpPr>
             <a:spLocks noGrp="1"/>
           </p:cNvSpPr>
@@ -4738,24 +4862,114 @@
             <p:ph type="body" idx="1"/>
           </p:nvPr>
         </p:nvSpPr>
-        <p:spPr/>
+        <p:spPr>
+          <a:noFill/>
+          <a:ln/>
+          <a:extLst>
+            <a:ext uri="{909E8E84-426E-40dd-AFC4-6F175D3DCCD1}">
+              <a14:hiddenFill xmlns="" xmlns:a14="http://schemas.microsoft.com/office/drawing/2010/main">
+                <a:solidFill>
+                  <a:srgbClr val="FFFFFF"/>
+                </a:solidFill>
+              </a14:hiddenFill>
+            </a:ext>
+            <a:ext uri="{91240B29-F687-4f45-9708-019B960494DF}">
+              <a14:hiddenLine xmlns="" xmlns:a14="http://schemas.microsoft.com/office/drawing/2010/main" w="9525">
+                <a:solidFill>
+                  <a:srgbClr val="000000"/>
+                </a:solidFill>
+                <a:miter lim="800000"/>
+                <a:headEnd/>
+                <a:tailEnd/>
+              </a14:hiddenLine>
+            </a:ext>
+          </a:extLst>
+        </p:spPr>
         <p:txBody>
           <a:bodyPr/>
           <a:lstStyle/>
           <a:p>
+            <a:pPr marL="165261" indent="-165261">
+              <a:buFontTx/>
+              <a:buChar char="-"/>
+            </a:pPr>
             <a:r>
               <a:rPr lang="en-US" dirty="0"/>
-              <a:t>Imagine</a:t>
+              <a:t>callouts animated</a:t>
+            </a:r>
+          </a:p>
+          <a:p>
+            <a:pPr marL="165261" indent="-165261">
+              <a:buFontTx/>
+              <a:buChar char="-"/>
+            </a:pPr>
+            <a:endParaRPr lang="en-US" dirty="0"/>
+          </a:p>
+          <a:p>
+            <a:pPr marL="165261" indent="-165261">
+              <a:buFontTx/>
+              <a:buChar char="-"/>
+            </a:pPr>
+            <a:r>
+              <a:rPr lang="en-US" dirty="0"/>
+              <a:t>201710: have them study and do the </a:t>
+            </a:r>
+            <a:r>
+              <a:rPr lang="en-US" dirty="0" err="1"/>
+              <a:t>numberSequence</a:t>
+            </a:r>
+            <a:r>
+              <a:rPr lang="en-US" dirty="0"/>
+              <a:t> example. They don’t need to write all 3, just enough to get the feel for it.</a:t>
+            </a:r>
+          </a:p>
+          <a:p>
+            <a:pPr marL="165261" indent="-165261">
+              <a:buFontTx/>
+              <a:buChar char="-"/>
+            </a:pPr>
+            <a:endParaRPr lang="en-US" dirty="0"/>
+          </a:p>
+          <a:p>
+            <a:pPr marL="165261" indent="-165261">
+              <a:buFontTx/>
+              <a:buChar char="-"/>
+            </a:pPr>
+            <a:r>
+              <a:rPr lang="en-US" dirty="0"/>
+              <a:t>Old:</a:t>
+            </a:r>
+          </a:p>
+          <a:p>
+            <a:pPr marL="165261" indent="-165261">
+              <a:buFontTx/>
+              <a:buChar char="-"/>
+            </a:pPr>
+            <a:r>
+              <a:rPr lang="en-US" dirty="0"/>
+              <a:t>Ask</a:t>
             </a:r>
             <a:r>
               <a:rPr lang="en-US" baseline="0" dirty="0"/>
-              <a:t> three different people developed these three classes. We have a scale simulator where we write code to compare/weigh things. </a:t>
-            </a:r>
-          </a:p>
-          <a:p>
+              <a:t> students to use this information to create a Function interface in the </a:t>
+            </a:r>
+            <a:r>
+              <a:rPr lang="en-US" baseline="0" dirty="0" err="1"/>
+              <a:t>textCalculator</a:t>
+            </a:r>
             <a:r>
               <a:rPr lang="en-US" baseline="0" dirty="0"/>
-              <a:t>What if we wanted to compare all of them at the same time? </a:t>
+              <a:t> project that fixes the errors in the code.</a:t>
+            </a:r>
+          </a:p>
+          <a:p>
+            <a:pPr marL="165261" indent="-165261">
+              <a:buFontTx/>
+              <a:buChar char="-"/>
+            </a:pPr>
+            <a:r>
+              <a:rPr lang="en-US" baseline="0" dirty="0"/>
+              <a:t>Once they’ve done that, they should implement the add and multiply classes that implement the Function interface.</a:t>
             </a:r>
             <a:endParaRPr lang="en-US" dirty="0"/>
           </a:p>
@@ -4763,37 +4977,165 @@
       </p:sp>
       <p:sp>
         <p:nvSpPr>
-          <p:cNvPr id="4" name="Slide Number Placeholder 3"/>
+          <p:cNvPr id="50180" name="Slide Number Placeholder 3"/>
           <p:cNvSpPr>
             <a:spLocks noGrp="1"/>
           </p:cNvSpPr>
           <p:nvPr>
-            <p:ph type="sldNum" sz="quarter" idx="10"/>
+            <p:ph type="sldNum" sz="quarter" idx="5"/>
           </p:nvPr>
         </p:nvSpPr>
-        <p:spPr/>
+        <p:spPr>
+          <a:noFill/>
+          <a:ln/>
+          <a:extLst>
+            <a:ext uri="{909E8E84-426E-40dd-AFC4-6F175D3DCCD1}">
+              <a14:hiddenFill xmlns="" xmlns:a14="http://schemas.microsoft.com/office/drawing/2010/main">
+                <a:solidFill>
+                  <a:srgbClr val="FFFFFF"/>
+                </a:solidFill>
+              </a14:hiddenFill>
+            </a:ext>
+            <a:ext uri="{91240B29-F687-4f45-9708-019B960494DF}">
+              <a14:hiddenLine xmlns="" xmlns:a14="http://schemas.microsoft.com/office/drawing/2010/main" w="9525">
+                <a:solidFill>
+                  <a:srgbClr val="000000"/>
+                </a:solidFill>
+                <a:miter lim="800000"/>
+                <a:headEnd/>
+                <a:tailEnd/>
+              </a14:hiddenLine>
+            </a:ext>
+          </a:extLst>
+        </p:spPr>
         <p:txBody>
           <a:bodyPr/>
-          <a:lstStyle/>
-          <a:p>
-            <a:pPr>
-              <a:defRPr/>
-            </a:pPr>
-            <a:fld id="{3F6B6C2D-0897-4206-AD94-4D1FCFA82106}" type="slidenum">
-              <a:rPr lang="en-US" smtClean="0"/>
-              <a:pPr>
-                <a:defRPr/>
-              </a:pPr>
-              <a:t>10</a:t>
+          <a:lstStyle>
+            <a:lvl1pPr defTabSz="913525" eaLnBrk="0" hangingPunct="0">
+              <a:defRPr>
+                <a:solidFill>
+                  <a:schemeClr val="tx1"/>
+                </a:solidFill>
+                <a:latin typeface="Arial" charset="0"/>
+                <a:cs typeface="Arial" charset="0"/>
+              </a:defRPr>
+            </a:lvl1pPr>
+            <a:lvl2pPr marL="716130" indent="-275434" defTabSz="913525" eaLnBrk="0" hangingPunct="0">
+              <a:defRPr>
+                <a:solidFill>
+                  <a:schemeClr val="tx1"/>
+                </a:solidFill>
+                <a:latin typeface="Arial" charset="0"/>
+                <a:cs typeface="Arial" charset="0"/>
+              </a:defRPr>
+            </a:lvl2pPr>
+            <a:lvl3pPr marL="1101738" indent="-220348" defTabSz="913525" eaLnBrk="0" hangingPunct="0">
+              <a:defRPr>
+                <a:solidFill>
+                  <a:schemeClr val="tx1"/>
+                </a:solidFill>
+                <a:latin typeface="Arial" charset="0"/>
+                <a:cs typeface="Arial" charset="0"/>
+              </a:defRPr>
+            </a:lvl3pPr>
+            <a:lvl4pPr marL="1542433" indent="-220348" defTabSz="913525" eaLnBrk="0" hangingPunct="0">
+              <a:defRPr>
+                <a:solidFill>
+                  <a:schemeClr val="tx1"/>
+                </a:solidFill>
+                <a:latin typeface="Arial" charset="0"/>
+                <a:cs typeface="Arial" charset="0"/>
+              </a:defRPr>
+            </a:lvl4pPr>
+            <a:lvl5pPr marL="1983128" indent="-220348" defTabSz="913525" eaLnBrk="0" hangingPunct="0">
+              <a:defRPr>
+                <a:solidFill>
+                  <a:schemeClr val="tx1"/>
+                </a:solidFill>
+                <a:latin typeface="Arial" charset="0"/>
+                <a:cs typeface="Arial" charset="0"/>
+              </a:defRPr>
+            </a:lvl5pPr>
+            <a:lvl6pPr marL="2423823" indent="-220348" defTabSz="913525" eaLnBrk="0" fontAlgn="base" hangingPunct="0">
+              <a:spcBef>
+                <a:spcPct val="0"/>
+              </a:spcBef>
+              <a:spcAft>
+                <a:spcPct val="0"/>
+              </a:spcAft>
+              <a:defRPr>
+                <a:solidFill>
+                  <a:schemeClr val="tx1"/>
+                </a:solidFill>
+                <a:latin typeface="Arial" charset="0"/>
+                <a:cs typeface="Arial" charset="0"/>
+              </a:defRPr>
+            </a:lvl6pPr>
+            <a:lvl7pPr marL="2864518" indent="-220348" defTabSz="913525" eaLnBrk="0" fontAlgn="base" hangingPunct="0">
+              <a:spcBef>
+                <a:spcPct val="0"/>
+              </a:spcBef>
+              <a:spcAft>
+                <a:spcPct val="0"/>
+              </a:spcAft>
+              <a:defRPr>
+                <a:solidFill>
+                  <a:schemeClr val="tx1"/>
+                </a:solidFill>
+                <a:latin typeface="Arial" charset="0"/>
+                <a:cs typeface="Arial" charset="0"/>
+              </a:defRPr>
+            </a:lvl7pPr>
+            <a:lvl8pPr marL="3305213" indent="-220348" defTabSz="913525" eaLnBrk="0" fontAlgn="base" hangingPunct="0">
+              <a:spcBef>
+                <a:spcPct val="0"/>
+              </a:spcBef>
+              <a:spcAft>
+                <a:spcPct val="0"/>
+              </a:spcAft>
+              <a:defRPr>
+                <a:solidFill>
+                  <a:schemeClr val="tx1"/>
+                </a:solidFill>
+                <a:latin typeface="Arial" charset="0"/>
+                <a:cs typeface="Arial" charset="0"/>
+              </a:defRPr>
+            </a:lvl8pPr>
+            <a:lvl9pPr marL="3745908" indent="-220348" defTabSz="913525" eaLnBrk="0" fontAlgn="base" hangingPunct="0">
+              <a:spcBef>
+                <a:spcPct val="0"/>
+              </a:spcBef>
+              <a:spcAft>
+                <a:spcPct val="0"/>
+              </a:spcAft>
+              <a:defRPr>
+                <a:solidFill>
+                  <a:schemeClr val="tx1"/>
+                </a:solidFill>
+                <a:latin typeface="Arial" charset="0"/>
+                <a:cs typeface="Arial" charset="0"/>
+              </a:defRPr>
+            </a:lvl9pPr>
+          </a:lstStyle>
+          <a:p>
+            <a:pPr eaLnBrk="1" hangingPunct="1"/>
+            <a:fld id="{F19D4DE2-3B99-41EE-8D4F-E0DDC5188304}" type="slidenum">
+              <a:rPr lang="en-US" smtClean="0">
+                <a:latin typeface="Calibri" pitchFamily="34" charset="0"/>
+              </a:rPr>
+              <a:pPr eaLnBrk="1" hangingPunct="1"/>
+              <a:t>9</a:t>
             </a:fld>
-            <a:endParaRPr lang="en-US"/>
+            <a:endParaRPr lang="en-US">
+              <a:latin typeface="Calibri" pitchFamily="34" charset="0"/>
+            </a:endParaRPr>
           </a:p>
         </p:txBody>
       </p:sp>
     </p:spTree>
     <p:extLst>
       <p:ext uri="{BB962C8B-B14F-4D97-AF65-F5344CB8AC3E}">
-        <p14:creationId xmlns:p14="http://schemas.microsoft.com/office/powerpoint/2010/main" val="3729646274"/>
+        <p14:creationId xmlns:p14="http://schemas.microsoft.com/office/powerpoint/2010/main" val="2369573943"/>
       </p:ext>
     </p:extLst>
   </p:cSld>
@@ -4988,7 +5330,7 @@
               <a:pPr>
                 <a:defRPr/>
               </a:pPr>
-              <a:t>Tuesday, March 1, 2022</a:t>
+              <a:t>Tuesday, April 12, 2022</a:t>
             </a:fld>
             <a:endParaRPr lang="en-US" dirty="0"/>
           </a:p>
@@ -5171,7 +5513,7 @@
               <a:pPr>
                 <a:defRPr/>
               </a:pPr>
-              <a:t>Tuesday, March 1, 2022</a:t>
+              <a:t>Tuesday, April 12, 2022</a:t>
             </a:fld>
             <a:endParaRPr lang="en-US" dirty="0"/>
           </a:p>
@@ -5364,7 +5706,7 @@
               <a:pPr>
                 <a:defRPr/>
               </a:pPr>
-              <a:t>Tuesday, March 1, 2022</a:t>
+              <a:t>Tuesday, April 12, 2022</a:t>
             </a:fld>
             <a:endParaRPr lang="en-US" dirty="0"/>
           </a:p>
@@ -5547,7 +5889,7 @@
               <a:pPr>
                 <a:defRPr/>
               </a:pPr>
-              <a:t>Tuesday, March 1, 2022</a:t>
+              <a:t>Tuesday, April 12, 2022</a:t>
             </a:fld>
             <a:endParaRPr lang="en-US" dirty="0"/>
           </a:p>
@@ -5807,7 +6149,7 @@
               <a:pPr>
                 <a:defRPr/>
               </a:pPr>
-              <a:t>Tuesday, March 1, 2022</a:t>
+              <a:t>Tuesday, April 12, 2022</a:t>
             </a:fld>
             <a:endParaRPr lang="en-US"/>
           </a:p>
@@ -6107,7 +6449,7 @@
               <a:pPr>
                 <a:defRPr/>
               </a:pPr>
-              <a:t>Tuesday, March 1, 2022</a:t>
+              <a:t>Tuesday, April 12, 2022</a:t>
             </a:fld>
             <a:endParaRPr lang="en-US"/>
           </a:p>
@@ -6541,7 +6883,7 @@
               <a:pPr>
                 <a:defRPr/>
               </a:pPr>
-              <a:t>Tuesday, March 1, 2022</a:t>
+              <a:t>Tuesday, April 12, 2022</a:t>
             </a:fld>
             <a:endParaRPr lang="en-US"/>
           </a:p>
@@ -6673,7 +7015,7 @@
               <a:pPr>
                 <a:defRPr/>
               </a:pPr>
-              <a:t>Tuesday, March 1, 2022</a:t>
+              <a:t>Tuesday, April 12, 2022</a:t>
             </a:fld>
             <a:endParaRPr lang="en-US"/>
           </a:p>
@@ -6783,7 +7125,7 @@
               <a:pPr>
                 <a:defRPr/>
               </a:pPr>
-              <a:t>Tuesday, March 1, 2022</a:t>
+              <a:t>Tuesday, April 12, 2022</a:t>
             </a:fld>
             <a:endParaRPr lang="en-US" dirty="0"/>
           </a:p>
@@ -7073,7 +7415,7 @@
               <a:pPr>
                 <a:defRPr/>
               </a:pPr>
-              <a:t>Tuesday, March 1, 2022</a:t>
+              <a:t>Tuesday, April 12, 2022</a:t>
             </a:fld>
             <a:endParaRPr lang="en-US"/>
           </a:p>
@@ -7340,7 +7682,7 @@
               <a:pPr>
                 <a:defRPr/>
               </a:pPr>
-              <a:t>Tuesday, March 1, 2022</a:t>
+              <a:t>Tuesday, April 12, 2022</a:t>
             </a:fld>
             <a:endParaRPr lang="en-US"/>
           </a:p>
@@ -7566,7 +7908,7 @@
               <a:pPr>
                 <a:defRPr/>
               </a:pPr>
-              <a:t>Tuesday, March 1, 2022</a:t>
+              <a:t>Tuesday, April 12, 2022</a:t>
             </a:fld>
             <a:endParaRPr lang="en-US" dirty="0"/>
           </a:p>
@@ -8145,6 +8487,141 @@
           <a:p>
             <a:r>
               <a:rPr lang="en-US" dirty="0"/>
+              <a:t>Why?</a:t>
+            </a:r>
+          </a:p>
+        </p:txBody>
+      </p:sp>
+      <p:sp>
+        <p:nvSpPr>
+          <p:cNvPr id="3" name="Content Placeholder 2"/>
+          <p:cNvSpPr>
+            <a:spLocks noGrp="1"/>
+          </p:cNvSpPr>
+          <p:nvPr>
+            <p:ph idx="1"/>
+          </p:nvPr>
+        </p:nvSpPr>
+        <p:spPr/>
+        <p:txBody>
+          <a:bodyPr/>
+          <a:lstStyle/>
+          <a:p>
+            <a:pPr>
+              <a:defRPr/>
+            </a:pPr>
+            <a:r>
+              <a:rPr lang="en-US" dirty="0"/>
+              <a:t>Interfaces help to </a:t>
+            </a:r>
+            <a:r>
+              <a:rPr lang="en-US" b="1" dirty="0"/>
+              <a:t>reduce coupling </a:t>
+            </a:r>
+            <a:r>
+              <a:rPr lang="en-US" dirty="0"/>
+              <a:t>by having a client program coupled to the interface, not directly to a specific implementation</a:t>
+            </a:r>
+          </a:p>
+          <a:p>
+            <a:r>
+              <a:rPr lang="en-US" dirty="0"/>
+              <a:t>Similarity among classes that implement the interface is Java compiler enforced</a:t>
+            </a:r>
+          </a:p>
+        </p:txBody>
+      </p:sp>
+      <p:sp>
+        <p:nvSpPr>
+          <p:cNvPr id="4" name="TextBox 3"/>
+          <p:cNvSpPr txBox="1"/>
+          <p:nvPr/>
+        </p:nvSpPr>
+        <p:spPr>
+          <a:xfrm>
+            <a:off x="8382224" y="6324600"/>
+            <a:ext cx="457176" cy="369332"/>
+          </a:xfrm>
+          <a:prstGeom prst="rect">
+            <a:avLst/>
+          </a:prstGeom>
+        </p:spPr>
+        <p:style>
+          <a:lnRef idx="2">
+            <a:schemeClr val="accent3">
+              <a:shade val="50000"/>
+            </a:schemeClr>
+          </a:lnRef>
+          <a:fillRef idx="1">
+            <a:schemeClr val="accent3"/>
+          </a:fillRef>
+          <a:effectRef idx="0">
+            <a:schemeClr val="accent3"/>
+          </a:effectRef>
+          <a:fontRef idx="minor">
+            <a:schemeClr val="lt1"/>
+          </a:fontRef>
+        </p:style>
+        <p:txBody>
+          <a:bodyPr wrap="none" rtlCol="0">
+            <a:spAutoFit/>
+          </a:bodyPr>
+          <a:lstStyle/>
+          <a:p>
+            <a:r>
+              <a:rPr lang="en-US" dirty="0"/>
+              <a:t>Q1</a:t>
+            </a:r>
+          </a:p>
+        </p:txBody>
+      </p:sp>
+    </p:spTree>
+    <p:extLst>
+      <p:ext uri="{BB962C8B-B14F-4D97-AF65-F5344CB8AC3E}">
+        <p14:creationId xmlns:p14="http://schemas.microsoft.com/office/powerpoint/2010/main" val="1907500074"/>
+      </p:ext>
+    </p:extLst>
+  </p:cSld>
+  <p:clrMapOvr>
+    <a:masterClrMapping/>
+  </p:clrMapOvr>
+</p:sld>
+</file>
+
+<file path=ppt/slides/slide11.xml><?xml version="1.0" encoding="utf-8"?>
+<p:sld xmlns:a="http://schemas.openxmlformats.org/drawingml/2006/main" xmlns:r="http://schemas.openxmlformats.org/officeDocument/2006/relationships" xmlns:p="http://schemas.openxmlformats.org/presentationml/2006/main">
+  <p:cSld>
+    <p:spTree>
+      <p:nvGrpSpPr>
+        <p:cNvPr id="1" name=""/>
+        <p:cNvGrpSpPr/>
+        <p:nvPr/>
+      </p:nvGrpSpPr>
+      <p:grpSpPr>
+        <a:xfrm>
+          <a:off x="0" y="0"/>
+          <a:ext cx="0" cy="0"/>
+          <a:chOff x="0" y="0"/>
+          <a:chExt cx="0" cy="0"/>
+        </a:xfrm>
+      </p:grpSpPr>
+      <p:sp>
+        <p:nvSpPr>
+          <p:cNvPr id="2" name="Title 1"/>
+          <p:cNvSpPr>
+            <a:spLocks noGrp="1"/>
+          </p:cNvSpPr>
+          <p:nvPr>
+            <p:ph type="title"/>
+          </p:nvPr>
+        </p:nvSpPr>
+        <p:spPr/>
+        <p:txBody>
+          <a:bodyPr/>
+          <a:lstStyle/>
+          <a:p>
+            <a:r>
+              <a:rPr lang="en-US" dirty="0"/>
               <a:t>Open </a:t>
             </a:r>
             <a:r>
@@ -8245,7 +8722,7 @@
 </p:sld>
 </file>
 
-<file path=ppt/slides/slide11.xml><?xml version="1.0" encoding="utf-8"?>
+<file path=ppt/slides/slide12.xml><?xml version="1.0" encoding="utf-8"?>
 <p:sld xmlns:a="http://schemas.openxmlformats.org/drawingml/2006/main" xmlns:r="http://schemas.openxmlformats.org/officeDocument/2006/relationships" xmlns:p="http://schemas.openxmlformats.org/presentationml/2006/main">
   <p:cSld>
     <p:spTree>
@@ -8493,7 +8970,7 @@
 </p:sld>
 </file>
 
-<file path=ppt/slides/slide12.xml><?xml version="1.0" encoding="utf-8"?>
+<file path=ppt/slides/slide13.xml><?xml version="1.0" encoding="utf-8"?>
 <p:sld xmlns:a="http://schemas.openxmlformats.org/drawingml/2006/main" xmlns:r="http://schemas.openxmlformats.org/officeDocument/2006/relationships" xmlns:p="http://schemas.openxmlformats.org/presentationml/2006/main">
   <p:cSld>
     <p:spTree>
@@ -8784,7 +9261,7 @@
 </p:sld>
 </file>
 
-<file path=ppt/slides/slide13.xml><?xml version="1.0" encoding="utf-8"?>
+<file path=ppt/slides/slide14.xml><?xml version="1.0" encoding="utf-8"?>
 <p:sld xmlns:a="http://schemas.openxmlformats.org/drawingml/2006/main" xmlns:r="http://schemas.openxmlformats.org/officeDocument/2006/relationships" xmlns:p="http://schemas.openxmlformats.org/presentationml/2006/main">
   <p:cSld>
     <p:spTree>
@@ -9041,7 +9518,7 @@
 </p:sld>
 </file>
 
-<file path=ppt/slides/slide14.xml><?xml version="1.0" encoding="utf-8"?>
+<file path=ppt/slides/slide15.xml><?xml version="1.0" encoding="utf-8"?>
 <p:sld xmlns:a="http://schemas.openxmlformats.org/drawingml/2006/main" xmlns:r="http://schemas.openxmlformats.org/officeDocument/2006/relationships" xmlns:p="http://schemas.openxmlformats.org/presentationml/2006/main">
   <p:cSld>
     <p:spTree>
@@ -9547,7 +10024,7 @@
 </p:sld>
 </file>
 
-<file path=ppt/slides/slide15.xml><?xml version="1.0" encoding="utf-8"?>
+<file path=ppt/slides/slide16.xml><?xml version="1.0" encoding="utf-8"?>
 <p:sld xmlns:a="http://schemas.openxmlformats.org/drawingml/2006/main" xmlns:r="http://schemas.openxmlformats.org/officeDocument/2006/relationships" xmlns:p="http://schemas.openxmlformats.org/presentationml/2006/main">
   <p:cSld>
     <p:spTree>
@@ -10063,7 +10540,7 @@
 </p:sld>
 </file>
 
-<file path=ppt/slides/slide16.xml><?xml version="1.0" encoding="utf-8"?>
+<file path=ppt/slides/slide17.xml><?xml version="1.0" encoding="utf-8"?>
 <p:sld xmlns:a="http://schemas.openxmlformats.org/drawingml/2006/main" xmlns:r="http://schemas.openxmlformats.org/officeDocument/2006/relationships" xmlns:p="http://schemas.openxmlformats.org/presentationml/2006/main">
   <p:cSld>
     <p:spTree>
@@ -10378,7 +10855,7 @@
 </p:sld>
 </file>
 
-<file path=ppt/slides/slide17.xml><?xml version="1.0" encoding="utf-8"?>
+<file path=ppt/slides/slide18.xml><?xml version="1.0" encoding="utf-8"?>
 <p:sld xmlns:a="http://schemas.openxmlformats.org/drawingml/2006/main" xmlns:r="http://schemas.openxmlformats.org/officeDocument/2006/relationships" xmlns:p="http://schemas.openxmlformats.org/presentationml/2006/main">
   <p:cSld>
     <p:spTree>
@@ -11080,342 +11557,6 @@
 </p:sld>
 </file>
 
-<file path=ppt/slides/slide18.xml><?xml version="1.0" encoding="utf-8"?>
-<p:sld xmlns:a="http://schemas.openxmlformats.org/drawingml/2006/main" xmlns:r="http://schemas.openxmlformats.org/officeDocument/2006/relationships" xmlns:p="http://schemas.openxmlformats.org/presentationml/2006/main">
-  <p:cSld>
-    <p:spTree>
-      <p:nvGrpSpPr>
-        <p:cNvPr id="1" name=""/>
-        <p:cNvGrpSpPr/>
-        <p:nvPr/>
-      </p:nvGrpSpPr>
-      <p:grpSpPr>
-        <a:xfrm>
-          <a:off x="0" y="0"/>
-          <a:ext cx="0" cy="0"/>
-          <a:chOff x="0" y="0"/>
-          <a:chExt cx="0" cy="0"/>
-        </a:xfrm>
-      </p:grpSpPr>
-      <p:sp>
-        <p:nvSpPr>
-          <p:cNvPr id="2" name="Title 1"/>
-          <p:cNvSpPr>
-            <a:spLocks noGrp="1"/>
-          </p:cNvSpPr>
-          <p:nvPr>
-            <p:ph type="title"/>
-          </p:nvPr>
-        </p:nvSpPr>
-        <p:spPr/>
-        <p:txBody>
-          <a:bodyPr/>
-          <a:lstStyle/>
-          <a:p>
-            <a:r>
-              <a:rPr lang="en-US" dirty="0"/>
-              <a:t>Check your understanding…</a:t>
-            </a:r>
-          </a:p>
-        </p:txBody>
-      </p:sp>
-      <p:sp>
-        <p:nvSpPr>
-          <p:cNvPr id="3" name="Content Placeholder 2"/>
-          <p:cNvSpPr>
-            <a:spLocks noGrp="1"/>
-          </p:cNvSpPr>
-          <p:nvPr>
-            <p:ph idx="1"/>
-          </p:nvPr>
-        </p:nvSpPr>
-        <p:spPr>
-          <a:xfrm>
-            <a:off x="457200" y="1219200"/>
-            <a:ext cx="8229600" cy="3733800"/>
-          </a:xfrm>
-          <a:ln>
-            <a:solidFill>
-              <a:schemeClr val="accent1">
-                <a:shade val="50000"/>
-              </a:schemeClr>
-            </a:solidFill>
-          </a:ln>
-        </p:spPr>
-        <p:txBody>
-          <a:bodyPr>
-            <a:normAutofit/>
-          </a:bodyPr>
-          <a:lstStyle/>
-          <a:p>
-            <a:pPr marL="0" indent="0">
-              <a:buNone/>
-            </a:pPr>
-            <a:r>
-              <a:rPr lang="en-US" sz="2000" b="1" dirty="0">
-                <a:latin typeface="Courier New" panose="02070309020205020404" pitchFamily="49" charset="0"/>
-                <a:cs typeface="Courier New" panose="02070309020205020404" pitchFamily="49" charset="0"/>
-              </a:rPr>
-              <a:t>public</a:t>
-            </a:r>
-            <a:r>
-              <a:rPr lang="en-US" sz="2000" dirty="0">
-                <a:latin typeface="Courier New" panose="02070309020205020404" pitchFamily="49" charset="0"/>
-                <a:cs typeface="Courier New" panose="02070309020205020404" pitchFamily="49" charset="0"/>
-              </a:rPr>
-              <a:t> </a:t>
-            </a:r>
-            <a:r>
-              <a:rPr lang="en-US" sz="2000" b="1" dirty="0">
-                <a:latin typeface="Courier New" panose="02070309020205020404" pitchFamily="49" charset="0"/>
-                <a:cs typeface="Courier New" panose="02070309020205020404" pitchFamily="49" charset="0"/>
-              </a:rPr>
-              <a:t>interface</a:t>
-            </a:r>
-            <a:r>
-              <a:rPr lang="en-US" sz="2000" dirty="0">
-                <a:latin typeface="Courier New" panose="02070309020205020404" pitchFamily="49" charset="0"/>
-                <a:cs typeface="Courier New" panose="02070309020205020404" pitchFamily="49" charset="0"/>
-              </a:rPr>
-              <a:t> Pet{</a:t>
-            </a:r>
-          </a:p>
-          <a:p>
-            <a:pPr marL="0" indent="0">
-              <a:buNone/>
-            </a:pPr>
-            <a:r>
-              <a:rPr lang="en-US" sz="2000" dirty="0">
-                <a:latin typeface="Courier New" panose="02070309020205020404" pitchFamily="49" charset="0"/>
-                <a:cs typeface="Courier New" panose="02070309020205020404" pitchFamily="49" charset="0"/>
-              </a:rPr>
-              <a:t>    </a:t>
-            </a:r>
-            <a:r>
-              <a:rPr lang="en-US" sz="2000" b="1" dirty="0">
-                <a:latin typeface="Courier New" panose="02070309020205020404" pitchFamily="49" charset="0"/>
-                <a:cs typeface="Courier New" panose="02070309020205020404" pitchFamily="49" charset="0"/>
-              </a:rPr>
-              <a:t>private</a:t>
-            </a:r>
-            <a:r>
-              <a:rPr lang="en-US" sz="2000" dirty="0">
-                <a:latin typeface="Courier New" panose="02070309020205020404" pitchFamily="49" charset="0"/>
-                <a:cs typeface="Courier New" panose="02070309020205020404" pitchFamily="49" charset="0"/>
-              </a:rPr>
-              <a:t> String name;</a:t>
-            </a:r>
-          </a:p>
-          <a:p>
-            <a:pPr marL="0" indent="0">
-              <a:buNone/>
-            </a:pPr>
-            <a:endParaRPr lang="en-US" sz="2000" dirty="0">
-              <a:latin typeface="Courier New" panose="02070309020205020404" pitchFamily="49" charset="0"/>
-              <a:cs typeface="Courier New" panose="02070309020205020404" pitchFamily="49" charset="0"/>
-            </a:endParaRPr>
-          </a:p>
-          <a:p>
-            <a:pPr marL="0" indent="0">
-              <a:buNone/>
-            </a:pPr>
-            <a:r>
-              <a:rPr lang="en-US" sz="2000" dirty="0">
-                <a:latin typeface="Courier New" panose="02070309020205020404" pitchFamily="49" charset="0"/>
-                <a:cs typeface="Courier New" panose="02070309020205020404" pitchFamily="49" charset="0"/>
-              </a:rPr>
-              <a:t>    </a:t>
-            </a:r>
-            <a:r>
-              <a:rPr lang="en-US" sz="2000" b="1" dirty="0">
-                <a:latin typeface="Courier New" panose="02070309020205020404" pitchFamily="49" charset="0"/>
-                <a:cs typeface="Courier New" panose="02070309020205020404" pitchFamily="49" charset="0"/>
-              </a:rPr>
-              <a:t>public</a:t>
-            </a:r>
-            <a:r>
-              <a:rPr lang="en-US" sz="2000" dirty="0">
-                <a:latin typeface="Courier New" panose="02070309020205020404" pitchFamily="49" charset="0"/>
-                <a:cs typeface="Courier New" panose="02070309020205020404" pitchFamily="49" charset="0"/>
-              </a:rPr>
-              <a:t> Pet(String name){</a:t>
-            </a:r>
-          </a:p>
-          <a:p>
-            <a:pPr marL="0" indent="0">
-              <a:buNone/>
-            </a:pPr>
-            <a:r>
-              <a:rPr lang="en-US" sz="2000" dirty="0">
-                <a:latin typeface="Courier New" panose="02070309020205020404" pitchFamily="49" charset="0"/>
-                <a:cs typeface="Courier New" panose="02070309020205020404" pitchFamily="49" charset="0"/>
-              </a:rPr>
-              <a:t>        this.name = name;</a:t>
-            </a:r>
-          </a:p>
-          <a:p>
-            <a:pPr marL="0" indent="0">
-              <a:buNone/>
-            </a:pPr>
-            <a:r>
-              <a:rPr lang="en-US" sz="2000" dirty="0">
-                <a:latin typeface="Courier New" panose="02070309020205020404" pitchFamily="49" charset="0"/>
-                <a:cs typeface="Courier New" panose="02070309020205020404" pitchFamily="49" charset="0"/>
-              </a:rPr>
-              <a:t>    }</a:t>
-            </a:r>
-          </a:p>
-          <a:p>
-            <a:pPr marL="0" indent="0">
-              <a:buNone/>
-            </a:pPr>
-            <a:r>
-              <a:rPr lang="en-US" sz="2000" dirty="0">
-                <a:latin typeface="Courier New" panose="02070309020205020404" pitchFamily="49" charset="0"/>
-                <a:cs typeface="Courier New" panose="02070309020205020404" pitchFamily="49" charset="0"/>
-              </a:rPr>
-              <a:t>    </a:t>
-            </a:r>
-            <a:r>
-              <a:rPr lang="en-US" sz="2000" b="1" dirty="0">
-                <a:latin typeface="Courier New" panose="02070309020205020404" pitchFamily="49" charset="0"/>
-                <a:cs typeface="Courier New" panose="02070309020205020404" pitchFamily="49" charset="0"/>
-              </a:rPr>
-              <a:t>public</a:t>
-            </a:r>
-            <a:r>
-              <a:rPr lang="en-US" sz="2000" dirty="0">
-                <a:latin typeface="Courier New" panose="02070309020205020404" pitchFamily="49" charset="0"/>
-                <a:cs typeface="Courier New" panose="02070309020205020404" pitchFamily="49" charset="0"/>
-              </a:rPr>
-              <a:t> </a:t>
-            </a:r>
-            <a:r>
-              <a:rPr lang="en-US" sz="2000" b="1" dirty="0">
-                <a:latin typeface="Courier New" panose="02070309020205020404" pitchFamily="49" charset="0"/>
-                <a:cs typeface="Courier New" panose="02070309020205020404" pitchFamily="49" charset="0"/>
-              </a:rPr>
-              <a:t>void</a:t>
-            </a:r>
-            <a:r>
-              <a:rPr lang="en-US" sz="2000" dirty="0">
-                <a:latin typeface="Courier New" panose="02070309020205020404" pitchFamily="49" charset="0"/>
-                <a:cs typeface="Courier New" panose="02070309020205020404" pitchFamily="49" charset="0"/>
-              </a:rPr>
-              <a:t> speak(){</a:t>
-            </a:r>
-          </a:p>
-          <a:p>
-            <a:pPr marL="0" indent="0">
-              <a:buNone/>
-            </a:pPr>
-            <a:r>
-              <a:rPr lang="en-US" sz="2000" dirty="0">
-                <a:latin typeface="Courier New" panose="02070309020205020404" pitchFamily="49" charset="0"/>
-                <a:cs typeface="Courier New" panose="02070309020205020404" pitchFamily="49" charset="0"/>
-              </a:rPr>
-              <a:t>        </a:t>
-            </a:r>
-            <a:r>
-              <a:rPr lang="en-US" sz="2000" dirty="0" err="1">
-                <a:latin typeface="Courier New" panose="02070309020205020404" pitchFamily="49" charset="0"/>
-                <a:cs typeface="Courier New" panose="02070309020205020404" pitchFamily="49" charset="0"/>
-              </a:rPr>
-              <a:t>System.out.println</a:t>
-            </a:r>
-            <a:r>
-              <a:rPr lang="en-US" sz="2000" dirty="0">
-                <a:latin typeface="Courier New" panose="02070309020205020404" pitchFamily="49" charset="0"/>
-                <a:cs typeface="Courier New" panose="02070309020205020404" pitchFamily="49" charset="0"/>
-              </a:rPr>
-              <a:t>(name);</a:t>
-            </a:r>
-          </a:p>
-          <a:p>
-            <a:pPr marL="0" indent="0">
-              <a:buNone/>
-            </a:pPr>
-            <a:r>
-              <a:rPr lang="en-US" sz="2000" dirty="0">
-                <a:latin typeface="Courier New" panose="02070309020205020404" pitchFamily="49" charset="0"/>
-                <a:cs typeface="Courier New" panose="02070309020205020404" pitchFamily="49" charset="0"/>
-              </a:rPr>
-              <a:t>    }</a:t>
-            </a:r>
-          </a:p>
-          <a:p>
-            <a:pPr marL="0" indent="0">
-              <a:buNone/>
-            </a:pPr>
-            <a:r>
-              <a:rPr lang="en-US" sz="2000" dirty="0">
-                <a:latin typeface="Courier New" panose="02070309020205020404" pitchFamily="49" charset="0"/>
-                <a:cs typeface="Courier New" panose="02070309020205020404" pitchFamily="49" charset="0"/>
-              </a:rPr>
-              <a:t>}</a:t>
-            </a:r>
-          </a:p>
-        </p:txBody>
-      </p:sp>
-      <p:sp>
-        <p:nvSpPr>
-          <p:cNvPr id="4" name="TextBox 3"/>
-          <p:cNvSpPr txBox="1"/>
-          <p:nvPr/>
-        </p:nvSpPr>
-        <p:spPr>
-          <a:xfrm>
-            <a:off x="3048000" y="5029200"/>
-            <a:ext cx="5261377" cy="1384995"/>
-          </a:xfrm>
-          <a:prstGeom prst="rect">
-            <a:avLst/>
-          </a:prstGeom>
-          <a:noFill/>
-          <a:ln>
-            <a:solidFill>
-              <a:schemeClr val="tx1"/>
-            </a:solidFill>
-          </a:ln>
-        </p:spPr>
-        <p:txBody>
-          <a:bodyPr wrap="none" rtlCol="0">
-            <a:spAutoFit/>
-          </a:bodyPr>
-          <a:lstStyle/>
-          <a:p>
-            <a:r>
-              <a:rPr lang="en-US" sz="2800" dirty="0"/>
-              <a:t>Is this a valid interface? </a:t>
-            </a:r>
-          </a:p>
-          <a:p>
-            <a:r>
-              <a:rPr lang="en-US" sz="2800" dirty="0"/>
-              <a:t>Why or why not?</a:t>
-            </a:r>
-          </a:p>
-          <a:p>
-            <a:r>
-              <a:rPr lang="en-US" sz="2800" dirty="0"/>
-              <a:t>List all the reasons it is not valid</a:t>
-            </a:r>
-          </a:p>
-        </p:txBody>
-      </p:sp>
-    </p:spTree>
-    <p:extLst>
-      <p:ext uri="{BB962C8B-B14F-4D97-AF65-F5344CB8AC3E}">
-        <p14:creationId xmlns:p14="http://schemas.microsoft.com/office/powerpoint/2010/main" val="1781697480"/>
-      </p:ext>
-    </p:extLst>
-  </p:cSld>
-  <p:clrMapOvr>
-    <a:masterClrMapping/>
-  </p:clrMapOvr>
-</p:sld>
-</file>
-
 <file path=ppt/slides/slide19.xml><?xml version="1.0" encoding="utf-8"?>
 <p:sld xmlns:a="http://schemas.openxmlformats.org/drawingml/2006/main" xmlns:r="http://schemas.openxmlformats.org/officeDocument/2006/relationships" xmlns:p="http://schemas.openxmlformats.org/presentationml/2006/main">
   <p:cSld>
@@ -11450,7 +11591,7 @@
           <a:p>
             <a:r>
               <a:rPr lang="en-US" dirty="0"/>
-              <a:t>Valid interface</a:t>
+              <a:t>Check your understanding…</a:t>
             </a:r>
           </a:p>
         </p:txBody>
@@ -11467,12 +11608,14 @@
         </p:nvSpPr>
         <p:spPr>
           <a:xfrm>
-            <a:off x="457200" y="1600201"/>
-            <a:ext cx="8229600" cy="1143000"/>
+            <a:off x="457200" y="1219200"/>
+            <a:ext cx="8229600" cy="3733800"/>
           </a:xfrm>
           <a:ln>
             <a:solidFill>
-              <a:schemeClr val="tx1"/>
+              <a:schemeClr val="accent1">
+                <a:shade val="50000"/>
+              </a:schemeClr>
             </a:solidFill>
           </a:ln>
         </p:spPr>
@@ -11530,39 +11673,162 @@
                 <a:latin typeface="Courier New" panose="02070309020205020404" pitchFamily="49" charset="0"/>
                 <a:cs typeface="Courier New" panose="02070309020205020404" pitchFamily="49" charset="0"/>
               </a:rPr>
-              <a:t>public</a:t>
+              <a:t>private</a:t>
             </a:r>
             <a:r>
               <a:rPr lang="en-US" sz="2000" dirty="0">
                 <a:latin typeface="Courier New" panose="02070309020205020404" pitchFamily="49" charset="0"/>
                 <a:cs typeface="Courier New" panose="02070309020205020404" pitchFamily="49" charset="0"/>
               </a:rPr>
-              <a:t> </a:t>
-            </a:r>
-            <a:r>
-              <a:rPr lang="en-US" sz="2000" b="1" dirty="0">
-                <a:latin typeface="Courier New" panose="02070309020205020404" pitchFamily="49" charset="0"/>
-                <a:cs typeface="Courier New" panose="02070309020205020404" pitchFamily="49" charset="0"/>
-              </a:rPr>
-              <a:t>void</a:t>
-            </a:r>
-            <a:r>
-              <a:rPr lang="en-US" sz="2000" dirty="0">
-                <a:latin typeface="Courier New" panose="02070309020205020404" pitchFamily="49" charset="0"/>
-                <a:cs typeface="Courier New" panose="02070309020205020404" pitchFamily="49" charset="0"/>
-              </a:rPr>
-              <a:t> speak();</a:t>
+              <a:t> String name;</a:t>
             </a:r>
           </a:p>
           <a:p>
             <a:pPr marL="0" indent="0">
               <a:buNone/>
             </a:pPr>
+            <a:endParaRPr lang="en-US" sz="2000" dirty="0">
+              <a:latin typeface="Courier New" panose="02070309020205020404" pitchFamily="49" charset="0"/>
+              <a:cs typeface="Courier New" panose="02070309020205020404" pitchFamily="49" charset="0"/>
+            </a:endParaRPr>
+          </a:p>
+          <a:p>
+            <a:pPr marL="0" indent="0">
+              <a:buNone/>
+            </a:pPr>
             <a:r>
               <a:rPr lang="en-US" sz="2000" dirty="0">
                 <a:latin typeface="Courier New" panose="02070309020205020404" pitchFamily="49" charset="0"/>
                 <a:cs typeface="Courier New" panose="02070309020205020404" pitchFamily="49" charset="0"/>
               </a:rPr>
+              <a:t>    </a:t>
+            </a:r>
+            <a:r>
+              <a:rPr lang="en-US" sz="2000" b="1" dirty="0">
+                <a:latin typeface="Courier New" panose="02070309020205020404" pitchFamily="49" charset="0"/>
+                <a:cs typeface="Courier New" panose="02070309020205020404" pitchFamily="49" charset="0"/>
+              </a:rPr>
+              <a:t>public</a:t>
+            </a:r>
+            <a:r>
+              <a:rPr lang="en-US" sz="2000" dirty="0">
+                <a:latin typeface="Courier New" panose="02070309020205020404" pitchFamily="49" charset="0"/>
+                <a:cs typeface="Courier New" panose="02070309020205020404" pitchFamily="49" charset="0"/>
+              </a:rPr>
+              <a:t> Pet(String name){</a:t>
+            </a:r>
+          </a:p>
+          <a:p>
+            <a:pPr marL="0" indent="0">
+              <a:buNone/>
+            </a:pPr>
+            <a:r>
+              <a:rPr lang="en-US" sz="2000" dirty="0">
+                <a:latin typeface="Courier New" panose="02070309020205020404" pitchFamily="49" charset="0"/>
+                <a:cs typeface="Courier New" panose="02070309020205020404" pitchFamily="49" charset="0"/>
+              </a:rPr>
+              <a:t>        this.name = name;</a:t>
+            </a:r>
+          </a:p>
+          <a:p>
+            <a:pPr marL="0" indent="0">
+              <a:buNone/>
+            </a:pPr>
+            <a:r>
+              <a:rPr lang="en-US" sz="2000" dirty="0">
+                <a:latin typeface="Courier New" panose="02070309020205020404" pitchFamily="49" charset="0"/>
+                <a:cs typeface="Courier New" panose="02070309020205020404" pitchFamily="49" charset="0"/>
+              </a:rPr>
+              <a:t>    }</a:t>
+            </a:r>
+          </a:p>
+          <a:p>
+            <a:pPr marL="0" indent="0">
+              <a:buNone/>
+            </a:pPr>
+            <a:r>
+              <a:rPr lang="en-US" sz="2000" dirty="0">
+                <a:latin typeface="Courier New" panose="02070309020205020404" pitchFamily="49" charset="0"/>
+                <a:cs typeface="Courier New" panose="02070309020205020404" pitchFamily="49" charset="0"/>
+              </a:rPr>
+              <a:t>    </a:t>
+            </a:r>
+            <a:r>
+              <a:rPr lang="en-US" sz="2000" b="1" dirty="0">
+                <a:latin typeface="Courier New" panose="02070309020205020404" pitchFamily="49" charset="0"/>
+                <a:cs typeface="Courier New" panose="02070309020205020404" pitchFamily="49" charset="0"/>
+              </a:rPr>
+              <a:t>public</a:t>
+            </a:r>
+            <a:r>
+              <a:rPr lang="en-US" sz="2000" dirty="0">
+                <a:latin typeface="Courier New" panose="02070309020205020404" pitchFamily="49" charset="0"/>
+                <a:cs typeface="Courier New" panose="02070309020205020404" pitchFamily="49" charset="0"/>
+              </a:rPr>
+              <a:t> </a:t>
+            </a:r>
+            <a:r>
+              <a:rPr lang="en-US" sz="2000" b="1" dirty="0">
+                <a:latin typeface="Courier New" panose="02070309020205020404" pitchFamily="49" charset="0"/>
+                <a:cs typeface="Courier New" panose="02070309020205020404" pitchFamily="49" charset="0"/>
+              </a:rPr>
+              <a:t>void</a:t>
+            </a:r>
+            <a:r>
+              <a:rPr lang="en-US" sz="2000" dirty="0">
+                <a:latin typeface="Courier New" panose="02070309020205020404" pitchFamily="49" charset="0"/>
+                <a:cs typeface="Courier New" panose="02070309020205020404" pitchFamily="49" charset="0"/>
+              </a:rPr>
+              <a:t> speak(){</a:t>
+            </a:r>
+          </a:p>
+          <a:p>
+            <a:pPr marL="0" indent="0">
+              <a:buNone/>
+            </a:pPr>
+            <a:r>
+              <a:rPr lang="en-US" sz="2000" dirty="0">
+                <a:latin typeface="Courier New" panose="02070309020205020404" pitchFamily="49" charset="0"/>
+                <a:cs typeface="Courier New" panose="02070309020205020404" pitchFamily="49" charset="0"/>
+              </a:rPr>
+              <a:t>        </a:t>
+            </a:r>
+            <a:r>
+              <a:rPr lang="en-US" sz="2000" dirty="0" err="1">
+                <a:latin typeface="Courier New" panose="02070309020205020404" pitchFamily="49" charset="0"/>
+                <a:cs typeface="Courier New" panose="02070309020205020404" pitchFamily="49" charset="0"/>
+              </a:rPr>
+              <a:t>System.out.println</a:t>
+            </a:r>
+            <a:r>
+              <a:rPr lang="en-US" sz="2000" dirty="0">
+                <a:latin typeface="Courier New" panose="02070309020205020404" pitchFamily="49" charset="0"/>
+                <a:cs typeface="Courier New" panose="02070309020205020404" pitchFamily="49" charset="0"/>
+              </a:rPr>
+              <a:t>(name);</a:t>
+            </a:r>
+          </a:p>
+          <a:p>
+            <a:pPr marL="0" indent="0">
+              <a:buNone/>
+            </a:pPr>
+            <a:r>
+              <a:rPr lang="en-US" sz="2000" dirty="0">
+                <a:latin typeface="Courier New" panose="02070309020205020404" pitchFamily="49" charset="0"/>
+                <a:cs typeface="Courier New" panose="02070309020205020404" pitchFamily="49" charset="0"/>
+              </a:rPr>
+              <a:t>    }</a:t>
+            </a:r>
+          </a:p>
+          <a:p>
+            <a:pPr marL="0" indent="0">
+              <a:buNone/>
+            </a:pPr>
+            <a:r>
+              <a:rPr lang="en-US" sz="2000" dirty="0">
+                <a:latin typeface="Courier New" panose="02070309020205020404" pitchFamily="49" charset="0"/>
+                <a:cs typeface="Courier New" panose="02070309020205020404" pitchFamily="49" charset="0"/>
+              </a:rPr>
               <a:t>}</a:t>
             </a:r>
           </a:p>
@@ -11570,14 +11836,14 @@
       </p:sp>
       <p:sp>
         <p:nvSpPr>
-          <p:cNvPr id="5" name="TextBox 4"/>
+          <p:cNvPr id="4" name="TextBox 3"/>
           <p:cNvSpPr txBox="1"/>
           <p:nvPr/>
         </p:nvSpPr>
         <p:spPr>
           <a:xfrm>
-            <a:off x="2286000" y="2971800"/>
-            <a:ext cx="4229043" cy="1815882"/>
+            <a:off x="3048000" y="5029200"/>
+            <a:ext cx="5261377" cy="1384995"/>
           </a:xfrm>
           <a:prstGeom prst="rect">
             <a:avLst/>
@@ -11597,37 +11863,19 @@
           <a:p>
             <a:r>
               <a:rPr lang="en-US" sz="2800" dirty="0"/>
-              <a:t>What happened to:</a:t>
-            </a:r>
-          </a:p>
-          <a:p>
-            <a:pPr marL="457200" indent="-457200">
-              <a:buFont typeface="Arial" panose="020B0604020202020204" pitchFamily="34" charset="0"/>
-              <a:buChar char="•"/>
-            </a:pPr>
+              <a:t>Is this a valid interface? </a:t>
+            </a:r>
+          </a:p>
+          <a:p>
             <a:r>
               <a:rPr lang="en-US" sz="2800" dirty="0"/>
-              <a:t>The fieldname?</a:t>
-            </a:r>
-          </a:p>
-          <a:p>
-            <a:pPr marL="457200" indent="-457200">
-              <a:buFont typeface="Arial" panose="020B0604020202020204" pitchFamily="34" charset="0"/>
-              <a:buChar char="•"/>
-            </a:pPr>
+              <a:t>Why or why not?</a:t>
+            </a:r>
+          </a:p>
+          <a:p>
             <a:r>
               <a:rPr lang="en-US" sz="2800" dirty="0"/>
-              <a:t>The operation bodies?</a:t>
-            </a:r>
-          </a:p>
-          <a:p>
-            <a:pPr marL="457200" indent="-457200">
-              <a:buFont typeface="Arial" panose="020B0604020202020204" pitchFamily="34" charset="0"/>
-              <a:buChar char="•"/>
-            </a:pPr>
-            <a:r>
-              <a:rPr lang="en-US" sz="2800" dirty="0"/>
-              <a:t>The constructor?</a:t>
+              <a:t>List all the reasons it is not valid</a:t>
             </a:r>
           </a:p>
         </p:txBody>
@@ -11635,7 +11883,7 @@
     </p:spTree>
     <p:extLst>
       <p:ext uri="{BB962C8B-B14F-4D97-AF65-F5344CB8AC3E}">
-        <p14:creationId xmlns:p14="http://schemas.microsoft.com/office/powerpoint/2010/main" val="641702362"/>
+        <p14:creationId xmlns:p14="http://schemas.microsoft.com/office/powerpoint/2010/main" val="1781697480"/>
       </p:ext>
     </p:extLst>
   </p:cSld>
@@ -11792,6 +12040,235 @@
         </p:nvSpPr>
         <p:spPr/>
         <p:txBody>
+          <a:bodyPr/>
+          <a:lstStyle/>
+          <a:p>
+            <a:r>
+              <a:rPr lang="en-US" dirty="0"/>
+              <a:t>Valid interface</a:t>
+            </a:r>
+          </a:p>
+        </p:txBody>
+      </p:sp>
+      <p:sp>
+        <p:nvSpPr>
+          <p:cNvPr id="3" name="Content Placeholder 2"/>
+          <p:cNvSpPr>
+            <a:spLocks noGrp="1"/>
+          </p:cNvSpPr>
+          <p:nvPr>
+            <p:ph idx="1"/>
+          </p:nvPr>
+        </p:nvSpPr>
+        <p:spPr>
+          <a:xfrm>
+            <a:off x="457200" y="1600201"/>
+            <a:ext cx="8229600" cy="1143000"/>
+          </a:xfrm>
+          <a:ln>
+            <a:solidFill>
+              <a:schemeClr val="tx1"/>
+            </a:solidFill>
+          </a:ln>
+        </p:spPr>
+        <p:txBody>
+          <a:bodyPr>
+            <a:normAutofit/>
+          </a:bodyPr>
+          <a:lstStyle/>
+          <a:p>
+            <a:pPr marL="0" indent="0">
+              <a:buNone/>
+            </a:pPr>
+            <a:r>
+              <a:rPr lang="en-US" sz="2000" b="1" dirty="0">
+                <a:latin typeface="Courier New" panose="02070309020205020404" pitchFamily="49" charset="0"/>
+                <a:cs typeface="Courier New" panose="02070309020205020404" pitchFamily="49" charset="0"/>
+              </a:rPr>
+              <a:t>public</a:t>
+            </a:r>
+            <a:r>
+              <a:rPr lang="en-US" sz="2000" dirty="0">
+                <a:latin typeface="Courier New" panose="02070309020205020404" pitchFamily="49" charset="0"/>
+                <a:cs typeface="Courier New" panose="02070309020205020404" pitchFamily="49" charset="0"/>
+              </a:rPr>
+              <a:t> </a:t>
+            </a:r>
+            <a:r>
+              <a:rPr lang="en-US" sz="2000" b="1" dirty="0">
+                <a:latin typeface="Courier New" panose="02070309020205020404" pitchFamily="49" charset="0"/>
+                <a:cs typeface="Courier New" panose="02070309020205020404" pitchFamily="49" charset="0"/>
+              </a:rPr>
+              <a:t>interface</a:t>
+            </a:r>
+            <a:r>
+              <a:rPr lang="en-US" sz="2000" dirty="0">
+                <a:latin typeface="Courier New" panose="02070309020205020404" pitchFamily="49" charset="0"/>
+                <a:cs typeface="Courier New" panose="02070309020205020404" pitchFamily="49" charset="0"/>
+              </a:rPr>
+              <a:t> Pet{</a:t>
+            </a:r>
+          </a:p>
+          <a:p>
+            <a:pPr marL="0" indent="0">
+              <a:buNone/>
+            </a:pPr>
+            <a:r>
+              <a:rPr lang="en-US" sz="2000" dirty="0">
+                <a:latin typeface="Courier New" panose="02070309020205020404" pitchFamily="49" charset="0"/>
+                <a:cs typeface="Courier New" panose="02070309020205020404" pitchFamily="49" charset="0"/>
+              </a:rPr>
+              <a:t>    </a:t>
+            </a:r>
+            <a:r>
+              <a:rPr lang="en-US" sz="2000" b="1" dirty="0">
+                <a:latin typeface="Courier New" panose="02070309020205020404" pitchFamily="49" charset="0"/>
+                <a:cs typeface="Courier New" panose="02070309020205020404" pitchFamily="49" charset="0"/>
+              </a:rPr>
+              <a:t>public</a:t>
+            </a:r>
+            <a:r>
+              <a:rPr lang="en-US" sz="2000" dirty="0">
+                <a:latin typeface="Courier New" panose="02070309020205020404" pitchFamily="49" charset="0"/>
+                <a:cs typeface="Courier New" panose="02070309020205020404" pitchFamily="49" charset="0"/>
+              </a:rPr>
+              <a:t> </a:t>
+            </a:r>
+            <a:r>
+              <a:rPr lang="en-US" sz="2000" b="1" dirty="0">
+                <a:latin typeface="Courier New" panose="02070309020205020404" pitchFamily="49" charset="0"/>
+                <a:cs typeface="Courier New" panose="02070309020205020404" pitchFamily="49" charset="0"/>
+              </a:rPr>
+              <a:t>void</a:t>
+            </a:r>
+            <a:r>
+              <a:rPr lang="en-US" sz="2000" dirty="0">
+                <a:latin typeface="Courier New" panose="02070309020205020404" pitchFamily="49" charset="0"/>
+                <a:cs typeface="Courier New" panose="02070309020205020404" pitchFamily="49" charset="0"/>
+              </a:rPr>
+              <a:t> speak();</a:t>
+            </a:r>
+          </a:p>
+          <a:p>
+            <a:pPr marL="0" indent="0">
+              <a:buNone/>
+            </a:pPr>
+            <a:r>
+              <a:rPr lang="en-US" sz="2000" dirty="0">
+                <a:latin typeface="Courier New" panose="02070309020205020404" pitchFamily="49" charset="0"/>
+                <a:cs typeface="Courier New" panose="02070309020205020404" pitchFamily="49" charset="0"/>
+              </a:rPr>
+              <a:t>}</a:t>
+            </a:r>
+          </a:p>
+        </p:txBody>
+      </p:sp>
+      <p:sp>
+        <p:nvSpPr>
+          <p:cNvPr id="5" name="TextBox 4"/>
+          <p:cNvSpPr txBox="1"/>
+          <p:nvPr/>
+        </p:nvSpPr>
+        <p:spPr>
+          <a:xfrm>
+            <a:off x="2286000" y="2971800"/>
+            <a:ext cx="4229043" cy="1815882"/>
+          </a:xfrm>
+          <a:prstGeom prst="rect">
+            <a:avLst/>
+          </a:prstGeom>
+          <a:noFill/>
+          <a:ln>
+            <a:solidFill>
+              <a:schemeClr val="tx1"/>
+            </a:solidFill>
+          </a:ln>
+        </p:spPr>
+        <p:txBody>
+          <a:bodyPr wrap="none" rtlCol="0">
+            <a:spAutoFit/>
+          </a:bodyPr>
+          <a:lstStyle/>
+          <a:p>
+            <a:r>
+              <a:rPr lang="en-US" sz="2800" dirty="0"/>
+              <a:t>What happened to:</a:t>
+            </a:r>
+          </a:p>
+          <a:p>
+            <a:pPr marL="457200" indent="-457200">
+              <a:buFont typeface="Arial" panose="020B0604020202020204" pitchFamily="34" charset="0"/>
+              <a:buChar char="•"/>
+            </a:pPr>
+            <a:r>
+              <a:rPr lang="en-US" sz="2800" dirty="0"/>
+              <a:t>The fieldname?</a:t>
+            </a:r>
+          </a:p>
+          <a:p>
+            <a:pPr marL="457200" indent="-457200">
+              <a:buFont typeface="Arial" panose="020B0604020202020204" pitchFamily="34" charset="0"/>
+              <a:buChar char="•"/>
+            </a:pPr>
+            <a:r>
+              <a:rPr lang="en-US" sz="2800" dirty="0"/>
+              <a:t>The operation bodies?</a:t>
+            </a:r>
+          </a:p>
+          <a:p>
+            <a:pPr marL="457200" indent="-457200">
+              <a:buFont typeface="Arial" panose="020B0604020202020204" pitchFamily="34" charset="0"/>
+              <a:buChar char="•"/>
+            </a:pPr>
+            <a:r>
+              <a:rPr lang="en-US" sz="2800" dirty="0"/>
+              <a:t>The constructor?</a:t>
+            </a:r>
+          </a:p>
+        </p:txBody>
+      </p:sp>
+    </p:spTree>
+    <p:extLst>
+      <p:ext uri="{BB962C8B-B14F-4D97-AF65-F5344CB8AC3E}">
+        <p14:creationId xmlns:p14="http://schemas.microsoft.com/office/powerpoint/2010/main" val="641702362"/>
+      </p:ext>
+    </p:extLst>
+  </p:cSld>
+  <p:clrMapOvr>
+    <a:masterClrMapping/>
+  </p:clrMapOvr>
+</p:sld>
+</file>
+
+<file path=ppt/slides/slide21.xml><?xml version="1.0" encoding="utf-8"?>
+<p:sld xmlns:a="http://schemas.openxmlformats.org/drawingml/2006/main" xmlns:r="http://schemas.openxmlformats.org/officeDocument/2006/relationships" xmlns:p="http://schemas.openxmlformats.org/presentationml/2006/main">
+  <p:cSld>
+    <p:spTree>
+      <p:nvGrpSpPr>
+        <p:cNvPr id="1" name=""/>
+        <p:cNvGrpSpPr/>
+        <p:nvPr/>
+      </p:nvGrpSpPr>
+      <p:grpSpPr>
+        <a:xfrm>
+          <a:off x="0" y="0"/>
+          <a:ext cx="0" cy="0"/>
+          <a:chOff x="0" y="0"/>
+          <a:chExt cx="0" cy="0"/>
+        </a:xfrm>
+      </p:grpSpPr>
+      <p:sp>
+        <p:nvSpPr>
+          <p:cNvPr id="2" name="Title 1"/>
+          <p:cNvSpPr>
+            <a:spLocks noGrp="1"/>
+          </p:cNvSpPr>
+          <p:nvPr>
+            <p:ph type="title"/>
+          </p:nvPr>
+        </p:nvSpPr>
+        <p:spPr/>
+        <p:txBody>
           <a:bodyPr>
             <a:normAutofit/>
           </a:bodyPr>
@@ -12124,7 +12601,7 @@
 </p:sld>
 </file>
 
-<file path=ppt/slides/slide21.xml><?xml version="1.0" encoding="utf-8"?>
+<file path=ppt/slides/slide22.xml><?xml version="1.0" encoding="utf-8"?>
 <p:sld xmlns:a="http://schemas.openxmlformats.org/drawingml/2006/main" xmlns:r="http://schemas.openxmlformats.org/officeDocument/2006/relationships" xmlns:p="http://schemas.openxmlformats.org/presentationml/2006/main">
   <p:cSld>
     <p:spTree>
@@ -12745,7 +13222,7 @@
 </p:sld>
 </file>
 
-<file path=ppt/slides/slide22.xml><?xml version="1.0" encoding="utf-8"?>
+<file path=ppt/slides/slide23.xml><?xml version="1.0" encoding="utf-8"?>
 <p:sld xmlns:a="http://schemas.openxmlformats.org/drawingml/2006/main" xmlns:r="http://schemas.openxmlformats.org/officeDocument/2006/relationships" xmlns:p="http://schemas.openxmlformats.org/presentationml/2006/main">
   <p:cSld>
     <p:spTree>
@@ -13032,7 +13509,7 @@
 </p:sld>
 </file>
 
-<file path=ppt/slides/slide23.xml><?xml version="1.0" encoding="utf-8"?>
+<file path=ppt/slides/slide24.xml><?xml version="1.0" encoding="utf-8"?>
 <p:sld xmlns:a="http://schemas.openxmlformats.org/drawingml/2006/main" xmlns:r="http://schemas.openxmlformats.org/officeDocument/2006/relationships" xmlns:p="http://schemas.openxmlformats.org/presentationml/2006/main">
   <p:cSld>
     <p:spTree>
@@ -13176,7 +13653,7 @@
 </p:sld>
 </file>
 
-<file path=ppt/slides/slide24.xml><?xml version="1.0" encoding="utf-8"?>
+<file path=ppt/slides/slide25.xml><?xml version="1.0" encoding="utf-8"?>
 <p:sld xmlns:a="http://schemas.openxmlformats.org/drawingml/2006/main" xmlns:r="http://schemas.openxmlformats.org/officeDocument/2006/relationships" xmlns:p="http://schemas.openxmlformats.org/presentationml/2006/main">
   <p:cSld>
     <p:spTree>
@@ -13777,7 +14254,7 @@
 </p:sld>
 </file>
 
-<file path=ppt/slides/slide25.xml><?xml version="1.0" encoding="utf-8"?>
+<file path=ppt/slides/slide26.xml><?xml version="1.0" encoding="utf-8"?>
 <p:sld xmlns:a="http://schemas.openxmlformats.org/drawingml/2006/main" xmlns:r="http://schemas.openxmlformats.org/officeDocument/2006/relationships" xmlns:p="http://schemas.openxmlformats.org/presentationml/2006/main">
   <p:cSld>
     <p:spTree>
@@ -14180,7 +14657,7 @@
 </p:sld>
 </file>
 
-<file path=ppt/slides/slide26.xml><?xml version="1.0" encoding="utf-8"?>
+<file path=ppt/slides/slide27.xml><?xml version="1.0" encoding="utf-8"?>
 <p:sld xmlns:a="http://schemas.openxmlformats.org/drawingml/2006/main" xmlns:r="http://schemas.openxmlformats.org/officeDocument/2006/relationships" xmlns:p="http://schemas.openxmlformats.org/presentationml/2006/main">
   <p:cSld>
     <p:spTree>
@@ -14549,7 +15026,7 @@
 </p:sld>
 </file>
 
-<file path=ppt/slides/slide27.xml><?xml version="1.0" encoding="utf-8"?>
+<file path=ppt/slides/slide28.xml><?xml version="1.0" encoding="utf-8"?>
 <p:sld xmlns:a="http://schemas.openxmlformats.org/drawingml/2006/main" xmlns:r="http://schemas.openxmlformats.org/officeDocument/2006/relationships" xmlns:p="http://schemas.openxmlformats.org/presentationml/2006/main">
   <p:cSld>
     <p:spTree>
@@ -16332,14 +16809,47 @@
       </p:grpSpPr>
       <p:sp>
         <p:nvSpPr>
+          <p:cNvPr id="4" name="Title 3"/>
+          <p:cNvSpPr>
+            <a:spLocks noGrp="1"/>
+          </p:cNvSpPr>
+          <p:nvPr>
+            <p:ph type="title"/>
+          </p:nvPr>
+        </p:nvSpPr>
+        <p:spPr>
+          <a:xfrm>
+            <a:off x="457200" y="19050"/>
+            <a:ext cx="8229600" cy="1143000"/>
+          </a:xfrm>
+        </p:spPr>
+        <p:txBody>
+          <a:bodyPr/>
+          <a:lstStyle/>
+          <a:p>
+            <a:pPr fontAlgn="auto">
+              <a:spcAft>
+                <a:spcPts val="0"/>
+              </a:spcAft>
+              <a:defRPr/>
+            </a:pPr>
+            <a:r>
+              <a:rPr lang="en-US" dirty="0"/>
+              <a:t>Notation: @Override Annotation</a:t>
+            </a:r>
+          </a:p>
+        </p:txBody>
+      </p:sp>
+      <p:sp>
+        <p:nvSpPr>
           <p:cNvPr id="7" name="Rectangle 6"/>
           <p:cNvSpPr/>
           <p:nvPr/>
         </p:nvSpPr>
         <p:spPr>
           <a:xfrm>
-            <a:off x="482600" y="2772985"/>
-            <a:ext cx="8458200" cy="3785652"/>
+            <a:off x="457200" y="3200400"/>
+            <a:ext cx="8458200" cy="3416320"/>
           </a:xfrm>
           <a:prstGeom prst="rect">
             <a:avLst/>
@@ -16360,97 +16870,98 @@
               <a:defRPr/>
             </a:pPr>
             <a:r>
-              <a:rPr lang="en-US" sz="2400" b="1" dirty="0">
-                <a:latin typeface="Consolas" pitchFamily="49" charset="0"/>
-              </a:rPr>
-              <a:t>public</a:t>
-            </a:r>
-            <a:r>
-              <a:rPr lang="en-US" sz="2400" dirty="0">
-                <a:latin typeface="Consolas" pitchFamily="49" charset="0"/>
-              </a:rPr>
-              <a:t> </a:t>
-            </a:r>
-            <a:r>
-              <a:rPr lang="en-US" sz="2400" b="1" dirty="0">
-                <a:latin typeface="Consolas" pitchFamily="49" charset="0"/>
-              </a:rPr>
-              <a:t>class</a:t>
-            </a:r>
-            <a:r>
-              <a:rPr lang="en-US" sz="2400" dirty="0">
-                <a:latin typeface="Consolas" pitchFamily="49" charset="0"/>
-              </a:rPr>
-              <a:t> Truck </a:t>
-            </a:r>
-            <a:r>
-              <a:rPr lang="en-US" sz="2400" b="1" dirty="0">
-                <a:latin typeface="Consolas" pitchFamily="49" charset="0"/>
-              </a:rPr>
-              <a:t>implements</a:t>
-            </a:r>
-            <a:r>
-              <a:rPr lang="en-US" sz="2400" dirty="0">
-                <a:latin typeface="Consolas" pitchFamily="49" charset="0"/>
-              </a:rPr>
-              <a:t> Drivable {</a:t>
-            </a:r>
-            <a:br>
-              <a:rPr lang="en-US" sz="2400" dirty="0">
-                <a:latin typeface="Consolas" pitchFamily="49" charset="0"/>
-              </a:rPr>
-            </a:br>
-            <a:r>
-              <a:rPr lang="en-US" sz="2400" dirty="0">
-                <a:latin typeface="Consolas" pitchFamily="49" charset="0"/>
-              </a:rPr>
-              <a:t>	@Override	</a:t>
+              <a:rPr lang="en-US" sz="2000" dirty="0">
+                <a:latin typeface="+mn-lt"/>
+              </a:rPr>
+              <a:t>// </a:t>
+            </a:r>
+            <a:r>
+              <a:rPr lang="en-US" sz="2000" dirty="0">
+                <a:latin typeface="+mn-lt"/>
+                <a:hlinkClick r:id="rId3"/>
+              </a:rPr>
+              <a:t>The Java Tutorials on Annotations</a:t>
+            </a:r>
+            <a:r>
+              <a:rPr lang="en-US" sz="2000" dirty="0">
+                <a:latin typeface="+mn-lt"/>
+              </a:rPr>
+              <a:t> &lt;-- Click here to learn more</a:t>
             </a:r>
           </a:p>
           <a:p>
             <a:pPr>
               <a:defRPr/>
             </a:pPr>
-            <a:r>
-              <a:rPr lang="en-US" sz="2400" dirty="0">
-                <a:latin typeface="Consolas" pitchFamily="49" charset="0"/>
-              </a:rPr>
-              <a:t>	</a:t>
-            </a:r>
-            <a:r>
-              <a:rPr lang="en-US" sz="2400" b="1" dirty="0">
-                <a:latin typeface="Consolas" pitchFamily="49" charset="0"/>
-              </a:rPr>
-              <a:t>public</a:t>
-            </a:r>
-            <a:r>
-              <a:rPr lang="en-US" sz="2400" dirty="0">
-                <a:latin typeface="Consolas" pitchFamily="49" charset="0"/>
-              </a:rPr>
-              <a:t> </a:t>
-            </a:r>
-            <a:r>
-              <a:rPr lang="en-US" sz="2400" b="1" dirty="0">
-                <a:latin typeface="Consolas" pitchFamily="49" charset="0"/>
-              </a:rPr>
-              <a:t>void</a:t>
-            </a:r>
-            <a:r>
-              <a:rPr lang="en-US" sz="2400" dirty="0">
-                <a:latin typeface="Consolas" pitchFamily="49" charset="0"/>
-              </a:rPr>
-              <a:t> turn(double direction) {</a:t>
-            </a:r>
+            <a:endParaRPr lang="en-US" b="1" dirty="0">
+              <a:latin typeface="Consolas" pitchFamily="49" charset="0"/>
+            </a:endParaRPr>
           </a:p>
           <a:p>
             <a:pPr>
               <a:defRPr/>
             </a:pPr>
             <a:r>
-              <a:rPr lang="en-US" sz="2400" dirty="0">
+              <a:rPr lang="en-US" b="1" dirty="0">
                 <a:latin typeface="Consolas" pitchFamily="49" charset="0"/>
               </a:rPr>
-              <a:t>		...</a:t>
+              <a:t>public</a:t>
+            </a:r>
+            <a:r>
+              <a:rPr lang="en-US" dirty="0">
+                <a:latin typeface="Consolas" pitchFamily="49" charset="0"/>
+              </a:rPr>
+              <a:t> </a:t>
+            </a:r>
+            <a:r>
+              <a:rPr lang="en-US" b="1" dirty="0">
+                <a:latin typeface="Consolas" pitchFamily="49" charset="0"/>
+              </a:rPr>
+              <a:t>class</a:t>
+            </a:r>
+            <a:r>
+              <a:rPr lang="en-US" dirty="0">
+                <a:latin typeface="Consolas" pitchFamily="49" charset="0"/>
+              </a:rPr>
+              <a:t> Car </a:t>
+            </a:r>
+            <a:r>
+              <a:rPr lang="en-US" b="1" dirty="0">
+                <a:latin typeface="Consolas" pitchFamily="49" charset="0"/>
+              </a:rPr>
+              <a:t>implements</a:t>
+            </a:r>
+            <a:r>
+              <a:rPr lang="en-US" dirty="0">
+                <a:latin typeface="Consolas" pitchFamily="49" charset="0"/>
+              </a:rPr>
+              <a:t> Drivable {</a:t>
+            </a:r>
+            <a:br>
+              <a:rPr lang="en-US" dirty="0">
+                <a:latin typeface="Consolas" pitchFamily="49" charset="0"/>
+              </a:rPr>
+            </a:br>
+            <a:r>
+              <a:rPr lang="en-US" dirty="0">
+                <a:latin typeface="Consolas" pitchFamily="49" charset="0"/>
+              </a:rPr>
+              <a:t>	</a:t>
+            </a:r>
+            <a:r>
+              <a:rPr lang="en-US" dirty="0">
+                <a:highlight>
+                  <a:srgbClr val="FFFF00"/>
+                </a:highlight>
+                <a:latin typeface="Consolas" pitchFamily="49" charset="0"/>
+              </a:rPr>
+              <a:t>@Override</a:t>
+            </a:r>
+            <a:r>
+              <a:rPr lang="en-US" dirty="0">
+                <a:latin typeface="Consolas" pitchFamily="49" charset="0"/>
+              </a:rPr>
+              <a:t>	</a:t>
             </a:r>
           </a:p>
           <a:p>
@@ -16458,10 +16969,34 @@
               <a:defRPr/>
             </a:pPr>
             <a:r>
-              <a:rPr lang="en-US" sz="2400" dirty="0">
+              <a:rPr lang="en-US" dirty="0">
                 <a:latin typeface="Consolas" pitchFamily="49" charset="0"/>
               </a:rPr>
-              <a:t>	}</a:t>
+              <a:t>	</a:t>
+            </a:r>
+            <a:r>
+              <a:rPr lang="en-US" b="1" dirty="0">
+                <a:latin typeface="Consolas" pitchFamily="49" charset="0"/>
+              </a:rPr>
+              <a:t>public</a:t>
+            </a:r>
+            <a:r>
+              <a:rPr lang="en-US" dirty="0">
+                <a:latin typeface="Consolas" pitchFamily="49" charset="0"/>
+              </a:rPr>
+              <a:t> </a:t>
+            </a:r>
+            <a:r>
+              <a:rPr lang="en-US" b="1" dirty="0">
+                <a:latin typeface="Consolas" pitchFamily="49" charset="0"/>
+              </a:rPr>
+              <a:t>void</a:t>
+            </a:r>
+            <a:r>
+              <a:rPr lang="en-US" dirty="0">
+                <a:latin typeface="Consolas" pitchFamily="49" charset="0"/>
+              </a:rPr>
+              <a:t> turn(double direction) {</a:t>
             </a:r>
           </a:p>
           <a:p>
@@ -16469,10 +17004,10 @@
               <a:defRPr/>
             </a:pPr>
             <a:r>
-              <a:rPr lang="en-US" sz="2400" dirty="0">
+              <a:rPr lang="en-US" dirty="0">
                 <a:latin typeface="Consolas" pitchFamily="49" charset="0"/>
               </a:rPr>
-              <a:t>	@Override	</a:t>
+              <a:t>	... // this captures the 'how it does it'</a:t>
             </a:r>
           </a:p>
           <a:p>
@@ -16480,34 +17015,10 @@
               <a:defRPr/>
             </a:pPr>
             <a:r>
-              <a:rPr lang="en-US" sz="2400" dirty="0">
+              <a:rPr lang="en-US" dirty="0">
                 <a:latin typeface="Consolas" pitchFamily="49" charset="0"/>
               </a:rPr>
-              <a:t>	</a:t>
-            </a:r>
-            <a:r>
-              <a:rPr lang="en-US" sz="2400" b="1" dirty="0">
-                <a:latin typeface="Consolas" pitchFamily="49" charset="0"/>
-              </a:rPr>
-              <a:t>public</a:t>
-            </a:r>
-            <a:r>
-              <a:rPr lang="en-US" sz="2400" dirty="0">
-                <a:latin typeface="Consolas" pitchFamily="49" charset="0"/>
-              </a:rPr>
-              <a:t> </a:t>
-            </a:r>
-            <a:r>
-              <a:rPr lang="en-US" sz="2400" b="1" dirty="0">
-                <a:latin typeface="Consolas" pitchFamily="49" charset="0"/>
-              </a:rPr>
-              <a:t>void</a:t>
-            </a:r>
-            <a:r>
-              <a:rPr lang="en-US" sz="2400" dirty="0">
-                <a:latin typeface="Consolas" pitchFamily="49" charset="0"/>
-              </a:rPr>
-              <a:t> accelerate(double force) {</a:t>
+              <a:t>	}</a:t>
             </a:r>
           </a:p>
           <a:p>
@@ -16515,10 +17026,25 @@
               <a:defRPr/>
             </a:pPr>
             <a:r>
-              <a:rPr lang="en-US" sz="2400" dirty="0">
+              <a:rPr lang="en-US" dirty="0">
                 <a:latin typeface="Consolas" pitchFamily="49" charset="0"/>
               </a:rPr>
-              <a:t>		...</a:t>
+              <a:t>	</a:t>
+            </a:r>
+            <a:r>
+              <a:rPr lang="en-US" dirty="0">
+                <a:highlight>
+                  <a:srgbClr val="FFFF00"/>
+                </a:highlight>
+                <a:latin typeface="Consolas" pitchFamily="49" charset="0"/>
+              </a:rPr>
+              <a:t>@Override</a:t>
+            </a:r>
+            <a:r>
+              <a:rPr lang="en-US" dirty="0">
+                <a:latin typeface="Consolas" pitchFamily="49" charset="0"/>
+              </a:rPr>
+              <a:t>	</a:t>
             </a:r>
           </a:p>
           <a:p>
@@ -16526,18 +17052,64 @@
               <a:defRPr/>
             </a:pPr>
             <a:r>
-              <a:rPr lang="en-US" sz="2400" dirty="0">
+              <a:rPr lang="en-US" dirty="0">
                 <a:latin typeface="Consolas" pitchFamily="49" charset="0"/>
               </a:rPr>
+              <a:t>	</a:t>
+            </a:r>
+            <a:r>
+              <a:rPr lang="en-US" b="1" dirty="0">
+                <a:latin typeface="Consolas" pitchFamily="49" charset="0"/>
+              </a:rPr>
+              <a:t>public</a:t>
+            </a:r>
+            <a:r>
+              <a:rPr lang="en-US" dirty="0">
+                <a:latin typeface="Consolas" pitchFamily="49" charset="0"/>
+              </a:rPr>
+              <a:t> </a:t>
+            </a:r>
+            <a:r>
+              <a:rPr lang="en-US" b="1" dirty="0">
+                <a:latin typeface="Consolas" pitchFamily="49" charset="0"/>
+              </a:rPr>
+              <a:t>void</a:t>
+            </a:r>
+            <a:r>
+              <a:rPr lang="en-US" dirty="0">
+                <a:latin typeface="Consolas" pitchFamily="49" charset="0"/>
+              </a:rPr>
+              <a:t> accelerate(double force) {</a:t>
+            </a:r>
+          </a:p>
+          <a:p>
+            <a:pPr>
+              <a:defRPr/>
+            </a:pPr>
+            <a:r>
+              <a:rPr lang="en-US" dirty="0">
+                <a:latin typeface="Consolas" pitchFamily="49" charset="0"/>
+              </a:rPr>
+              <a:t>	 ... // this captures the 'how it does it'</a:t>
+            </a:r>
+          </a:p>
+          <a:p>
+            <a:pPr>
+              <a:defRPr/>
+            </a:pPr>
+            <a:r>
+              <a:rPr lang="en-US" dirty="0">
+                <a:latin typeface="Consolas" pitchFamily="49" charset="0"/>
+              </a:rPr>
               <a:t>	}</a:t>
             </a:r>
             <a:br>
-              <a:rPr lang="en-US" sz="2400" dirty="0">
+              <a:rPr lang="en-US" dirty="0">
                 <a:latin typeface="Consolas" pitchFamily="49" charset="0"/>
               </a:rPr>
             </a:br>
             <a:r>
-              <a:rPr lang="en-US" sz="2400" dirty="0">
+              <a:rPr lang="en-US" dirty="0">
                 <a:latin typeface="Consolas" pitchFamily="49" charset="0"/>
               </a:rPr>
               <a:t>}</a:t>
@@ -16545,198 +17117,46 @@
           </a:p>
         </p:txBody>
       </p:sp>
-      <p:sp>
-        <p:nvSpPr>
-          <p:cNvPr id="11" name="Title 3">
+      <p:pic>
+        <p:nvPicPr>
+          <p:cNvPr id="3" name="Picture 2" descr="Graphical user interface, text, application, email&#10;&#10;Description automatically generated">
             <a:extLst>
               <a:ext uri="{FF2B5EF4-FFF2-40B4-BE49-F238E27FC236}">
-                <a16:creationId xmlns:a16="http://schemas.microsoft.com/office/drawing/2014/main" id="{4375B2BC-0D3A-3E42-8FA8-353BB615BF01}"/>
+                <a16:creationId xmlns:a16="http://schemas.microsoft.com/office/drawing/2014/main" id="{173A4CED-F26A-AE4C-A40E-11F2ACA0F098}"/>
               </a:ext>
             </a:extLst>
           </p:cNvPr>
-          <p:cNvSpPr txBox="1">
-            <a:spLocks/>
-          </p:cNvSpPr>
+          <p:cNvPicPr>
+            <a:picLocks noChangeAspect="1"/>
+          </p:cNvPicPr>
           <p:nvPr/>
-        </p:nvSpPr>
+        </p:nvPicPr>
+        <p:blipFill>
+          <a:blip r:embed="rId4">
+            <a:extLst>
+              <a:ext uri="{28A0092B-C50C-407E-A947-70E740481C1C}">
+                <a14:useLocalDpi xmlns:a14="http://schemas.microsoft.com/office/drawing/2010/main" val="0"/>
+              </a:ext>
+            </a:extLst>
+          </a:blip>
+          <a:stretch>
+            <a:fillRect/>
+          </a:stretch>
+        </p:blipFill>
         <p:spPr>
           <a:xfrm>
-            <a:off x="457200" y="19050"/>
-            <a:ext cx="8229600" cy="1143000"/>
+            <a:off x="228600" y="914400"/>
+            <a:ext cx="8696526" cy="2133600"/>
           </a:xfrm>
           <a:prstGeom prst="rect">
             <a:avLst/>
           </a:prstGeom>
         </p:spPr>
-        <p:txBody>
-          <a:bodyPr vert="horz" lIns="91440" tIns="45720" rIns="91440" bIns="45720" rtlCol="0" anchor="ctr">
-            <a:normAutofit/>
-          </a:bodyPr>
-          <a:lstStyle>
-            <a:lvl1pPr algn="ctr" defTabSz="914400" rtl="0" eaLnBrk="1" latinLnBrk="0" hangingPunct="1">
-              <a:spcBef>
-                <a:spcPct val="0"/>
-              </a:spcBef>
-              <a:buNone/>
-              <a:defRPr sz="4400" kern="1200">
-                <a:solidFill>
-                  <a:schemeClr val="tx1"/>
-                </a:solidFill>
-                <a:latin typeface="+mj-lt"/>
-                <a:ea typeface="+mj-ea"/>
-                <a:cs typeface="+mj-cs"/>
-              </a:defRPr>
-            </a:lvl1pPr>
-          </a:lstStyle>
-          <a:p>
-            <a:pPr fontAlgn="auto">
-              <a:spcAft>
-                <a:spcPts val="0"/>
-              </a:spcAft>
-              <a:defRPr/>
-            </a:pPr>
-            <a:r>
-              <a:rPr lang="en-US" dirty="0"/>
-              <a:t>Notation: In Code – Example 2</a:t>
-            </a:r>
-          </a:p>
-        </p:txBody>
-      </p:sp>
-      <p:sp>
-        <p:nvSpPr>
-          <p:cNvPr id="12" name="Rectangle 11">
-            <a:extLst>
-              <a:ext uri="{FF2B5EF4-FFF2-40B4-BE49-F238E27FC236}">
-                <a16:creationId xmlns:a16="http://schemas.microsoft.com/office/drawing/2014/main" id="{50685E5E-2A8B-4849-8C0A-6DB67DB73C5E}"/>
-              </a:ext>
-            </a:extLst>
-          </p:cNvPr>
-          <p:cNvSpPr/>
-          <p:nvPr/>
-        </p:nvSpPr>
-        <p:spPr>
-          <a:xfrm>
-            <a:off x="533400" y="990600"/>
-            <a:ext cx="7696200" cy="1569660"/>
-          </a:xfrm>
-          <a:prstGeom prst="rect">
-            <a:avLst/>
-          </a:prstGeom>
-          <a:ln w="19050">
-            <a:solidFill>
-              <a:schemeClr val="accent1"/>
-            </a:solidFill>
-          </a:ln>
-        </p:spPr>
-        <p:txBody>
-          <a:bodyPr>
-            <a:spAutoFit/>
-          </a:bodyPr>
-          <a:lstStyle/>
-          <a:p>
-            <a:pPr>
-              <a:defRPr/>
-            </a:pPr>
-            <a:r>
-              <a:rPr lang="en-US" sz="2400" b="1" dirty="0">
-                <a:latin typeface="Consolas" pitchFamily="49" charset="0"/>
-              </a:rPr>
-              <a:t>public</a:t>
-            </a:r>
-            <a:r>
-              <a:rPr lang="en-US" sz="2400" dirty="0">
-                <a:latin typeface="Consolas" pitchFamily="49" charset="0"/>
-              </a:rPr>
-              <a:t> </a:t>
-            </a:r>
-            <a:r>
-              <a:rPr lang="en-US" sz="2400" b="1" dirty="0">
-                <a:latin typeface="Consolas" pitchFamily="49" charset="0"/>
-              </a:rPr>
-              <a:t>interface</a:t>
-            </a:r>
-            <a:r>
-              <a:rPr lang="en-US" sz="2400" dirty="0">
-                <a:latin typeface="Consolas" pitchFamily="49" charset="0"/>
-              </a:rPr>
-              <a:t> Drivable {</a:t>
-            </a:r>
-          </a:p>
-          <a:p>
-            <a:pPr>
-              <a:defRPr/>
-            </a:pPr>
-            <a:r>
-              <a:rPr lang="en-US" sz="2400" dirty="0">
-                <a:latin typeface="Consolas" pitchFamily="49" charset="0"/>
-              </a:rPr>
-              <a:t>	</a:t>
-            </a:r>
-            <a:r>
-              <a:rPr lang="en-US" sz="2400" b="1" dirty="0">
-                <a:latin typeface="Consolas" pitchFamily="49" charset="0"/>
-              </a:rPr>
-              <a:t>void</a:t>
-            </a:r>
-            <a:r>
-              <a:rPr lang="en-US" sz="2400" dirty="0">
-                <a:latin typeface="Consolas" pitchFamily="49" charset="0"/>
-              </a:rPr>
-              <a:t> turn(double </a:t>
-            </a:r>
-            <a:r>
-              <a:rPr lang="en-US" sz="2400" dirty="0" err="1">
-                <a:latin typeface="Consolas" pitchFamily="49" charset="0"/>
-              </a:rPr>
-              <a:t>dir</a:t>
-            </a:r>
-            <a:r>
-              <a:rPr lang="en-US" sz="2400" dirty="0">
-                <a:latin typeface="Consolas" pitchFamily="49" charset="0"/>
-              </a:rPr>
-              <a:t>);</a:t>
-            </a:r>
-          </a:p>
-          <a:p>
-            <a:pPr>
-              <a:defRPr/>
-            </a:pPr>
-            <a:r>
-              <a:rPr lang="en-US" sz="2400" dirty="0">
-                <a:latin typeface="Consolas" pitchFamily="49" charset="0"/>
-              </a:rPr>
-              <a:t>	</a:t>
-            </a:r>
-            <a:r>
-              <a:rPr lang="en-US" sz="2400" b="1" dirty="0">
-                <a:latin typeface="Consolas" pitchFamily="49" charset="0"/>
-              </a:rPr>
-              <a:t>void</a:t>
-            </a:r>
-            <a:r>
-              <a:rPr lang="en-US" sz="2400" dirty="0">
-                <a:latin typeface="Consolas" pitchFamily="49" charset="0"/>
-              </a:rPr>
-              <a:t> accelerate(double force);</a:t>
-            </a:r>
-          </a:p>
-          <a:p>
-            <a:pPr>
-              <a:defRPr/>
-            </a:pPr>
-            <a:r>
-              <a:rPr lang="en-US" sz="2400" dirty="0">
-                <a:latin typeface="Consolas" pitchFamily="49" charset="0"/>
-              </a:rPr>
-              <a:t>}  // this describes the 'what it does'</a:t>
-            </a:r>
-          </a:p>
-        </p:txBody>
-      </p:sp>
+      </p:pic>
     </p:spTree>
     <p:extLst>
       <p:ext uri="{BB962C8B-B14F-4D97-AF65-F5344CB8AC3E}">
-        <p14:creationId xmlns:p14="http://schemas.microsoft.com/office/powerpoint/2010/main" val="413286064"/>
+        <p14:creationId xmlns:p14="http://schemas.microsoft.com/office/powerpoint/2010/main" val="3019227664"/>
       </p:ext>
     </p:extLst>
   </p:cSld>
@@ -16765,39 +17185,6 @@
       </p:grpSpPr>
       <p:sp>
         <p:nvSpPr>
-          <p:cNvPr id="4" name="Title 3"/>
-          <p:cNvSpPr>
-            <a:spLocks noGrp="1"/>
-          </p:cNvSpPr>
-          <p:nvPr>
-            <p:ph type="title"/>
-          </p:nvPr>
-        </p:nvSpPr>
-        <p:spPr>
-          <a:xfrm>
-            <a:off x="457200" y="30480"/>
-            <a:ext cx="8229600" cy="1143000"/>
-          </a:xfrm>
-        </p:spPr>
-        <p:txBody>
-          <a:bodyPr/>
-          <a:lstStyle/>
-          <a:p>
-            <a:pPr fontAlgn="auto">
-              <a:spcAft>
-                <a:spcPts val="0"/>
-              </a:spcAft>
-              <a:defRPr/>
-            </a:pPr>
-            <a:r>
-              <a:rPr lang="en-US" dirty="0"/>
-              <a:t>Notation: In Code – Example 3</a:t>
-            </a:r>
-          </a:p>
-        </p:txBody>
-      </p:sp>
-      <p:sp>
-        <p:nvSpPr>
           <p:cNvPr id="7" name="Rectangle 6"/>
           <p:cNvSpPr/>
           <p:nvPr/>
@@ -16847,7 +17234,7 @@
               <a:rPr lang="en-US" sz="2400" dirty="0">
                 <a:latin typeface="Consolas" pitchFamily="49" charset="0"/>
               </a:rPr>
-              <a:t> Hovercraft </a:t>
+              <a:t> Truck </a:t>
             </a:r>
             <a:r>
               <a:rPr lang="en-US" sz="2400" b="1" dirty="0">
@@ -17013,10 +17400,67 @@
       </p:sp>
       <p:sp>
         <p:nvSpPr>
-          <p:cNvPr id="8" name="Rectangle 7">
+          <p:cNvPr id="11" name="Title 3">
             <a:extLst>
               <a:ext uri="{FF2B5EF4-FFF2-40B4-BE49-F238E27FC236}">
-                <a16:creationId xmlns:a16="http://schemas.microsoft.com/office/drawing/2014/main" id="{41000EC9-45DA-AE40-BFC4-49B6CF2DF3F7}"/>
+                <a16:creationId xmlns:a16="http://schemas.microsoft.com/office/drawing/2014/main" id="{4375B2BC-0D3A-3E42-8FA8-353BB615BF01}"/>
+              </a:ext>
+            </a:extLst>
+          </p:cNvPr>
+          <p:cNvSpPr txBox="1">
+            <a:spLocks/>
+          </p:cNvSpPr>
+          <p:nvPr/>
+        </p:nvSpPr>
+        <p:spPr>
+          <a:xfrm>
+            <a:off x="457200" y="19050"/>
+            <a:ext cx="8229600" cy="1143000"/>
+          </a:xfrm>
+          <a:prstGeom prst="rect">
+            <a:avLst/>
+          </a:prstGeom>
+        </p:spPr>
+        <p:txBody>
+          <a:bodyPr vert="horz" lIns="91440" tIns="45720" rIns="91440" bIns="45720" rtlCol="0" anchor="ctr">
+            <a:normAutofit/>
+          </a:bodyPr>
+          <a:lstStyle>
+            <a:lvl1pPr algn="ctr" defTabSz="914400" rtl="0" eaLnBrk="1" latinLnBrk="0" hangingPunct="1">
+              <a:spcBef>
+                <a:spcPct val="0"/>
+              </a:spcBef>
+              <a:buNone/>
+              <a:defRPr sz="4400" kern="1200">
+                <a:solidFill>
+                  <a:schemeClr val="tx1"/>
+                </a:solidFill>
+                <a:latin typeface="+mj-lt"/>
+                <a:ea typeface="+mj-ea"/>
+                <a:cs typeface="+mj-cs"/>
+              </a:defRPr>
+            </a:lvl1pPr>
+          </a:lstStyle>
+          <a:p>
+            <a:pPr fontAlgn="auto">
+              <a:spcAft>
+                <a:spcPts val="0"/>
+              </a:spcAft>
+              <a:defRPr/>
+            </a:pPr>
+            <a:r>
+              <a:rPr lang="en-US" dirty="0"/>
+              <a:t>Notation: In Code – Example 2</a:t>
+            </a:r>
+          </a:p>
+        </p:txBody>
+      </p:sp>
+      <p:sp>
+        <p:nvSpPr>
+          <p:cNvPr id="12" name="Rectangle 11">
+            <a:extLst>
+              <a:ext uri="{FF2B5EF4-FFF2-40B4-BE49-F238E27FC236}">
+                <a16:creationId xmlns:a16="http://schemas.microsoft.com/office/drawing/2014/main" id="{50685E5E-2A8B-4849-8C0A-6DB67DB73C5E}"/>
               </a:ext>
             </a:extLst>
           </p:cNvPr>
@@ -17145,7 +17589,7 @@
     </p:spTree>
     <p:extLst>
       <p:ext uri="{BB962C8B-B14F-4D97-AF65-F5344CB8AC3E}">
-        <p14:creationId xmlns:p14="http://schemas.microsoft.com/office/powerpoint/2010/main" val="4023042757"/>
+        <p14:creationId xmlns:p14="http://schemas.microsoft.com/office/powerpoint/2010/main" val="413286064"/>
       </p:ext>
     </p:extLst>
   </p:cSld>
@@ -17174,7 +17618,7 @@
       </p:grpSpPr>
       <p:sp>
         <p:nvSpPr>
-          <p:cNvPr id="2" name="Title 1"/>
+          <p:cNvPr id="4" name="Title 3"/>
           <p:cNvSpPr>
             <a:spLocks noGrp="1"/>
           </p:cNvSpPr>
@@ -17182,97 +17626,371 @@
             <p:ph type="title"/>
           </p:nvPr>
         </p:nvSpPr>
-        <p:spPr/>
+        <p:spPr>
+          <a:xfrm>
+            <a:off x="457200" y="30480"/>
+            <a:ext cx="8229600" cy="1143000"/>
+          </a:xfrm>
+        </p:spPr>
         <p:txBody>
           <a:bodyPr/>
           <a:lstStyle/>
           <a:p>
+            <a:pPr fontAlgn="auto">
+              <a:spcAft>
+                <a:spcPts val="0"/>
+              </a:spcAft>
+              <a:defRPr/>
+            </a:pPr>
             <a:r>
               <a:rPr lang="en-US" dirty="0"/>
-              <a:t>Why?</a:t>
-            </a:r>
-          </a:p>
-        </p:txBody>
-      </p:sp>
-      <p:sp>
-        <p:nvSpPr>
-          <p:cNvPr id="3" name="Content Placeholder 2"/>
-          <p:cNvSpPr>
-            <a:spLocks noGrp="1"/>
-          </p:cNvSpPr>
-          <p:nvPr>
-            <p:ph idx="1"/>
-          </p:nvPr>
-        </p:nvSpPr>
-        <p:spPr/>
-        <p:txBody>
-          <a:bodyPr/>
-          <a:lstStyle/>
-          <a:p>
-            <a:pPr>
-              <a:defRPr/>
-            </a:pPr>
-            <a:r>
-              <a:rPr lang="en-US" dirty="0"/>
-              <a:t>Interfaces help to </a:t>
-            </a:r>
-            <a:r>
-              <a:rPr lang="en-US" b="1" dirty="0"/>
-              <a:t>reduce coupling </a:t>
-            </a:r>
-            <a:r>
-              <a:rPr lang="en-US" dirty="0"/>
-              <a:t>by having a client program coupled to the interface, not directly to a specific implementation</a:t>
-            </a:r>
-          </a:p>
-          <a:p>
-            <a:r>
-              <a:rPr lang="en-US" dirty="0"/>
-              <a:t>Similarity among classes that implement the interface is Java compiler enforced</a:t>
-            </a:r>
-          </a:p>
-        </p:txBody>
-      </p:sp>
-      <p:sp>
-        <p:nvSpPr>
-          <p:cNvPr id="4" name="TextBox 3"/>
-          <p:cNvSpPr txBox="1"/>
+              <a:t>Notation: In Code – Example 3</a:t>
+            </a:r>
+          </a:p>
+        </p:txBody>
+      </p:sp>
+      <p:sp>
+        <p:nvSpPr>
+          <p:cNvPr id="7" name="Rectangle 6"/>
+          <p:cNvSpPr/>
           <p:nvPr/>
         </p:nvSpPr>
         <p:spPr>
           <a:xfrm>
-            <a:off x="8382224" y="6324600"/>
-            <a:ext cx="457176" cy="369332"/>
+            <a:off x="482600" y="2772985"/>
+            <a:ext cx="8458200" cy="3785652"/>
           </a:xfrm>
           <a:prstGeom prst="rect">
             <a:avLst/>
           </a:prstGeom>
+          <a:ln w="19050">
+            <a:solidFill>
+              <a:schemeClr val="accent1"/>
+            </a:solidFill>
+          </a:ln>
         </p:spPr>
-        <p:style>
-          <a:lnRef idx="2">
-            <a:schemeClr val="accent3">
-              <a:shade val="50000"/>
-            </a:schemeClr>
-          </a:lnRef>
-          <a:fillRef idx="1">
-            <a:schemeClr val="accent3"/>
-          </a:fillRef>
-          <a:effectRef idx="0">
-            <a:schemeClr val="accent3"/>
-          </a:effectRef>
-          <a:fontRef idx="minor">
-            <a:schemeClr val="lt1"/>
-          </a:fontRef>
-        </p:style>
-        <p:txBody>
-          <a:bodyPr wrap="none" rtlCol="0">
+        <p:txBody>
+          <a:bodyPr>
             <a:spAutoFit/>
           </a:bodyPr>
           <a:lstStyle/>
           <a:p>
-            <a:r>
-              <a:rPr lang="en-US" dirty="0"/>
-              <a:t>Q1</a:t>
+            <a:pPr>
+              <a:defRPr/>
+            </a:pPr>
+            <a:r>
+              <a:rPr lang="en-US" sz="2400" b="1" dirty="0">
+                <a:latin typeface="Consolas" pitchFamily="49" charset="0"/>
+              </a:rPr>
+              <a:t>public</a:t>
+            </a:r>
+            <a:r>
+              <a:rPr lang="en-US" sz="2400" dirty="0">
+                <a:latin typeface="Consolas" pitchFamily="49" charset="0"/>
+              </a:rPr>
+              <a:t> </a:t>
+            </a:r>
+            <a:r>
+              <a:rPr lang="en-US" sz="2400" b="1" dirty="0">
+                <a:latin typeface="Consolas" pitchFamily="49" charset="0"/>
+              </a:rPr>
+              <a:t>class</a:t>
+            </a:r>
+            <a:r>
+              <a:rPr lang="en-US" sz="2400" dirty="0">
+                <a:latin typeface="Consolas" pitchFamily="49" charset="0"/>
+              </a:rPr>
+              <a:t> Hovercraft </a:t>
+            </a:r>
+            <a:r>
+              <a:rPr lang="en-US" sz="2400" b="1" dirty="0">
+                <a:latin typeface="Consolas" pitchFamily="49" charset="0"/>
+              </a:rPr>
+              <a:t>implements</a:t>
+            </a:r>
+            <a:r>
+              <a:rPr lang="en-US" sz="2400" dirty="0">
+                <a:latin typeface="Consolas" pitchFamily="49" charset="0"/>
+              </a:rPr>
+              <a:t> Drivable {</a:t>
+            </a:r>
+            <a:br>
+              <a:rPr lang="en-US" sz="2400" dirty="0">
+                <a:latin typeface="Consolas" pitchFamily="49" charset="0"/>
+              </a:rPr>
+            </a:br>
+            <a:r>
+              <a:rPr lang="en-US" sz="2400" dirty="0">
+                <a:latin typeface="Consolas" pitchFamily="49" charset="0"/>
+              </a:rPr>
+              <a:t>	@Override	</a:t>
+            </a:r>
+          </a:p>
+          <a:p>
+            <a:pPr>
+              <a:defRPr/>
+            </a:pPr>
+            <a:r>
+              <a:rPr lang="en-US" sz="2400" dirty="0">
+                <a:latin typeface="Consolas" pitchFamily="49" charset="0"/>
+              </a:rPr>
+              <a:t>	</a:t>
+            </a:r>
+            <a:r>
+              <a:rPr lang="en-US" sz="2400" b="1" dirty="0">
+                <a:latin typeface="Consolas" pitchFamily="49" charset="0"/>
+              </a:rPr>
+              <a:t>public</a:t>
+            </a:r>
+            <a:r>
+              <a:rPr lang="en-US" sz="2400" dirty="0">
+                <a:latin typeface="Consolas" pitchFamily="49" charset="0"/>
+              </a:rPr>
+              <a:t> </a:t>
+            </a:r>
+            <a:r>
+              <a:rPr lang="en-US" sz="2400" b="1" dirty="0">
+                <a:latin typeface="Consolas" pitchFamily="49" charset="0"/>
+              </a:rPr>
+              <a:t>void</a:t>
+            </a:r>
+            <a:r>
+              <a:rPr lang="en-US" sz="2400" dirty="0">
+                <a:latin typeface="Consolas" pitchFamily="49" charset="0"/>
+              </a:rPr>
+              <a:t> turn(double direction) {</a:t>
+            </a:r>
+          </a:p>
+          <a:p>
+            <a:pPr>
+              <a:defRPr/>
+            </a:pPr>
+            <a:r>
+              <a:rPr lang="en-US" sz="2400" dirty="0">
+                <a:latin typeface="Consolas" pitchFamily="49" charset="0"/>
+              </a:rPr>
+              <a:t>		...</a:t>
+            </a:r>
+          </a:p>
+          <a:p>
+            <a:pPr>
+              <a:defRPr/>
+            </a:pPr>
+            <a:r>
+              <a:rPr lang="en-US" sz="2400" dirty="0">
+                <a:latin typeface="Consolas" pitchFamily="49" charset="0"/>
+              </a:rPr>
+              <a:t>	}</a:t>
+            </a:r>
+          </a:p>
+          <a:p>
+            <a:pPr>
+              <a:defRPr/>
+            </a:pPr>
+            <a:r>
+              <a:rPr lang="en-US" sz="2400" dirty="0">
+                <a:latin typeface="Consolas" pitchFamily="49" charset="0"/>
+              </a:rPr>
+              <a:t>	@Override	</a:t>
+            </a:r>
+          </a:p>
+          <a:p>
+            <a:pPr>
+              <a:defRPr/>
+            </a:pPr>
+            <a:r>
+              <a:rPr lang="en-US" sz="2400" dirty="0">
+                <a:latin typeface="Consolas" pitchFamily="49" charset="0"/>
+              </a:rPr>
+              <a:t>	</a:t>
+            </a:r>
+            <a:r>
+              <a:rPr lang="en-US" sz="2400" b="1" dirty="0">
+                <a:latin typeface="Consolas" pitchFamily="49" charset="0"/>
+              </a:rPr>
+              <a:t>public</a:t>
+            </a:r>
+            <a:r>
+              <a:rPr lang="en-US" sz="2400" dirty="0">
+                <a:latin typeface="Consolas" pitchFamily="49" charset="0"/>
+              </a:rPr>
+              <a:t> </a:t>
+            </a:r>
+            <a:r>
+              <a:rPr lang="en-US" sz="2400" b="1" dirty="0">
+                <a:latin typeface="Consolas" pitchFamily="49" charset="0"/>
+              </a:rPr>
+              <a:t>void</a:t>
+            </a:r>
+            <a:r>
+              <a:rPr lang="en-US" sz="2400" dirty="0">
+                <a:latin typeface="Consolas" pitchFamily="49" charset="0"/>
+              </a:rPr>
+              <a:t> accelerate(double force) {</a:t>
+            </a:r>
+          </a:p>
+          <a:p>
+            <a:pPr>
+              <a:defRPr/>
+            </a:pPr>
+            <a:r>
+              <a:rPr lang="en-US" sz="2400" dirty="0">
+                <a:latin typeface="Consolas" pitchFamily="49" charset="0"/>
+              </a:rPr>
+              <a:t>		...</a:t>
+            </a:r>
+          </a:p>
+          <a:p>
+            <a:pPr>
+              <a:defRPr/>
+            </a:pPr>
+            <a:r>
+              <a:rPr lang="en-US" sz="2400" dirty="0">
+                <a:latin typeface="Consolas" pitchFamily="49" charset="0"/>
+              </a:rPr>
+              <a:t>	}</a:t>
+            </a:r>
+            <a:br>
+              <a:rPr lang="en-US" sz="2400" dirty="0">
+                <a:latin typeface="Consolas" pitchFamily="49" charset="0"/>
+              </a:rPr>
+            </a:br>
+            <a:r>
+              <a:rPr lang="en-US" sz="2400" dirty="0">
+                <a:latin typeface="Consolas" pitchFamily="49" charset="0"/>
+              </a:rPr>
+              <a:t>}</a:t>
+            </a:r>
+          </a:p>
+        </p:txBody>
+      </p:sp>
+      <p:sp>
+        <p:nvSpPr>
+          <p:cNvPr id="8" name="Rectangle 7">
+            <a:extLst>
+              <a:ext uri="{FF2B5EF4-FFF2-40B4-BE49-F238E27FC236}">
+                <a16:creationId xmlns:a16="http://schemas.microsoft.com/office/drawing/2014/main" id="{41000EC9-45DA-AE40-BFC4-49B6CF2DF3F7}"/>
+              </a:ext>
+            </a:extLst>
+          </p:cNvPr>
+          <p:cNvSpPr/>
+          <p:nvPr/>
+        </p:nvSpPr>
+        <p:spPr>
+          <a:xfrm>
+            <a:off x="533400" y="990600"/>
+            <a:ext cx="7696200" cy="1569660"/>
+          </a:xfrm>
+          <a:prstGeom prst="rect">
+            <a:avLst/>
+          </a:prstGeom>
+          <a:ln w="19050">
+            <a:solidFill>
+              <a:schemeClr val="accent1"/>
+            </a:solidFill>
+          </a:ln>
+        </p:spPr>
+        <p:txBody>
+          <a:bodyPr>
+            <a:spAutoFit/>
+          </a:bodyPr>
+          <a:lstStyle/>
+          <a:p>
+            <a:pPr>
+              <a:defRPr/>
+            </a:pPr>
+            <a:r>
+              <a:rPr lang="en-US" sz="2400" b="1" dirty="0">
+                <a:latin typeface="Consolas" pitchFamily="49" charset="0"/>
+              </a:rPr>
+              <a:t>public</a:t>
+            </a:r>
+            <a:r>
+              <a:rPr lang="en-US" sz="2400" dirty="0">
+                <a:latin typeface="Consolas" pitchFamily="49" charset="0"/>
+              </a:rPr>
+              <a:t> </a:t>
+            </a:r>
+            <a:r>
+              <a:rPr lang="en-US" sz="2400" b="1" dirty="0">
+                <a:latin typeface="Consolas" pitchFamily="49" charset="0"/>
+              </a:rPr>
+              <a:t>interface</a:t>
+            </a:r>
+            <a:r>
+              <a:rPr lang="en-US" sz="2400" dirty="0">
+                <a:latin typeface="Consolas" pitchFamily="49" charset="0"/>
+              </a:rPr>
+              <a:t> Drivable {</a:t>
+            </a:r>
+          </a:p>
+          <a:p>
+            <a:pPr>
+              <a:defRPr/>
+            </a:pPr>
+            <a:r>
+              <a:rPr lang="en-US" sz="2400" dirty="0">
+                <a:latin typeface="Consolas" pitchFamily="49" charset="0"/>
+              </a:rPr>
+              <a:t>	</a:t>
+            </a:r>
+            <a:r>
+              <a:rPr lang="en-US" sz="2400" b="1" dirty="0">
+                <a:latin typeface="Consolas" pitchFamily="49" charset="0"/>
+              </a:rPr>
+              <a:t>void</a:t>
+            </a:r>
+            <a:r>
+              <a:rPr lang="en-US" sz="2400" dirty="0">
+                <a:latin typeface="Consolas" pitchFamily="49" charset="0"/>
+              </a:rPr>
+              <a:t> turn(double </a:t>
+            </a:r>
+            <a:r>
+              <a:rPr lang="en-US" sz="2400" dirty="0" err="1">
+                <a:latin typeface="Consolas" pitchFamily="49" charset="0"/>
+              </a:rPr>
+              <a:t>dir</a:t>
+            </a:r>
+            <a:r>
+              <a:rPr lang="en-US" sz="2400" dirty="0">
+                <a:latin typeface="Consolas" pitchFamily="49" charset="0"/>
+              </a:rPr>
+              <a:t>);</a:t>
+            </a:r>
+          </a:p>
+          <a:p>
+            <a:pPr>
+              <a:defRPr/>
+            </a:pPr>
+            <a:r>
+              <a:rPr lang="en-US" sz="2400" dirty="0">
+                <a:latin typeface="Consolas" pitchFamily="49" charset="0"/>
+              </a:rPr>
+              <a:t>	</a:t>
+            </a:r>
+            <a:r>
+              <a:rPr lang="en-US" sz="2400" b="1" dirty="0">
+                <a:latin typeface="Consolas" pitchFamily="49" charset="0"/>
+              </a:rPr>
+              <a:t>void</a:t>
+            </a:r>
+            <a:r>
+              <a:rPr lang="en-US" sz="2400" dirty="0">
+                <a:latin typeface="Consolas" pitchFamily="49" charset="0"/>
+              </a:rPr>
+              <a:t> accelerate(double force);</a:t>
+            </a:r>
+          </a:p>
+          <a:p>
+            <a:pPr>
+              <a:defRPr/>
+            </a:pPr>
+            <a:r>
+              <a:rPr lang="en-US" sz="2400" dirty="0">
+                <a:latin typeface="Consolas" pitchFamily="49" charset="0"/>
+              </a:rPr>
+              <a:t>}  // this describes the 'what it does'</a:t>
             </a:r>
           </a:p>
         </p:txBody>
@@ -17280,7 +17998,7 @@
     </p:spTree>
     <p:extLst>
       <p:ext uri="{BB962C8B-B14F-4D97-AF65-F5344CB8AC3E}">
-        <p14:creationId xmlns:p14="http://schemas.microsoft.com/office/powerpoint/2010/main" val="1907500074"/>
+        <p14:creationId xmlns:p14="http://schemas.microsoft.com/office/powerpoint/2010/main" val="4023042757"/>
       </p:ext>
     </p:extLst>
   </p:cSld>

</xml_diff>